<commit_message>
EDA getaround + figures (pptx)
</commit_message>
<xml_diff>
--- a/08_deployment/99_Project_getaround/01_getaround_project.pptx
+++ b/08_deployment/99_Project_getaround/01_getaround_project.pptx
@@ -5,13 +5,14 @@
     <p:sldMasterId id="2147483660" r:id="rId1"/>
   </p:sldMasterIdLst>
   <p:notesMasterIdLst>
-    <p:notesMasterId r:id="rId6"/>
+    <p:notesMasterId r:id="rId7"/>
   </p:notesMasterIdLst>
   <p:sldIdLst>
     <p:sldId id="256" r:id="rId2"/>
     <p:sldId id="258" r:id="rId3"/>
     <p:sldId id="257" r:id="rId4"/>
     <p:sldId id="263" r:id="rId5"/>
+    <p:sldId id="264" r:id="rId6"/>
   </p:sldIdLst>
   <p:sldSz cx="12192000" cy="6858000"/>
   <p:notesSz cx="6858000" cy="9144000"/>
@@ -121,7 +122,7 @@
 <file path=ppt/revisionInfo.xml><?xml version="1.0" encoding="utf-8"?>
 <p1510:revInfo xmlns:a="http://schemas.openxmlformats.org/drawingml/2006/main" xmlns:r="http://schemas.openxmlformats.org/officeDocument/2006/relationships" xmlns:p1510="http://schemas.microsoft.com/office/powerpoint/2015/10/main">
   <p1510:revLst>
-    <p1510:client id="{40F711FF-06EA-48FB-94E5-8AF9239032B0}" v="4" dt="2024-08-24T17:20:07.481"/>
+    <p1510:client id="{40F711FF-06EA-48FB-94E5-8AF9239032B0}" v="16" dt="2024-09-08T09:32:26.117"/>
   </p1510:revLst>
 </p1510:revInfo>
 </file>
@@ -657,8 +658,8 @@
   </pc:docChgLst>
   <pc:docChgLst>
     <pc:chgData name="Philippe Baucour" userId="5102170ae7533958" providerId="LiveId" clId="{40F711FF-06EA-48FB-94E5-8AF9239032B0}"/>
-    <pc:docChg chg="undo custSel modSld sldOrd">
-      <pc:chgData name="Philippe Baucour" userId="5102170ae7533958" providerId="LiveId" clId="{40F711FF-06EA-48FB-94E5-8AF9239032B0}" dt="2024-09-06T09:20:15.092" v="63" actId="729"/>
+    <pc:docChg chg="undo custSel addSld modSld sldOrd">
+      <pc:chgData name="Philippe Baucour" userId="5102170ae7533958" providerId="LiveId" clId="{40F711FF-06EA-48FB-94E5-8AF9239032B0}" dt="2024-09-08T09:30:28.861" v="344" actId="1076"/>
       <pc:docMkLst>
         <pc:docMk/>
       </pc:docMkLst>
@@ -705,6 +706,245 @@
           <pc:docMk/>
           <pc:sldMk cId="312535264" sldId="263"/>
         </pc:sldMkLst>
+      </pc:sldChg>
+      <pc:sldChg chg="addSp delSp modSp new mod modClrScheme chgLayout">
+        <pc:chgData name="Philippe Baucour" userId="5102170ae7533958" providerId="LiveId" clId="{40F711FF-06EA-48FB-94E5-8AF9239032B0}" dt="2024-09-08T09:30:28.861" v="344" actId="1076"/>
+        <pc:sldMkLst>
+          <pc:docMk/>
+          <pc:sldMk cId="1373706002" sldId="264"/>
+        </pc:sldMkLst>
+        <pc:spChg chg="del mod ord">
+          <ac:chgData name="Philippe Baucour" userId="5102170ae7533958" providerId="LiveId" clId="{40F711FF-06EA-48FB-94E5-8AF9239032B0}" dt="2024-09-08T09:11:55.537" v="65" actId="700"/>
+          <ac:spMkLst>
+            <pc:docMk/>
+            <pc:sldMk cId="1373706002" sldId="264"/>
+            <ac:spMk id="2" creationId="{EAD01FC6-B6F1-471A-A7FA-557BA013C358}"/>
+          </ac:spMkLst>
+        </pc:spChg>
+        <pc:spChg chg="del">
+          <ac:chgData name="Philippe Baucour" userId="5102170ae7533958" providerId="LiveId" clId="{40F711FF-06EA-48FB-94E5-8AF9239032B0}" dt="2024-09-08T09:11:55.537" v="65" actId="700"/>
+          <ac:spMkLst>
+            <pc:docMk/>
+            <pc:sldMk cId="1373706002" sldId="264"/>
+            <ac:spMk id="3" creationId="{7302CFE8-94EC-2491-DAEE-B56CF4BA0089}"/>
+          </ac:spMkLst>
+        </pc:spChg>
+        <pc:spChg chg="add mod ord">
+          <ac:chgData name="Philippe Baucour" userId="5102170ae7533958" providerId="LiveId" clId="{40F711FF-06EA-48FB-94E5-8AF9239032B0}" dt="2024-09-08T09:12:02.758" v="75" actId="20577"/>
+          <ac:spMkLst>
+            <pc:docMk/>
+            <pc:sldMk cId="1373706002" sldId="264"/>
+            <ac:spMk id="4" creationId="{EF2A8F15-8E22-7123-9084-834452AB8F63}"/>
+          </ac:spMkLst>
+        </pc:spChg>
+        <pc:spChg chg="add del mod">
+          <ac:chgData name="Philippe Baucour" userId="5102170ae7533958" providerId="LiveId" clId="{40F711FF-06EA-48FB-94E5-8AF9239032B0}" dt="2024-09-08T09:21:20.753" v="322" actId="478"/>
+          <ac:spMkLst>
+            <pc:docMk/>
+            <pc:sldMk cId="1373706002" sldId="264"/>
+            <ac:spMk id="11" creationId="{B0B35840-6598-8A5C-A626-BE922457A29D}"/>
+          </ac:spMkLst>
+        </pc:spChg>
+        <pc:spChg chg="add mod">
+          <ac:chgData name="Philippe Baucour" userId="5102170ae7533958" providerId="LiveId" clId="{40F711FF-06EA-48FB-94E5-8AF9239032B0}" dt="2024-09-08T09:21:02.825" v="319" actId="1036"/>
+          <ac:spMkLst>
+            <pc:docMk/>
+            <pc:sldMk cId="1373706002" sldId="264"/>
+            <ac:spMk id="13" creationId="{3CEDE262-9D4C-7F42-0C0A-790346E96373}"/>
+          </ac:spMkLst>
+        </pc:spChg>
+        <pc:spChg chg="add mod">
+          <ac:chgData name="Philippe Baucour" userId="5102170ae7533958" providerId="LiveId" clId="{40F711FF-06EA-48FB-94E5-8AF9239032B0}" dt="2024-09-08T09:21:02.825" v="319" actId="1036"/>
+          <ac:spMkLst>
+            <pc:docMk/>
+            <pc:sldMk cId="1373706002" sldId="264"/>
+            <ac:spMk id="14" creationId="{4B2711C6-E93E-A998-96E4-6C08DBC1A816}"/>
+          </ac:spMkLst>
+        </pc:spChg>
+        <pc:spChg chg="add mod">
+          <ac:chgData name="Philippe Baucour" userId="5102170ae7533958" providerId="LiveId" clId="{40F711FF-06EA-48FB-94E5-8AF9239032B0}" dt="2024-09-08T09:21:02.825" v="319" actId="1036"/>
+          <ac:spMkLst>
+            <pc:docMk/>
+            <pc:sldMk cId="1373706002" sldId="264"/>
+            <ac:spMk id="17" creationId="{25628DB1-D95E-C931-B0CB-1FDE2E4AF51A}"/>
+          </ac:spMkLst>
+        </pc:spChg>
+        <pc:spChg chg="add mod">
+          <ac:chgData name="Philippe Baucour" userId="5102170ae7533958" providerId="LiveId" clId="{40F711FF-06EA-48FB-94E5-8AF9239032B0}" dt="2024-09-08T09:21:02.825" v="319" actId="1036"/>
+          <ac:spMkLst>
+            <pc:docMk/>
+            <pc:sldMk cId="1373706002" sldId="264"/>
+            <ac:spMk id="18" creationId="{08C4FBDB-8965-E9BE-0584-C82D2C367616}"/>
+          </ac:spMkLst>
+        </pc:spChg>
+        <pc:spChg chg="add mod">
+          <ac:chgData name="Philippe Baucour" userId="5102170ae7533958" providerId="LiveId" clId="{40F711FF-06EA-48FB-94E5-8AF9239032B0}" dt="2024-09-08T09:22:00.369" v="338" actId="404"/>
+          <ac:spMkLst>
+            <pc:docMk/>
+            <pc:sldMk cId="1373706002" sldId="264"/>
+            <ac:spMk id="24" creationId="{BADBBA3C-DB58-D898-6824-CCA97D779206}"/>
+          </ac:spMkLst>
+        </pc:spChg>
+        <pc:spChg chg="add mod">
+          <ac:chgData name="Philippe Baucour" userId="5102170ae7533958" providerId="LiveId" clId="{40F711FF-06EA-48FB-94E5-8AF9239032B0}" dt="2024-09-08T09:21:16.481" v="321" actId="1076"/>
+          <ac:spMkLst>
+            <pc:docMk/>
+            <pc:sldMk cId="1373706002" sldId="264"/>
+            <ac:spMk id="26" creationId="{AAD1B239-CD5F-66C8-5247-38641FC9475E}"/>
+          </ac:spMkLst>
+        </pc:spChg>
+        <pc:spChg chg="add mod">
+          <ac:chgData name="Philippe Baucour" userId="5102170ae7533958" providerId="LiveId" clId="{40F711FF-06EA-48FB-94E5-8AF9239032B0}" dt="2024-09-08T09:21:16.481" v="321" actId="1076"/>
+          <ac:spMkLst>
+            <pc:docMk/>
+            <pc:sldMk cId="1373706002" sldId="264"/>
+            <ac:spMk id="27" creationId="{0F3C8F11-8C60-8632-E3CC-B3BC9CA83199}"/>
+          </ac:spMkLst>
+        </pc:spChg>
+        <pc:spChg chg="add mod">
+          <ac:chgData name="Philippe Baucour" userId="5102170ae7533958" providerId="LiveId" clId="{40F711FF-06EA-48FB-94E5-8AF9239032B0}" dt="2024-09-08T09:21:16.481" v="321" actId="1076"/>
+          <ac:spMkLst>
+            <pc:docMk/>
+            <pc:sldMk cId="1373706002" sldId="264"/>
+            <ac:spMk id="29" creationId="{97373761-9646-7E85-1CDF-4DBD1BE2C894}"/>
+          </ac:spMkLst>
+        </pc:spChg>
+        <pc:spChg chg="add mod">
+          <ac:chgData name="Philippe Baucour" userId="5102170ae7533958" providerId="LiveId" clId="{40F711FF-06EA-48FB-94E5-8AF9239032B0}" dt="2024-09-08T09:21:16.481" v="321" actId="1076"/>
+          <ac:spMkLst>
+            <pc:docMk/>
+            <pc:sldMk cId="1373706002" sldId="264"/>
+            <ac:spMk id="30" creationId="{C775230C-72ED-B11C-2532-67F855A50469}"/>
+          </ac:spMkLst>
+        </pc:spChg>
+        <pc:spChg chg="add mod">
+          <ac:chgData name="Philippe Baucour" userId="5102170ae7533958" providerId="LiveId" clId="{40F711FF-06EA-48FB-94E5-8AF9239032B0}" dt="2024-09-08T09:29:54.415" v="340" actId="1076"/>
+          <ac:spMkLst>
+            <pc:docMk/>
+            <pc:sldMk cId="1373706002" sldId="264"/>
+            <ac:spMk id="32" creationId="{34BDCDB2-F20B-FD27-E7E3-E43D6DE7388E}"/>
+          </ac:spMkLst>
+        </pc:spChg>
+        <pc:spChg chg="add mod">
+          <ac:chgData name="Philippe Baucour" userId="5102170ae7533958" providerId="LiveId" clId="{40F711FF-06EA-48FB-94E5-8AF9239032B0}" dt="2024-09-08T09:30:06.291" v="342" actId="1076"/>
+          <ac:spMkLst>
+            <pc:docMk/>
+            <pc:sldMk cId="1373706002" sldId="264"/>
+            <ac:spMk id="34" creationId="{CAFCA1A0-F0BA-9899-5CBF-6E88EDB24470}"/>
+          </ac:spMkLst>
+        </pc:spChg>
+        <pc:spChg chg="add mod">
+          <ac:chgData name="Philippe Baucour" userId="5102170ae7533958" providerId="LiveId" clId="{40F711FF-06EA-48FB-94E5-8AF9239032B0}" dt="2024-09-08T09:30:28.861" v="344" actId="1076"/>
+          <ac:spMkLst>
+            <pc:docMk/>
+            <pc:sldMk cId="1373706002" sldId="264"/>
+            <ac:spMk id="36" creationId="{928554EF-5E4A-CE84-0556-0D865FC42DCB}"/>
+          </ac:spMkLst>
+        </pc:spChg>
+        <pc:cxnChg chg="add mod">
+          <ac:chgData name="Philippe Baucour" userId="5102170ae7533958" providerId="LiveId" clId="{40F711FF-06EA-48FB-94E5-8AF9239032B0}" dt="2024-09-08T09:21:02.825" v="319" actId="1036"/>
+          <ac:cxnSpMkLst>
+            <pc:docMk/>
+            <pc:sldMk cId="1373706002" sldId="264"/>
+            <ac:cxnSpMk id="6" creationId="{D3449578-2B85-6D82-4C71-94229B9D7969}"/>
+          </ac:cxnSpMkLst>
+        </pc:cxnChg>
+        <pc:cxnChg chg="add mod">
+          <ac:chgData name="Philippe Baucour" userId="5102170ae7533958" providerId="LiveId" clId="{40F711FF-06EA-48FB-94E5-8AF9239032B0}" dt="2024-09-08T09:21:02.825" v="319" actId="1036"/>
+          <ac:cxnSpMkLst>
+            <pc:docMk/>
+            <pc:sldMk cId="1373706002" sldId="264"/>
+            <ac:cxnSpMk id="8" creationId="{53D696E9-A257-E150-14A8-D2D64BF39073}"/>
+          </ac:cxnSpMkLst>
+        </pc:cxnChg>
+        <pc:cxnChg chg="add mod">
+          <ac:chgData name="Philippe Baucour" userId="5102170ae7533958" providerId="LiveId" clId="{40F711FF-06EA-48FB-94E5-8AF9239032B0}" dt="2024-09-08T09:21:02.825" v="319" actId="1036"/>
+          <ac:cxnSpMkLst>
+            <pc:docMk/>
+            <pc:sldMk cId="1373706002" sldId="264"/>
+            <ac:cxnSpMk id="10" creationId="{1461492B-30E9-14D3-4B67-A7AB21C72095}"/>
+          </ac:cxnSpMkLst>
+        </pc:cxnChg>
+        <pc:cxnChg chg="add mod">
+          <ac:chgData name="Philippe Baucour" userId="5102170ae7533958" providerId="LiveId" clId="{40F711FF-06EA-48FB-94E5-8AF9239032B0}" dt="2024-09-08T09:21:02.825" v="319" actId="1036"/>
+          <ac:cxnSpMkLst>
+            <pc:docMk/>
+            <pc:sldMk cId="1373706002" sldId="264"/>
+            <ac:cxnSpMk id="12" creationId="{9DA77857-9345-9C55-EC4E-BC52E4F7EBA1}"/>
+          </ac:cxnSpMkLst>
+        </pc:cxnChg>
+        <pc:cxnChg chg="add mod">
+          <ac:chgData name="Philippe Baucour" userId="5102170ae7533958" providerId="LiveId" clId="{40F711FF-06EA-48FB-94E5-8AF9239032B0}" dt="2024-09-08T09:21:02.825" v="319" actId="1036"/>
+          <ac:cxnSpMkLst>
+            <pc:docMk/>
+            <pc:sldMk cId="1373706002" sldId="264"/>
+            <ac:cxnSpMk id="16" creationId="{1C501005-199D-04BE-9B33-319FC66165D3}"/>
+          </ac:cxnSpMkLst>
+        </pc:cxnChg>
+        <pc:cxnChg chg="add mod">
+          <ac:chgData name="Philippe Baucour" userId="5102170ae7533958" providerId="LiveId" clId="{40F711FF-06EA-48FB-94E5-8AF9239032B0}" dt="2024-09-08T09:21:16.481" v="321" actId="1076"/>
+          <ac:cxnSpMkLst>
+            <pc:docMk/>
+            <pc:sldMk cId="1373706002" sldId="264"/>
+            <ac:cxnSpMk id="21" creationId="{81523577-FD19-D04F-3F30-57B4E540E5E3}"/>
+          </ac:cxnSpMkLst>
+        </pc:cxnChg>
+        <pc:cxnChg chg="add mod">
+          <ac:chgData name="Philippe Baucour" userId="5102170ae7533958" providerId="LiveId" clId="{40F711FF-06EA-48FB-94E5-8AF9239032B0}" dt="2024-09-08T09:21:16.481" v="321" actId="1076"/>
+          <ac:cxnSpMkLst>
+            <pc:docMk/>
+            <pc:sldMk cId="1373706002" sldId="264"/>
+            <ac:cxnSpMk id="22" creationId="{4BC151CE-11AA-0B7F-6099-435D4C9F4439}"/>
+          </ac:cxnSpMkLst>
+        </pc:cxnChg>
+        <pc:cxnChg chg="add mod">
+          <ac:chgData name="Philippe Baucour" userId="5102170ae7533958" providerId="LiveId" clId="{40F711FF-06EA-48FB-94E5-8AF9239032B0}" dt="2024-09-08T09:21:16.481" v="321" actId="1076"/>
+          <ac:cxnSpMkLst>
+            <pc:docMk/>
+            <pc:sldMk cId="1373706002" sldId="264"/>
+            <ac:cxnSpMk id="23" creationId="{A5668EAF-C4E9-1377-8E78-81FD6D03B64F}"/>
+          </ac:cxnSpMkLst>
+        </pc:cxnChg>
+        <pc:cxnChg chg="add mod">
+          <ac:chgData name="Philippe Baucour" userId="5102170ae7533958" providerId="LiveId" clId="{40F711FF-06EA-48FB-94E5-8AF9239032B0}" dt="2024-09-08T09:21:16.481" v="321" actId="1076"/>
+          <ac:cxnSpMkLst>
+            <pc:docMk/>
+            <pc:sldMk cId="1373706002" sldId="264"/>
+            <ac:cxnSpMk id="25" creationId="{61B12A27-6F20-C959-CBA6-CD8D504D3F1E}"/>
+          </ac:cxnSpMkLst>
+        </pc:cxnChg>
+        <pc:cxnChg chg="add mod">
+          <ac:chgData name="Philippe Baucour" userId="5102170ae7533958" providerId="LiveId" clId="{40F711FF-06EA-48FB-94E5-8AF9239032B0}" dt="2024-09-08T09:21:16.481" v="321" actId="1076"/>
+          <ac:cxnSpMkLst>
+            <pc:docMk/>
+            <pc:sldMk cId="1373706002" sldId="264"/>
+            <ac:cxnSpMk id="28" creationId="{04A48406-9438-F992-B86A-1B252122AFFD}"/>
+          </ac:cxnSpMkLst>
+        </pc:cxnChg>
+        <pc:cxnChg chg="add mod">
+          <ac:chgData name="Philippe Baucour" userId="5102170ae7533958" providerId="LiveId" clId="{40F711FF-06EA-48FB-94E5-8AF9239032B0}" dt="2024-09-08T09:29:54.415" v="340" actId="1076"/>
+          <ac:cxnSpMkLst>
+            <pc:docMk/>
+            <pc:sldMk cId="1373706002" sldId="264"/>
+            <ac:cxnSpMk id="31" creationId="{8AC3B853-9E2C-2D89-88CA-A5B4D5D7B4B2}"/>
+          </ac:cxnSpMkLst>
+        </pc:cxnChg>
+        <pc:cxnChg chg="add mod">
+          <ac:chgData name="Philippe Baucour" userId="5102170ae7533958" providerId="LiveId" clId="{40F711FF-06EA-48FB-94E5-8AF9239032B0}" dt="2024-09-08T09:30:06.291" v="342" actId="1076"/>
+          <ac:cxnSpMkLst>
+            <pc:docMk/>
+            <pc:sldMk cId="1373706002" sldId="264"/>
+            <ac:cxnSpMk id="33" creationId="{30E18593-59EB-BDF3-80EA-8C14032AA45A}"/>
+          </ac:cxnSpMkLst>
+        </pc:cxnChg>
+        <pc:cxnChg chg="add mod">
+          <ac:chgData name="Philippe Baucour" userId="5102170ae7533958" providerId="LiveId" clId="{40F711FF-06EA-48FB-94E5-8AF9239032B0}" dt="2024-09-08T09:30:28.861" v="344" actId="1076"/>
+          <ac:cxnSpMkLst>
+            <pc:docMk/>
+            <pc:sldMk cId="1373706002" sldId="264"/>
+            <ac:cxnSpMk id="35" creationId="{59E07000-C642-A948-9CD6-721F82EE2FA6}"/>
+          </ac:cxnSpMkLst>
+        </pc:cxnChg>
       </pc:sldChg>
     </pc:docChg>
   </pc:docChgLst>
@@ -1695,7 +1935,7 @@
           <a:p>
             <a:fld id="{FD1752CD-A7D2-4825-BC26-9DAEFBD0A5FF}" type="datetimeFigureOut">
               <a:rPr lang="fr-FR" smtClean="0"/>
-              <a:t>06/09/2024</a:t>
+              <a:t>08/09/2024</a:t>
             </a:fld>
             <a:endParaRPr lang="fr-FR"/>
           </a:p>
@@ -2539,7 +2779,7 @@
           <a:p>
             <a:fld id="{7ECB9D5A-E5E4-41FE-AF39-634902D6D5D2}" type="datetimeFigureOut">
               <a:rPr lang="fr-FR" smtClean="0"/>
-              <a:t>06/09/2024</a:t>
+              <a:t>08/09/2024</a:t>
             </a:fld>
             <a:endParaRPr lang="fr-FR"/>
           </a:p>
@@ -2737,7 +2977,7 @@
           <a:p>
             <a:fld id="{7ECB9D5A-E5E4-41FE-AF39-634902D6D5D2}" type="datetimeFigureOut">
               <a:rPr lang="fr-FR" smtClean="0"/>
-              <a:t>06/09/2024</a:t>
+              <a:t>08/09/2024</a:t>
             </a:fld>
             <a:endParaRPr lang="fr-FR"/>
           </a:p>
@@ -2945,7 +3185,7 @@
           <a:p>
             <a:fld id="{7ECB9D5A-E5E4-41FE-AF39-634902D6D5D2}" type="datetimeFigureOut">
               <a:rPr lang="fr-FR" smtClean="0"/>
-              <a:t>06/09/2024</a:t>
+              <a:t>08/09/2024</a:t>
             </a:fld>
             <a:endParaRPr lang="fr-FR"/>
           </a:p>
@@ -3143,7 +3383,7 @@
           <a:p>
             <a:fld id="{7ECB9D5A-E5E4-41FE-AF39-634902D6D5D2}" type="datetimeFigureOut">
               <a:rPr lang="fr-FR" smtClean="0"/>
-              <a:t>06/09/2024</a:t>
+              <a:t>08/09/2024</a:t>
             </a:fld>
             <a:endParaRPr lang="fr-FR"/>
           </a:p>
@@ -3418,7 +3658,7 @@
           <a:p>
             <a:fld id="{7ECB9D5A-E5E4-41FE-AF39-634902D6D5D2}" type="datetimeFigureOut">
               <a:rPr lang="fr-FR" smtClean="0"/>
-              <a:t>06/09/2024</a:t>
+              <a:t>08/09/2024</a:t>
             </a:fld>
             <a:endParaRPr lang="fr-FR"/>
           </a:p>
@@ -3683,7 +3923,7 @@
           <a:p>
             <a:fld id="{7ECB9D5A-E5E4-41FE-AF39-634902D6D5D2}" type="datetimeFigureOut">
               <a:rPr lang="fr-FR" smtClean="0"/>
-              <a:t>06/09/2024</a:t>
+              <a:t>08/09/2024</a:t>
             </a:fld>
             <a:endParaRPr lang="fr-FR"/>
           </a:p>
@@ -4095,7 +4335,7 @@
           <a:p>
             <a:fld id="{7ECB9D5A-E5E4-41FE-AF39-634902D6D5D2}" type="datetimeFigureOut">
               <a:rPr lang="fr-FR" smtClean="0"/>
-              <a:t>06/09/2024</a:t>
+              <a:t>08/09/2024</a:t>
             </a:fld>
             <a:endParaRPr lang="fr-FR"/>
           </a:p>
@@ -4236,7 +4476,7 @@
           <a:p>
             <a:fld id="{7ECB9D5A-E5E4-41FE-AF39-634902D6D5D2}" type="datetimeFigureOut">
               <a:rPr lang="fr-FR" smtClean="0"/>
-              <a:t>06/09/2024</a:t>
+              <a:t>08/09/2024</a:t>
             </a:fld>
             <a:endParaRPr lang="fr-FR"/>
           </a:p>
@@ -4349,7 +4589,7 @@
           <a:p>
             <a:fld id="{7ECB9D5A-E5E4-41FE-AF39-634902D6D5D2}" type="datetimeFigureOut">
               <a:rPr lang="fr-FR" smtClean="0"/>
-              <a:t>06/09/2024</a:t>
+              <a:t>08/09/2024</a:t>
             </a:fld>
             <a:endParaRPr lang="fr-FR"/>
           </a:p>
@@ -4660,7 +4900,7 @@
           <a:p>
             <a:fld id="{7ECB9D5A-E5E4-41FE-AF39-634902D6D5D2}" type="datetimeFigureOut">
               <a:rPr lang="fr-FR" smtClean="0"/>
-              <a:t>06/09/2024</a:t>
+              <a:t>08/09/2024</a:t>
             </a:fld>
             <a:endParaRPr lang="fr-FR"/>
           </a:p>
@@ -4951,7 +5191,7 @@
           <a:p>
             <a:fld id="{7ECB9D5A-E5E4-41FE-AF39-634902D6D5D2}" type="datetimeFigureOut">
               <a:rPr lang="fr-FR" smtClean="0"/>
-              <a:t>06/09/2024</a:t>
+              <a:t>08/09/2024</a:t>
             </a:fld>
             <a:endParaRPr lang="fr-FR"/>
           </a:p>
@@ -5192,7 +5432,7 @@
           <a:p>
             <a:fld id="{7ECB9D5A-E5E4-41FE-AF39-634902D6D5D2}" type="datetimeFigureOut">
               <a:rPr lang="fr-FR" smtClean="0"/>
-              <a:t>06/09/2024</a:t>
+              <a:t>08/09/2024</a:t>
             </a:fld>
             <a:endParaRPr lang="fr-FR"/>
           </a:p>
@@ -6024,6 +6264,1081 @@
     <p:extLst>
       <p:ext uri="{BB962C8B-B14F-4D97-AF65-F5344CB8AC3E}">
         <p14:creationId xmlns:p14="http://schemas.microsoft.com/office/powerpoint/2010/main" val="312535264"/>
+      </p:ext>
+    </p:extLst>
+  </p:cSld>
+  <p:clrMapOvr>
+    <a:masterClrMapping/>
+  </p:clrMapOvr>
+</p:sld>
+</file>
+
+<file path=ppt/slides/slide5.xml><?xml version="1.0" encoding="utf-8"?>
+<p:sld xmlns:a="http://schemas.openxmlformats.org/drawingml/2006/main" xmlns:r="http://schemas.openxmlformats.org/officeDocument/2006/relationships" xmlns:p="http://schemas.openxmlformats.org/presentationml/2006/main">
+  <p:cSld>
+    <p:spTree>
+      <p:nvGrpSpPr>
+        <p:cNvPr id="1" name=""/>
+        <p:cNvGrpSpPr/>
+        <p:nvPr/>
+      </p:nvGrpSpPr>
+      <p:grpSpPr>
+        <a:xfrm>
+          <a:off x="0" y="0"/>
+          <a:ext cx="0" cy="0"/>
+          <a:chOff x="0" y="0"/>
+          <a:chExt cx="0" cy="0"/>
+        </a:xfrm>
+      </p:grpSpPr>
+      <p:sp>
+        <p:nvSpPr>
+          <p:cNvPr id="4" name="Titre 3">
+            <a:extLst>
+              <a:ext uri="{FF2B5EF4-FFF2-40B4-BE49-F238E27FC236}">
+                <a16:creationId xmlns:a16="http://schemas.microsoft.com/office/drawing/2014/main" id="{EF2A8F15-8E22-7123-9084-834452AB8F63}"/>
+              </a:ext>
+            </a:extLst>
+          </p:cNvPr>
+          <p:cNvSpPr>
+            <a:spLocks noGrp="1"/>
+          </p:cNvSpPr>
+          <p:nvPr>
+            <p:ph type="title"/>
+          </p:nvPr>
+        </p:nvSpPr>
+        <p:spPr/>
+        <p:txBody>
+          <a:bodyPr/>
+          <a:lstStyle/>
+          <a:p>
+            <a:r>
+              <a:rPr lang="fr-FR" dirty="0" err="1"/>
+              <a:t>Theshold</a:t>
+            </a:r>
+            <a:endParaRPr lang="fr-FR" dirty="0"/>
+          </a:p>
+        </p:txBody>
+      </p:sp>
+      <p:cxnSp>
+        <p:nvCxnSpPr>
+          <p:cNvPr id="6" name="Connecteur droit avec flèche 5">
+            <a:extLst>
+              <a:ext uri="{FF2B5EF4-FFF2-40B4-BE49-F238E27FC236}">
+                <a16:creationId xmlns:a16="http://schemas.microsoft.com/office/drawing/2014/main" id="{D3449578-2B85-6D82-4C71-94229B9D7969}"/>
+              </a:ext>
+            </a:extLst>
+          </p:cNvPr>
+          <p:cNvCxnSpPr>
+            <a:cxnSpLocks/>
+          </p:cNvCxnSpPr>
+          <p:nvPr/>
+        </p:nvCxnSpPr>
+        <p:spPr>
+          <a:xfrm>
+            <a:off x="3002280" y="1960206"/>
+            <a:ext cx="8007842" cy="0"/>
+          </a:xfrm>
+          <a:prstGeom prst="straightConnector1">
+            <a:avLst/>
+          </a:prstGeom>
+          <a:ln w="76200">
+            <a:tailEnd type="triangle"/>
+          </a:ln>
+        </p:spPr>
+        <p:style>
+          <a:lnRef idx="1">
+            <a:schemeClr val="accent1"/>
+          </a:lnRef>
+          <a:fillRef idx="0">
+            <a:schemeClr val="accent1"/>
+          </a:fillRef>
+          <a:effectRef idx="0">
+            <a:schemeClr val="accent1"/>
+          </a:effectRef>
+          <a:fontRef idx="minor">
+            <a:schemeClr val="tx1"/>
+          </a:fontRef>
+        </p:style>
+      </p:cxnSp>
+      <p:cxnSp>
+        <p:nvCxnSpPr>
+          <p:cNvPr id="8" name="Connecteur droit avec flèche 7">
+            <a:extLst>
+              <a:ext uri="{FF2B5EF4-FFF2-40B4-BE49-F238E27FC236}">
+                <a16:creationId xmlns:a16="http://schemas.microsoft.com/office/drawing/2014/main" id="{53D696E9-A257-E150-14A8-D2D64BF39073}"/>
+              </a:ext>
+            </a:extLst>
+          </p:cNvPr>
+          <p:cNvCxnSpPr/>
+          <p:nvPr/>
+        </p:nvCxnSpPr>
+        <p:spPr>
+          <a:xfrm>
+            <a:off x="4753230" y="748802"/>
+            <a:ext cx="0" cy="1074656"/>
+          </a:xfrm>
+          <a:prstGeom prst="straightConnector1">
+            <a:avLst/>
+          </a:prstGeom>
+          <a:ln w="38100">
+            <a:solidFill>
+              <a:schemeClr val="tx1"/>
+            </a:solidFill>
+            <a:tailEnd type="triangle"/>
+          </a:ln>
+        </p:spPr>
+        <p:style>
+          <a:lnRef idx="1">
+            <a:schemeClr val="accent1"/>
+          </a:lnRef>
+          <a:fillRef idx="0">
+            <a:schemeClr val="accent1"/>
+          </a:fillRef>
+          <a:effectRef idx="0">
+            <a:schemeClr val="accent1"/>
+          </a:effectRef>
+          <a:fontRef idx="minor">
+            <a:schemeClr val="tx1"/>
+          </a:fontRef>
+        </p:style>
+      </p:cxnSp>
+      <p:cxnSp>
+        <p:nvCxnSpPr>
+          <p:cNvPr id="10" name="Connecteur droit 9">
+            <a:extLst>
+              <a:ext uri="{FF2B5EF4-FFF2-40B4-BE49-F238E27FC236}">
+                <a16:creationId xmlns:a16="http://schemas.microsoft.com/office/drawing/2014/main" id="{1461492B-30E9-14D3-4B67-A7AB21C72095}"/>
+              </a:ext>
+            </a:extLst>
+          </p:cNvPr>
+          <p:cNvCxnSpPr/>
+          <p:nvPr/>
+        </p:nvCxnSpPr>
+        <p:spPr>
+          <a:xfrm>
+            <a:off x="3789576" y="1199953"/>
+            <a:ext cx="0" cy="1583703"/>
+          </a:xfrm>
+          <a:prstGeom prst="line">
+            <a:avLst/>
+          </a:prstGeom>
+          <a:ln w="76200">
+            <a:solidFill>
+              <a:srgbClr val="C00000"/>
+            </a:solidFill>
+          </a:ln>
+        </p:spPr>
+        <p:style>
+          <a:lnRef idx="1">
+            <a:schemeClr val="accent1"/>
+          </a:lnRef>
+          <a:fillRef idx="0">
+            <a:schemeClr val="accent1"/>
+          </a:fillRef>
+          <a:effectRef idx="0">
+            <a:schemeClr val="accent1"/>
+          </a:effectRef>
+          <a:fontRef idx="minor">
+            <a:schemeClr val="tx1"/>
+          </a:fontRef>
+        </p:style>
+      </p:cxnSp>
+      <p:cxnSp>
+        <p:nvCxnSpPr>
+          <p:cNvPr id="12" name="Connecteur droit 11">
+            <a:extLst>
+              <a:ext uri="{FF2B5EF4-FFF2-40B4-BE49-F238E27FC236}">
+                <a16:creationId xmlns:a16="http://schemas.microsoft.com/office/drawing/2014/main" id="{9DA77857-9345-9C55-EC4E-BC52E4F7EBA1}"/>
+              </a:ext>
+            </a:extLst>
+          </p:cNvPr>
+          <p:cNvCxnSpPr/>
+          <p:nvPr/>
+        </p:nvCxnSpPr>
+        <p:spPr>
+          <a:xfrm>
+            <a:off x="5549796" y="1199953"/>
+            <a:ext cx="0" cy="1583703"/>
+          </a:xfrm>
+          <a:prstGeom prst="line">
+            <a:avLst/>
+          </a:prstGeom>
+          <a:ln w="76200">
+            <a:solidFill>
+              <a:srgbClr val="92D050"/>
+            </a:solidFill>
+          </a:ln>
+        </p:spPr>
+        <p:style>
+          <a:lnRef idx="1">
+            <a:schemeClr val="accent1"/>
+          </a:lnRef>
+          <a:fillRef idx="0">
+            <a:schemeClr val="accent1"/>
+          </a:fillRef>
+          <a:effectRef idx="0">
+            <a:schemeClr val="accent1"/>
+          </a:effectRef>
+          <a:fontRef idx="minor">
+            <a:schemeClr val="tx1"/>
+          </a:fontRef>
+        </p:style>
+      </p:cxnSp>
+      <p:sp>
+        <p:nvSpPr>
+          <p:cNvPr id="13" name="ZoneTexte 12">
+            <a:extLst>
+              <a:ext uri="{FF2B5EF4-FFF2-40B4-BE49-F238E27FC236}">
+                <a16:creationId xmlns:a16="http://schemas.microsoft.com/office/drawing/2014/main" id="{3CEDE262-9D4C-7F42-0C0A-790346E96373}"/>
+              </a:ext>
+            </a:extLst>
+          </p:cNvPr>
+          <p:cNvSpPr txBox="1"/>
+          <p:nvPr/>
+        </p:nvSpPr>
+        <p:spPr>
+          <a:xfrm>
+            <a:off x="4648200" y="520909"/>
+            <a:ext cx="1207382" cy="276999"/>
+          </a:xfrm>
+          <a:prstGeom prst="rect">
+            <a:avLst/>
+          </a:prstGeom>
+          <a:noFill/>
+        </p:spPr>
+        <p:txBody>
+          <a:bodyPr wrap="none" rtlCol="0">
+            <a:spAutoFit/>
+          </a:bodyPr>
+          <a:lstStyle/>
+          <a:p>
+            <a:r>
+              <a:rPr lang="fr-FR" sz="1200" dirty="0">
+                <a:latin typeface="Courier New" panose="02070309020205020404" pitchFamily="49" charset="0"/>
+                <a:cs typeface="Courier New" panose="02070309020205020404" pitchFamily="49" charset="0"/>
+              </a:rPr>
+              <a:t>Return Time</a:t>
+            </a:r>
+          </a:p>
+        </p:txBody>
+      </p:sp>
+      <p:sp>
+        <p:nvSpPr>
+          <p:cNvPr id="14" name="ZoneTexte 13">
+            <a:extLst>
+              <a:ext uri="{FF2B5EF4-FFF2-40B4-BE49-F238E27FC236}">
+                <a16:creationId xmlns:a16="http://schemas.microsoft.com/office/drawing/2014/main" id="{4B2711C6-E93E-A998-96E4-6C08DBC1A816}"/>
+              </a:ext>
+            </a:extLst>
+          </p:cNvPr>
+          <p:cNvSpPr txBox="1"/>
+          <p:nvPr/>
+        </p:nvSpPr>
+        <p:spPr>
+          <a:xfrm>
+            <a:off x="5173980" y="2826048"/>
+            <a:ext cx="742511" cy="276999"/>
+          </a:xfrm>
+          <a:prstGeom prst="rect">
+            <a:avLst/>
+          </a:prstGeom>
+          <a:noFill/>
+        </p:spPr>
+        <p:txBody>
+          <a:bodyPr wrap="none" rtlCol="0">
+            <a:spAutoFit/>
+          </a:bodyPr>
+          <a:lstStyle/>
+          <a:p>
+            <a:r>
+              <a:rPr lang="fr-FR" sz="1200" dirty="0">
+                <a:latin typeface="Courier New" panose="02070309020205020404" pitchFamily="49" charset="0"/>
+                <a:cs typeface="Courier New" panose="02070309020205020404" pitchFamily="49" charset="0"/>
+              </a:rPr>
+              <a:t>Time ∆</a:t>
+            </a:r>
+          </a:p>
+        </p:txBody>
+      </p:sp>
+      <p:cxnSp>
+        <p:nvCxnSpPr>
+          <p:cNvPr id="16" name="Connecteur droit avec flèche 15">
+            <a:extLst>
+              <a:ext uri="{FF2B5EF4-FFF2-40B4-BE49-F238E27FC236}">
+                <a16:creationId xmlns:a16="http://schemas.microsoft.com/office/drawing/2014/main" id="{1C501005-199D-04BE-9B33-319FC66165D3}"/>
+              </a:ext>
+            </a:extLst>
+          </p:cNvPr>
+          <p:cNvCxnSpPr>
+            <a:cxnSpLocks/>
+          </p:cNvCxnSpPr>
+          <p:nvPr/>
+        </p:nvCxnSpPr>
+        <p:spPr>
+          <a:xfrm>
+            <a:off x="3924300" y="1402080"/>
+            <a:ext cx="723900" cy="0"/>
+          </a:xfrm>
+          <a:prstGeom prst="straightConnector1">
+            <a:avLst/>
+          </a:prstGeom>
+          <a:ln>
+            <a:headEnd type="triangle"/>
+            <a:tailEnd type="triangle"/>
+          </a:ln>
+        </p:spPr>
+        <p:style>
+          <a:lnRef idx="1">
+            <a:schemeClr val="accent1"/>
+          </a:lnRef>
+          <a:fillRef idx="0">
+            <a:schemeClr val="accent1"/>
+          </a:fillRef>
+          <a:effectRef idx="0">
+            <a:schemeClr val="accent1"/>
+          </a:effectRef>
+          <a:fontRef idx="minor">
+            <a:schemeClr val="tx1"/>
+          </a:fontRef>
+        </p:style>
+      </p:cxnSp>
+      <p:sp>
+        <p:nvSpPr>
+          <p:cNvPr id="17" name="ZoneTexte 16">
+            <a:extLst>
+              <a:ext uri="{FF2B5EF4-FFF2-40B4-BE49-F238E27FC236}">
+                <a16:creationId xmlns:a16="http://schemas.microsoft.com/office/drawing/2014/main" id="{25628DB1-D95E-C931-B0CB-1FDE2E4AF51A}"/>
+              </a:ext>
+            </a:extLst>
+          </p:cNvPr>
+          <p:cNvSpPr txBox="1"/>
+          <p:nvPr/>
+        </p:nvSpPr>
+        <p:spPr>
+          <a:xfrm>
+            <a:off x="3969101" y="1071133"/>
+            <a:ext cx="649537" cy="276999"/>
+          </a:xfrm>
+          <a:prstGeom prst="rect">
+            <a:avLst/>
+          </a:prstGeom>
+          <a:noFill/>
+        </p:spPr>
+        <p:txBody>
+          <a:bodyPr wrap="none" rtlCol="0">
+            <a:spAutoFit/>
+          </a:bodyPr>
+          <a:lstStyle/>
+          <a:p>
+            <a:r>
+              <a:rPr lang="fr-FR" sz="1200" dirty="0">
+                <a:latin typeface="Courier New" panose="02070309020205020404" pitchFamily="49" charset="0"/>
+                <a:cs typeface="Courier New" panose="02070309020205020404" pitchFamily="49" charset="0"/>
+              </a:rPr>
+              <a:t>Delay</a:t>
+            </a:r>
+          </a:p>
+        </p:txBody>
+      </p:sp>
+      <p:sp>
+        <p:nvSpPr>
+          <p:cNvPr id="18" name="ZoneTexte 17">
+            <a:extLst>
+              <a:ext uri="{FF2B5EF4-FFF2-40B4-BE49-F238E27FC236}">
+                <a16:creationId xmlns:a16="http://schemas.microsoft.com/office/drawing/2014/main" id="{08C4FBDB-8965-E9BE-0584-C82D2C367616}"/>
+              </a:ext>
+            </a:extLst>
+          </p:cNvPr>
+          <p:cNvSpPr txBox="1"/>
+          <p:nvPr/>
+        </p:nvSpPr>
+        <p:spPr>
+          <a:xfrm>
+            <a:off x="3311334" y="2826048"/>
+            <a:ext cx="928459" cy="276999"/>
+          </a:xfrm>
+          <a:prstGeom prst="rect">
+            <a:avLst/>
+          </a:prstGeom>
+          <a:noFill/>
+        </p:spPr>
+        <p:txBody>
+          <a:bodyPr wrap="none" rtlCol="0">
+            <a:spAutoFit/>
+          </a:bodyPr>
+          <a:lstStyle/>
+          <a:p>
+            <a:r>
+              <a:rPr lang="fr-FR" sz="1200" dirty="0">
+                <a:latin typeface="Courier New" panose="02070309020205020404" pitchFamily="49" charset="0"/>
+                <a:cs typeface="Courier New" panose="02070309020205020404" pitchFamily="49" charset="0"/>
+              </a:rPr>
+              <a:t>Checkout</a:t>
+            </a:r>
+          </a:p>
+        </p:txBody>
+      </p:sp>
+      <p:cxnSp>
+        <p:nvCxnSpPr>
+          <p:cNvPr id="21" name="Connecteur droit avec flèche 20">
+            <a:extLst>
+              <a:ext uri="{FF2B5EF4-FFF2-40B4-BE49-F238E27FC236}">
+                <a16:creationId xmlns:a16="http://schemas.microsoft.com/office/drawing/2014/main" id="{81523577-FD19-D04F-3F30-57B4E540E5E3}"/>
+              </a:ext>
+            </a:extLst>
+          </p:cNvPr>
+          <p:cNvCxnSpPr>
+            <a:cxnSpLocks/>
+          </p:cNvCxnSpPr>
+          <p:nvPr/>
+        </p:nvCxnSpPr>
+        <p:spPr>
+          <a:xfrm>
+            <a:off x="2966376" y="4947217"/>
+            <a:ext cx="8007842" cy="0"/>
+          </a:xfrm>
+          <a:prstGeom prst="straightConnector1">
+            <a:avLst/>
+          </a:prstGeom>
+          <a:ln w="76200">
+            <a:tailEnd type="triangle"/>
+          </a:ln>
+        </p:spPr>
+        <p:style>
+          <a:lnRef idx="1">
+            <a:schemeClr val="accent1"/>
+          </a:lnRef>
+          <a:fillRef idx="0">
+            <a:schemeClr val="accent1"/>
+          </a:fillRef>
+          <a:effectRef idx="0">
+            <a:schemeClr val="accent1"/>
+          </a:effectRef>
+          <a:fontRef idx="minor">
+            <a:schemeClr val="tx1"/>
+          </a:fontRef>
+        </p:style>
+      </p:cxnSp>
+      <p:cxnSp>
+        <p:nvCxnSpPr>
+          <p:cNvPr id="22" name="Connecteur droit avec flèche 21">
+            <a:extLst>
+              <a:ext uri="{FF2B5EF4-FFF2-40B4-BE49-F238E27FC236}">
+                <a16:creationId xmlns:a16="http://schemas.microsoft.com/office/drawing/2014/main" id="{4BC151CE-11AA-0B7F-6099-435D4C9F4439}"/>
+              </a:ext>
+            </a:extLst>
+          </p:cNvPr>
+          <p:cNvCxnSpPr/>
+          <p:nvPr/>
+        </p:nvCxnSpPr>
+        <p:spPr>
+          <a:xfrm>
+            <a:off x="4717326" y="3735813"/>
+            <a:ext cx="0" cy="1074656"/>
+          </a:xfrm>
+          <a:prstGeom prst="straightConnector1">
+            <a:avLst/>
+          </a:prstGeom>
+          <a:ln w="38100">
+            <a:solidFill>
+              <a:schemeClr val="tx1"/>
+            </a:solidFill>
+            <a:tailEnd type="triangle"/>
+          </a:ln>
+        </p:spPr>
+        <p:style>
+          <a:lnRef idx="1">
+            <a:schemeClr val="accent1"/>
+          </a:lnRef>
+          <a:fillRef idx="0">
+            <a:schemeClr val="accent1"/>
+          </a:fillRef>
+          <a:effectRef idx="0">
+            <a:schemeClr val="accent1"/>
+          </a:effectRef>
+          <a:fontRef idx="minor">
+            <a:schemeClr val="tx1"/>
+          </a:fontRef>
+        </p:style>
+      </p:cxnSp>
+      <p:cxnSp>
+        <p:nvCxnSpPr>
+          <p:cNvPr id="23" name="Connecteur droit 22">
+            <a:extLst>
+              <a:ext uri="{FF2B5EF4-FFF2-40B4-BE49-F238E27FC236}">
+                <a16:creationId xmlns:a16="http://schemas.microsoft.com/office/drawing/2014/main" id="{A5668EAF-C4E9-1377-8E78-81FD6D03B64F}"/>
+              </a:ext>
+            </a:extLst>
+          </p:cNvPr>
+          <p:cNvCxnSpPr/>
+          <p:nvPr/>
+        </p:nvCxnSpPr>
+        <p:spPr>
+          <a:xfrm>
+            <a:off x="3753672" y="4186964"/>
+            <a:ext cx="0" cy="1583703"/>
+          </a:xfrm>
+          <a:prstGeom prst="line">
+            <a:avLst/>
+          </a:prstGeom>
+          <a:ln w="76200">
+            <a:solidFill>
+              <a:srgbClr val="C00000"/>
+            </a:solidFill>
+          </a:ln>
+        </p:spPr>
+        <p:style>
+          <a:lnRef idx="1">
+            <a:schemeClr val="accent1"/>
+          </a:lnRef>
+          <a:fillRef idx="0">
+            <a:schemeClr val="accent1"/>
+          </a:fillRef>
+          <a:effectRef idx="0">
+            <a:schemeClr val="accent1"/>
+          </a:effectRef>
+          <a:fontRef idx="minor">
+            <a:schemeClr val="tx1"/>
+          </a:fontRef>
+        </p:style>
+      </p:cxnSp>
+      <p:sp>
+        <p:nvSpPr>
+          <p:cNvPr id="24" name="Rectangle 23">
+            <a:extLst>
+              <a:ext uri="{FF2B5EF4-FFF2-40B4-BE49-F238E27FC236}">
+                <a16:creationId xmlns:a16="http://schemas.microsoft.com/office/drawing/2014/main" id="{BADBBA3C-DB58-D898-6824-CCA97D779206}"/>
+              </a:ext>
+            </a:extLst>
+          </p:cNvPr>
+          <p:cNvSpPr/>
+          <p:nvPr/>
+        </p:nvSpPr>
+        <p:spPr>
+          <a:xfrm>
+            <a:off x="5549796" y="4981480"/>
+            <a:ext cx="2686639" cy="339362"/>
+          </a:xfrm>
+          <a:prstGeom prst="rect">
+            <a:avLst/>
+          </a:prstGeom>
+          <a:solidFill>
+            <a:schemeClr val="accent2"/>
+          </a:solidFill>
+          <a:ln>
+            <a:noFill/>
+          </a:ln>
+        </p:spPr>
+        <p:style>
+          <a:lnRef idx="2">
+            <a:schemeClr val="accent6">
+              <a:shade val="15000"/>
+            </a:schemeClr>
+          </a:lnRef>
+          <a:fillRef idx="1">
+            <a:schemeClr val="accent6"/>
+          </a:fillRef>
+          <a:effectRef idx="0">
+            <a:schemeClr val="accent6"/>
+          </a:effectRef>
+          <a:fontRef idx="minor">
+            <a:schemeClr val="lt1"/>
+          </a:fontRef>
+        </p:style>
+        <p:txBody>
+          <a:bodyPr rtlCol="0" anchor="ctr"/>
+          <a:lstStyle/>
+          <a:p>
+            <a:pPr algn="ctr"/>
+            <a:r>
+              <a:rPr lang="fr-FR" sz="1200" dirty="0">
+                <a:latin typeface="Courier New" panose="02070309020205020404" pitchFamily="49" charset="0"/>
+                <a:cs typeface="Courier New" panose="02070309020205020404" pitchFamily="49" charset="0"/>
+              </a:rPr>
+              <a:t>Threshold</a:t>
+            </a:r>
+          </a:p>
+        </p:txBody>
+      </p:sp>
+      <p:cxnSp>
+        <p:nvCxnSpPr>
+          <p:cNvPr id="25" name="Connecteur droit 24">
+            <a:extLst>
+              <a:ext uri="{FF2B5EF4-FFF2-40B4-BE49-F238E27FC236}">
+                <a16:creationId xmlns:a16="http://schemas.microsoft.com/office/drawing/2014/main" id="{61B12A27-6F20-C959-CBA6-CD8D504D3F1E}"/>
+              </a:ext>
+            </a:extLst>
+          </p:cNvPr>
+          <p:cNvCxnSpPr/>
+          <p:nvPr/>
+        </p:nvCxnSpPr>
+        <p:spPr>
+          <a:xfrm>
+            <a:off x="5513892" y="4186964"/>
+            <a:ext cx="0" cy="1583703"/>
+          </a:xfrm>
+          <a:prstGeom prst="line">
+            <a:avLst/>
+          </a:prstGeom>
+          <a:ln w="76200">
+            <a:solidFill>
+              <a:srgbClr val="92D050"/>
+            </a:solidFill>
+          </a:ln>
+        </p:spPr>
+        <p:style>
+          <a:lnRef idx="1">
+            <a:schemeClr val="accent1"/>
+          </a:lnRef>
+          <a:fillRef idx="0">
+            <a:schemeClr val="accent1"/>
+          </a:fillRef>
+          <a:effectRef idx="0">
+            <a:schemeClr val="accent1"/>
+          </a:effectRef>
+          <a:fontRef idx="minor">
+            <a:schemeClr val="tx1"/>
+          </a:fontRef>
+        </p:style>
+      </p:cxnSp>
+      <p:sp>
+        <p:nvSpPr>
+          <p:cNvPr id="26" name="ZoneTexte 25">
+            <a:extLst>
+              <a:ext uri="{FF2B5EF4-FFF2-40B4-BE49-F238E27FC236}">
+                <a16:creationId xmlns:a16="http://schemas.microsoft.com/office/drawing/2014/main" id="{AAD1B239-CD5F-66C8-5247-38641FC9475E}"/>
+              </a:ext>
+            </a:extLst>
+          </p:cNvPr>
+          <p:cNvSpPr txBox="1"/>
+          <p:nvPr/>
+        </p:nvSpPr>
+        <p:spPr>
+          <a:xfrm>
+            <a:off x="4612296" y="3507920"/>
+            <a:ext cx="1207382" cy="276999"/>
+          </a:xfrm>
+          <a:prstGeom prst="rect">
+            <a:avLst/>
+          </a:prstGeom>
+          <a:noFill/>
+        </p:spPr>
+        <p:txBody>
+          <a:bodyPr wrap="none" rtlCol="0">
+            <a:spAutoFit/>
+          </a:bodyPr>
+          <a:lstStyle/>
+          <a:p>
+            <a:r>
+              <a:rPr lang="fr-FR" sz="1200" dirty="0">
+                <a:latin typeface="Courier New" panose="02070309020205020404" pitchFamily="49" charset="0"/>
+                <a:cs typeface="Courier New" panose="02070309020205020404" pitchFamily="49" charset="0"/>
+              </a:rPr>
+              <a:t>Return Time</a:t>
+            </a:r>
+          </a:p>
+        </p:txBody>
+      </p:sp>
+      <p:sp>
+        <p:nvSpPr>
+          <p:cNvPr id="27" name="ZoneTexte 26">
+            <a:extLst>
+              <a:ext uri="{FF2B5EF4-FFF2-40B4-BE49-F238E27FC236}">
+                <a16:creationId xmlns:a16="http://schemas.microsoft.com/office/drawing/2014/main" id="{0F3C8F11-8C60-8632-E3CC-B3BC9CA83199}"/>
+              </a:ext>
+            </a:extLst>
+          </p:cNvPr>
+          <p:cNvSpPr txBox="1"/>
+          <p:nvPr/>
+        </p:nvSpPr>
+        <p:spPr>
+          <a:xfrm>
+            <a:off x="5138076" y="5813059"/>
+            <a:ext cx="742511" cy="276999"/>
+          </a:xfrm>
+          <a:prstGeom prst="rect">
+            <a:avLst/>
+          </a:prstGeom>
+          <a:noFill/>
+        </p:spPr>
+        <p:txBody>
+          <a:bodyPr wrap="none" rtlCol="0">
+            <a:spAutoFit/>
+          </a:bodyPr>
+          <a:lstStyle/>
+          <a:p>
+            <a:r>
+              <a:rPr lang="fr-FR" sz="1200" dirty="0">
+                <a:latin typeface="Courier New" panose="02070309020205020404" pitchFamily="49" charset="0"/>
+                <a:cs typeface="Courier New" panose="02070309020205020404" pitchFamily="49" charset="0"/>
+              </a:rPr>
+              <a:t>Time ∆</a:t>
+            </a:r>
+          </a:p>
+        </p:txBody>
+      </p:sp>
+      <p:cxnSp>
+        <p:nvCxnSpPr>
+          <p:cNvPr id="28" name="Connecteur droit avec flèche 27">
+            <a:extLst>
+              <a:ext uri="{FF2B5EF4-FFF2-40B4-BE49-F238E27FC236}">
+                <a16:creationId xmlns:a16="http://schemas.microsoft.com/office/drawing/2014/main" id="{04A48406-9438-F992-B86A-1B252122AFFD}"/>
+              </a:ext>
+            </a:extLst>
+          </p:cNvPr>
+          <p:cNvCxnSpPr>
+            <a:cxnSpLocks/>
+          </p:cNvCxnSpPr>
+          <p:nvPr/>
+        </p:nvCxnSpPr>
+        <p:spPr>
+          <a:xfrm>
+            <a:off x="3888396" y="4389091"/>
+            <a:ext cx="723900" cy="0"/>
+          </a:xfrm>
+          <a:prstGeom prst="straightConnector1">
+            <a:avLst/>
+          </a:prstGeom>
+          <a:ln>
+            <a:headEnd type="triangle"/>
+            <a:tailEnd type="triangle"/>
+          </a:ln>
+        </p:spPr>
+        <p:style>
+          <a:lnRef idx="1">
+            <a:schemeClr val="accent1"/>
+          </a:lnRef>
+          <a:fillRef idx="0">
+            <a:schemeClr val="accent1"/>
+          </a:fillRef>
+          <a:effectRef idx="0">
+            <a:schemeClr val="accent1"/>
+          </a:effectRef>
+          <a:fontRef idx="minor">
+            <a:schemeClr val="tx1"/>
+          </a:fontRef>
+        </p:style>
+      </p:cxnSp>
+      <p:sp>
+        <p:nvSpPr>
+          <p:cNvPr id="29" name="ZoneTexte 28">
+            <a:extLst>
+              <a:ext uri="{FF2B5EF4-FFF2-40B4-BE49-F238E27FC236}">
+                <a16:creationId xmlns:a16="http://schemas.microsoft.com/office/drawing/2014/main" id="{97373761-9646-7E85-1CDF-4DBD1BE2C894}"/>
+              </a:ext>
+            </a:extLst>
+          </p:cNvPr>
+          <p:cNvSpPr txBox="1"/>
+          <p:nvPr/>
+        </p:nvSpPr>
+        <p:spPr>
+          <a:xfrm>
+            <a:off x="3933197" y="4058144"/>
+            <a:ext cx="649537" cy="276999"/>
+          </a:xfrm>
+          <a:prstGeom prst="rect">
+            <a:avLst/>
+          </a:prstGeom>
+          <a:noFill/>
+        </p:spPr>
+        <p:txBody>
+          <a:bodyPr wrap="none" rtlCol="0">
+            <a:spAutoFit/>
+          </a:bodyPr>
+          <a:lstStyle/>
+          <a:p>
+            <a:r>
+              <a:rPr lang="fr-FR" sz="1200" dirty="0">
+                <a:latin typeface="Courier New" panose="02070309020205020404" pitchFamily="49" charset="0"/>
+                <a:cs typeface="Courier New" panose="02070309020205020404" pitchFamily="49" charset="0"/>
+              </a:rPr>
+              <a:t>Delay</a:t>
+            </a:r>
+          </a:p>
+        </p:txBody>
+      </p:sp>
+      <p:sp>
+        <p:nvSpPr>
+          <p:cNvPr id="30" name="ZoneTexte 29">
+            <a:extLst>
+              <a:ext uri="{FF2B5EF4-FFF2-40B4-BE49-F238E27FC236}">
+                <a16:creationId xmlns:a16="http://schemas.microsoft.com/office/drawing/2014/main" id="{C775230C-72ED-B11C-2532-67F855A50469}"/>
+              </a:ext>
+            </a:extLst>
+          </p:cNvPr>
+          <p:cNvSpPr txBox="1"/>
+          <p:nvPr/>
+        </p:nvSpPr>
+        <p:spPr>
+          <a:xfrm>
+            <a:off x="3275430" y="5813059"/>
+            <a:ext cx="928459" cy="276999"/>
+          </a:xfrm>
+          <a:prstGeom prst="rect">
+            <a:avLst/>
+          </a:prstGeom>
+          <a:noFill/>
+        </p:spPr>
+        <p:txBody>
+          <a:bodyPr wrap="none" rtlCol="0">
+            <a:spAutoFit/>
+          </a:bodyPr>
+          <a:lstStyle/>
+          <a:p>
+            <a:r>
+              <a:rPr lang="fr-FR" sz="1200" dirty="0">
+                <a:latin typeface="Courier New" panose="02070309020205020404" pitchFamily="49" charset="0"/>
+                <a:cs typeface="Courier New" panose="02070309020205020404" pitchFamily="49" charset="0"/>
+              </a:rPr>
+              <a:t>Checkout</a:t>
+            </a:r>
+          </a:p>
+        </p:txBody>
+      </p:sp>
+      <p:cxnSp>
+        <p:nvCxnSpPr>
+          <p:cNvPr id="31" name="Connecteur droit avec flèche 30">
+            <a:extLst>
+              <a:ext uri="{FF2B5EF4-FFF2-40B4-BE49-F238E27FC236}">
+                <a16:creationId xmlns:a16="http://schemas.microsoft.com/office/drawing/2014/main" id="{8AC3B853-9E2C-2D89-88CA-A5B4D5D7B4B2}"/>
+              </a:ext>
+            </a:extLst>
+          </p:cNvPr>
+          <p:cNvCxnSpPr/>
+          <p:nvPr/>
+        </p:nvCxnSpPr>
+        <p:spPr>
+          <a:xfrm>
+            <a:off x="6995706" y="3751194"/>
+            <a:ext cx="0" cy="1074656"/>
+          </a:xfrm>
+          <a:prstGeom prst="straightConnector1">
+            <a:avLst/>
+          </a:prstGeom>
+          <a:ln w="38100">
+            <a:solidFill>
+              <a:schemeClr val="tx1"/>
+            </a:solidFill>
+            <a:tailEnd type="triangle"/>
+          </a:ln>
+        </p:spPr>
+        <p:style>
+          <a:lnRef idx="1">
+            <a:schemeClr val="accent1"/>
+          </a:lnRef>
+          <a:fillRef idx="0">
+            <a:schemeClr val="accent1"/>
+          </a:fillRef>
+          <a:effectRef idx="0">
+            <a:schemeClr val="accent1"/>
+          </a:effectRef>
+          <a:fontRef idx="minor">
+            <a:schemeClr val="tx1"/>
+          </a:fontRef>
+        </p:style>
+      </p:cxnSp>
+      <p:sp>
+        <p:nvSpPr>
+          <p:cNvPr id="32" name="ZoneTexte 31">
+            <a:extLst>
+              <a:ext uri="{FF2B5EF4-FFF2-40B4-BE49-F238E27FC236}">
+                <a16:creationId xmlns:a16="http://schemas.microsoft.com/office/drawing/2014/main" id="{34BDCDB2-F20B-FD27-E7E3-E43D6DE7388E}"/>
+              </a:ext>
+            </a:extLst>
+          </p:cNvPr>
+          <p:cNvSpPr txBox="1"/>
+          <p:nvPr/>
+        </p:nvSpPr>
+        <p:spPr>
+          <a:xfrm>
+            <a:off x="6890676" y="3523301"/>
+            <a:ext cx="1207382" cy="276999"/>
+          </a:xfrm>
+          <a:prstGeom prst="rect">
+            <a:avLst/>
+          </a:prstGeom>
+          <a:noFill/>
+        </p:spPr>
+        <p:txBody>
+          <a:bodyPr wrap="none" rtlCol="0">
+            <a:spAutoFit/>
+          </a:bodyPr>
+          <a:lstStyle/>
+          <a:p>
+            <a:r>
+              <a:rPr lang="fr-FR" sz="1200" dirty="0">
+                <a:latin typeface="Courier New" panose="02070309020205020404" pitchFamily="49" charset="0"/>
+                <a:cs typeface="Courier New" panose="02070309020205020404" pitchFamily="49" charset="0"/>
+              </a:rPr>
+              <a:t>Return Time</a:t>
+            </a:r>
+          </a:p>
+        </p:txBody>
+      </p:sp>
+      <p:cxnSp>
+        <p:nvCxnSpPr>
+          <p:cNvPr id="33" name="Connecteur droit avec flèche 32">
+            <a:extLst>
+              <a:ext uri="{FF2B5EF4-FFF2-40B4-BE49-F238E27FC236}">
+                <a16:creationId xmlns:a16="http://schemas.microsoft.com/office/drawing/2014/main" id="{30E18593-59EB-BDF3-80EA-8C14032AA45A}"/>
+              </a:ext>
+            </a:extLst>
+          </p:cNvPr>
+          <p:cNvCxnSpPr/>
+          <p:nvPr/>
+        </p:nvCxnSpPr>
+        <p:spPr>
+          <a:xfrm>
+            <a:off x="9053106" y="3751194"/>
+            <a:ext cx="0" cy="1074656"/>
+          </a:xfrm>
+          <a:prstGeom prst="straightConnector1">
+            <a:avLst/>
+          </a:prstGeom>
+          <a:ln w="38100">
+            <a:solidFill>
+              <a:schemeClr val="tx1"/>
+            </a:solidFill>
+            <a:tailEnd type="triangle"/>
+          </a:ln>
+        </p:spPr>
+        <p:style>
+          <a:lnRef idx="1">
+            <a:schemeClr val="accent1"/>
+          </a:lnRef>
+          <a:fillRef idx="0">
+            <a:schemeClr val="accent1"/>
+          </a:fillRef>
+          <a:effectRef idx="0">
+            <a:schemeClr val="accent1"/>
+          </a:effectRef>
+          <a:fontRef idx="minor">
+            <a:schemeClr val="tx1"/>
+          </a:fontRef>
+        </p:style>
+      </p:cxnSp>
+      <p:sp>
+        <p:nvSpPr>
+          <p:cNvPr id="34" name="ZoneTexte 33">
+            <a:extLst>
+              <a:ext uri="{FF2B5EF4-FFF2-40B4-BE49-F238E27FC236}">
+                <a16:creationId xmlns:a16="http://schemas.microsoft.com/office/drawing/2014/main" id="{CAFCA1A0-F0BA-9899-5CBF-6E88EDB24470}"/>
+              </a:ext>
+            </a:extLst>
+          </p:cNvPr>
+          <p:cNvSpPr txBox="1"/>
+          <p:nvPr/>
+        </p:nvSpPr>
+        <p:spPr>
+          <a:xfrm>
+            <a:off x="8948076" y="3523301"/>
+            <a:ext cx="1207382" cy="276999"/>
+          </a:xfrm>
+          <a:prstGeom prst="rect">
+            <a:avLst/>
+          </a:prstGeom>
+          <a:noFill/>
+        </p:spPr>
+        <p:txBody>
+          <a:bodyPr wrap="none" rtlCol="0">
+            <a:spAutoFit/>
+          </a:bodyPr>
+          <a:lstStyle/>
+          <a:p>
+            <a:r>
+              <a:rPr lang="fr-FR" sz="1200" dirty="0">
+                <a:latin typeface="Courier New" panose="02070309020205020404" pitchFamily="49" charset="0"/>
+                <a:cs typeface="Courier New" panose="02070309020205020404" pitchFamily="49" charset="0"/>
+              </a:rPr>
+              <a:t>Return Time</a:t>
+            </a:r>
+          </a:p>
+        </p:txBody>
+      </p:sp>
+      <p:cxnSp>
+        <p:nvCxnSpPr>
+          <p:cNvPr id="35" name="Connecteur droit avec flèche 34">
+            <a:extLst>
+              <a:ext uri="{FF2B5EF4-FFF2-40B4-BE49-F238E27FC236}">
+                <a16:creationId xmlns:a16="http://schemas.microsoft.com/office/drawing/2014/main" id="{59E07000-C642-A948-9CD6-721F82EE2FA6}"/>
+              </a:ext>
+            </a:extLst>
+          </p:cNvPr>
+          <p:cNvCxnSpPr/>
+          <p:nvPr/>
+        </p:nvCxnSpPr>
+        <p:spPr>
+          <a:xfrm>
+            <a:off x="7100736" y="748802"/>
+            <a:ext cx="0" cy="1074656"/>
+          </a:xfrm>
+          <a:prstGeom prst="straightConnector1">
+            <a:avLst/>
+          </a:prstGeom>
+          <a:ln w="38100">
+            <a:solidFill>
+              <a:schemeClr val="tx1"/>
+            </a:solidFill>
+            <a:tailEnd type="triangle"/>
+          </a:ln>
+        </p:spPr>
+        <p:style>
+          <a:lnRef idx="1">
+            <a:schemeClr val="accent1"/>
+          </a:lnRef>
+          <a:fillRef idx="0">
+            <a:schemeClr val="accent1"/>
+          </a:fillRef>
+          <a:effectRef idx="0">
+            <a:schemeClr val="accent1"/>
+          </a:effectRef>
+          <a:fontRef idx="minor">
+            <a:schemeClr val="tx1"/>
+          </a:fontRef>
+        </p:style>
+      </p:cxnSp>
+      <p:sp>
+        <p:nvSpPr>
+          <p:cNvPr id="36" name="ZoneTexte 35">
+            <a:extLst>
+              <a:ext uri="{FF2B5EF4-FFF2-40B4-BE49-F238E27FC236}">
+                <a16:creationId xmlns:a16="http://schemas.microsoft.com/office/drawing/2014/main" id="{928554EF-5E4A-CE84-0556-0D865FC42DCB}"/>
+              </a:ext>
+            </a:extLst>
+          </p:cNvPr>
+          <p:cNvSpPr txBox="1"/>
+          <p:nvPr/>
+        </p:nvSpPr>
+        <p:spPr>
+          <a:xfrm>
+            <a:off x="6995706" y="520909"/>
+            <a:ext cx="1207382" cy="276999"/>
+          </a:xfrm>
+          <a:prstGeom prst="rect">
+            <a:avLst/>
+          </a:prstGeom>
+          <a:noFill/>
+        </p:spPr>
+        <p:txBody>
+          <a:bodyPr wrap="none" rtlCol="0">
+            <a:spAutoFit/>
+          </a:bodyPr>
+          <a:lstStyle/>
+          <a:p>
+            <a:r>
+              <a:rPr lang="fr-FR" sz="1200" dirty="0">
+                <a:latin typeface="Courier New" panose="02070309020205020404" pitchFamily="49" charset="0"/>
+                <a:cs typeface="Courier New" panose="02070309020205020404" pitchFamily="49" charset="0"/>
+              </a:rPr>
+              <a:t>Return Time</a:t>
+            </a:r>
+          </a:p>
+        </p:txBody>
+      </p:sp>
+    </p:spTree>
+    <p:extLst>
+      <p:ext uri="{BB962C8B-B14F-4D97-AF65-F5344CB8AC3E}">
+        <p14:creationId xmlns:p14="http://schemas.microsoft.com/office/powerpoint/2010/main" val="1373706002"/>
       </p:ext>
     </p:extLst>
   </p:cSld>

</xml_diff>

<commit_message>
EDA getaround terminée ?
</commit_message>
<xml_diff>
--- a/08_deployment/99_Project_getaround/01_getaround_project.pptx
+++ b/08_deployment/99_Project_getaround/01_getaround_project.pptx
@@ -5,7 +5,7 @@
     <p:sldMasterId id="2147483660" r:id="rId1"/>
   </p:sldMasterIdLst>
   <p:notesMasterIdLst>
-    <p:notesMasterId r:id="rId7"/>
+    <p:notesMasterId r:id="rId8"/>
   </p:notesMasterIdLst>
   <p:sldIdLst>
     <p:sldId id="256" r:id="rId2"/>
@@ -13,6 +13,7 @@
     <p:sldId id="257" r:id="rId4"/>
     <p:sldId id="263" r:id="rId5"/>
     <p:sldId id="264" r:id="rId6"/>
+    <p:sldId id="265" r:id="rId7"/>
   </p:sldIdLst>
   <p:sldSz cx="12192000" cy="6858000"/>
   <p:notesSz cx="6858000" cy="9144000"/>
@@ -122,7 +123,7 @@
 <file path=ppt/revisionInfo.xml><?xml version="1.0" encoding="utf-8"?>
 <p1510:revInfo xmlns:a="http://schemas.openxmlformats.org/drawingml/2006/main" xmlns:r="http://schemas.openxmlformats.org/officeDocument/2006/relationships" xmlns:p1510="http://schemas.microsoft.com/office/powerpoint/2015/10/main">
   <p1510:revLst>
-    <p1510:client id="{40F711FF-06EA-48FB-94E5-8AF9239032B0}" v="16" dt="2024-09-08T09:32:26.117"/>
+    <p1510:client id="{40F711FF-06EA-48FB-94E5-8AF9239032B0}" v="21" dt="2024-09-11T05:06:18.137"/>
   </p1510:revLst>
 </p1510:revInfo>
 </file>
@@ -659,7 +660,7 @@
   <pc:docChgLst>
     <pc:chgData name="Philippe Baucour" userId="5102170ae7533958" providerId="LiveId" clId="{40F711FF-06EA-48FB-94E5-8AF9239032B0}"/>
     <pc:docChg chg="undo custSel addSld modSld sldOrd">
-      <pc:chgData name="Philippe Baucour" userId="5102170ae7533958" providerId="LiveId" clId="{40F711FF-06EA-48FB-94E5-8AF9239032B0}" dt="2024-09-08T09:30:28.861" v="344" actId="1076"/>
+      <pc:chgData name="Philippe Baucour" userId="5102170ae7533958" providerId="LiveId" clId="{40F711FF-06EA-48FB-94E5-8AF9239032B0}" dt="2024-09-11T06:19:14.780" v="700" actId="167"/>
       <pc:docMkLst>
         <pc:docMk/>
       </pc:docMkLst>
@@ -708,7 +709,7 @@
         </pc:sldMkLst>
       </pc:sldChg>
       <pc:sldChg chg="addSp delSp modSp new mod modClrScheme chgLayout">
-        <pc:chgData name="Philippe Baucour" userId="5102170ae7533958" providerId="LiveId" clId="{40F711FF-06EA-48FB-94E5-8AF9239032B0}" dt="2024-09-08T09:30:28.861" v="344" actId="1076"/>
+        <pc:chgData name="Philippe Baucour" userId="5102170ae7533958" providerId="LiveId" clId="{40F711FF-06EA-48FB-94E5-8AF9239032B0}" dt="2024-09-11T06:19:14.780" v="700" actId="167"/>
         <pc:sldMkLst>
           <pc:docMk/>
           <pc:sldMk cId="1373706002" sldId="264"/>
@@ -730,13 +731,29 @@
           </ac:spMkLst>
         </pc:spChg>
         <pc:spChg chg="add mod ord">
-          <ac:chgData name="Philippe Baucour" userId="5102170ae7533958" providerId="LiveId" clId="{40F711FF-06EA-48FB-94E5-8AF9239032B0}" dt="2024-09-08T09:12:02.758" v="75" actId="20577"/>
+          <ac:chgData name="Philippe Baucour" userId="5102170ae7533958" providerId="LiveId" clId="{40F711FF-06EA-48FB-94E5-8AF9239032B0}" dt="2024-09-11T05:13:09.454" v="693" actId="167"/>
+          <ac:spMkLst>
+            <pc:docMk/>
+            <pc:sldMk cId="1373706002" sldId="264"/>
+            <ac:spMk id="3" creationId="{A0D54A11-9FCC-9D7A-C69A-C8AB026CEBF4}"/>
+          </ac:spMkLst>
+        </pc:spChg>
+        <pc:spChg chg="add mod ord">
+          <ac:chgData name="Philippe Baucour" userId="5102170ae7533958" providerId="LiveId" clId="{40F711FF-06EA-48FB-94E5-8AF9239032B0}" dt="2024-09-11T05:07:21.326" v="692" actId="20577"/>
           <ac:spMkLst>
             <pc:docMk/>
             <pc:sldMk cId="1373706002" sldId="264"/>
             <ac:spMk id="4" creationId="{EF2A8F15-8E22-7123-9084-834452AB8F63}"/>
           </ac:spMkLst>
         </pc:spChg>
+        <pc:spChg chg="add mod ord">
+          <ac:chgData name="Philippe Baucour" userId="5102170ae7533958" providerId="LiveId" clId="{40F711FF-06EA-48FB-94E5-8AF9239032B0}" dt="2024-09-11T05:13:16.914" v="695"/>
+          <ac:spMkLst>
+            <pc:docMk/>
+            <pc:sldMk cId="1373706002" sldId="264"/>
+            <ac:spMk id="9" creationId="{A05D6E0C-459A-8375-8C2F-EC30F32D46CF}"/>
+          </ac:spMkLst>
+        </pc:spChg>
         <pc:spChg chg="add del mod">
           <ac:chgData name="Philippe Baucour" userId="5102170ae7533958" providerId="LiveId" clId="{40F711FF-06EA-48FB-94E5-8AF9239032B0}" dt="2024-09-08T09:21:20.753" v="322" actId="478"/>
           <ac:spMkLst>
@@ -745,8 +762,8 @@
             <ac:spMk id="11" creationId="{B0B35840-6598-8A5C-A626-BE922457A29D}"/>
           </ac:spMkLst>
         </pc:spChg>
-        <pc:spChg chg="add mod">
-          <ac:chgData name="Philippe Baucour" userId="5102170ae7533958" providerId="LiveId" clId="{40F711FF-06EA-48FB-94E5-8AF9239032B0}" dt="2024-09-08T09:21:02.825" v="319" actId="1036"/>
+        <pc:spChg chg="add mod ord">
+          <ac:chgData name="Philippe Baucour" userId="5102170ae7533958" providerId="LiveId" clId="{40F711FF-06EA-48FB-94E5-8AF9239032B0}" dt="2024-09-11T05:13:14.178" v="694"/>
           <ac:spMkLst>
             <pc:docMk/>
             <pc:sldMk cId="1373706002" sldId="264"/>
@@ -754,7 +771,7 @@
           </ac:spMkLst>
         </pc:spChg>
         <pc:spChg chg="add mod">
-          <ac:chgData name="Philippe Baucour" userId="5102170ae7533958" providerId="LiveId" clId="{40F711FF-06EA-48FB-94E5-8AF9239032B0}" dt="2024-09-08T09:21:02.825" v="319" actId="1036"/>
+          <ac:chgData name="Philippe Baucour" userId="5102170ae7533958" providerId="LiveId" clId="{40F711FF-06EA-48FB-94E5-8AF9239032B0}" dt="2024-09-11T05:03:17.223" v="605" actId="1035"/>
           <ac:spMkLst>
             <pc:docMk/>
             <pc:sldMk cId="1373706002" sldId="264"/>
@@ -762,7 +779,7 @@
           </ac:spMkLst>
         </pc:spChg>
         <pc:spChg chg="add mod">
-          <ac:chgData name="Philippe Baucour" userId="5102170ae7533958" providerId="LiveId" clId="{40F711FF-06EA-48FB-94E5-8AF9239032B0}" dt="2024-09-08T09:21:02.825" v="319" actId="1036"/>
+          <ac:chgData name="Philippe Baucour" userId="5102170ae7533958" providerId="LiveId" clId="{40F711FF-06EA-48FB-94E5-8AF9239032B0}" dt="2024-09-11T05:04:22.936" v="654" actId="1035"/>
           <ac:spMkLst>
             <pc:docMk/>
             <pc:sldMk cId="1373706002" sldId="264"/>
@@ -770,71 +787,71 @@
           </ac:spMkLst>
         </pc:spChg>
         <pc:spChg chg="add mod">
-          <ac:chgData name="Philippe Baucour" userId="5102170ae7533958" providerId="LiveId" clId="{40F711FF-06EA-48FB-94E5-8AF9239032B0}" dt="2024-09-08T09:21:02.825" v="319" actId="1036"/>
+          <ac:chgData name="Philippe Baucour" userId="5102170ae7533958" providerId="LiveId" clId="{40F711FF-06EA-48FB-94E5-8AF9239032B0}" dt="2024-09-11T05:03:17.223" v="605" actId="1035"/>
           <ac:spMkLst>
             <pc:docMk/>
             <pc:sldMk cId="1373706002" sldId="264"/>
             <ac:spMk id="18" creationId="{08C4FBDB-8965-E9BE-0584-C82D2C367616}"/>
           </ac:spMkLst>
         </pc:spChg>
-        <pc:spChg chg="add mod">
-          <ac:chgData name="Philippe Baucour" userId="5102170ae7533958" providerId="LiveId" clId="{40F711FF-06EA-48FB-94E5-8AF9239032B0}" dt="2024-09-08T09:22:00.369" v="338" actId="404"/>
+        <pc:spChg chg="add del mod">
+          <ac:chgData name="Philippe Baucour" userId="5102170ae7533958" providerId="LiveId" clId="{40F711FF-06EA-48FB-94E5-8AF9239032B0}" dt="2024-09-11T04:59:32.395" v="496" actId="478"/>
           <ac:spMkLst>
             <pc:docMk/>
             <pc:sldMk cId="1373706002" sldId="264"/>
             <ac:spMk id="24" creationId="{BADBBA3C-DB58-D898-6824-CCA97D779206}"/>
           </ac:spMkLst>
         </pc:spChg>
-        <pc:spChg chg="add mod">
-          <ac:chgData name="Philippe Baucour" userId="5102170ae7533958" providerId="LiveId" clId="{40F711FF-06EA-48FB-94E5-8AF9239032B0}" dt="2024-09-08T09:21:16.481" v="321" actId="1076"/>
+        <pc:spChg chg="add del mod">
+          <ac:chgData name="Philippe Baucour" userId="5102170ae7533958" providerId="LiveId" clId="{40F711FF-06EA-48FB-94E5-8AF9239032B0}" dt="2024-09-11T04:59:32.395" v="496" actId="478"/>
           <ac:spMkLst>
             <pc:docMk/>
             <pc:sldMk cId="1373706002" sldId="264"/>
             <ac:spMk id="26" creationId="{AAD1B239-CD5F-66C8-5247-38641FC9475E}"/>
           </ac:spMkLst>
         </pc:spChg>
-        <pc:spChg chg="add mod">
-          <ac:chgData name="Philippe Baucour" userId="5102170ae7533958" providerId="LiveId" clId="{40F711FF-06EA-48FB-94E5-8AF9239032B0}" dt="2024-09-08T09:21:16.481" v="321" actId="1076"/>
+        <pc:spChg chg="add del mod">
+          <ac:chgData name="Philippe Baucour" userId="5102170ae7533958" providerId="LiveId" clId="{40F711FF-06EA-48FB-94E5-8AF9239032B0}" dt="2024-09-11T04:59:28.596" v="495" actId="478"/>
           <ac:spMkLst>
             <pc:docMk/>
             <pc:sldMk cId="1373706002" sldId="264"/>
             <ac:spMk id="27" creationId="{0F3C8F11-8C60-8632-E3CC-B3BC9CA83199}"/>
           </ac:spMkLst>
         </pc:spChg>
-        <pc:spChg chg="add mod">
-          <ac:chgData name="Philippe Baucour" userId="5102170ae7533958" providerId="LiveId" clId="{40F711FF-06EA-48FB-94E5-8AF9239032B0}" dt="2024-09-08T09:21:16.481" v="321" actId="1076"/>
+        <pc:spChg chg="add del mod">
+          <ac:chgData name="Philippe Baucour" userId="5102170ae7533958" providerId="LiveId" clId="{40F711FF-06EA-48FB-94E5-8AF9239032B0}" dt="2024-09-11T04:59:32.395" v="496" actId="478"/>
           <ac:spMkLst>
             <pc:docMk/>
             <pc:sldMk cId="1373706002" sldId="264"/>
             <ac:spMk id="29" creationId="{97373761-9646-7E85-1CDF-4DBD1BE2C894}"/>
           </ac:spMkLst>
         </pc:spChg>
-        <pc:spChg chg="add mod">
-          <ac:chgData name="Philippe Baucour" userId="5102170ae7533958" providerId="LiveId" clId="{40F711FF-06EA-48FB-94E5-8AF9239032B0}" dt="2024-09-08T09:21:16.481" v="321" actId="1076"/>
+        <pc:spChg chg="add del mod">
+          <ac:chgData name="Philippe Baucour" userId="5102170ae7533958" providerId="LiveId" clId="{40F711FF-06EA-48FB-94E5-8AF9239032B0}" dt="2024-09-11T04:59:32.395" v="496" actId="478"/>
           <ac:spMkLst>
             <pc:docMk/>
             <pc:sldMk cId="1373706002" sldId="264"/>
             <ac:spMk id="30" creationId="{C775230C-72ED-B11C-2532-67F855A50469}"/>
           </ac:spMkLst>
         </pc:spChg>
-        <pc:spChg chg="add mod">
-          <ac:chgData name="Philippe Baucour" userId="5102170ae7533958" providerId="LiveId" clId="{40F711FF-06EA-48FB-94E5-8AF9239032B0}" dt="2024-09-08T09:29:54.415" v="340" actId="1076"/>
+        <pc:spChg chg="add del mod">
+          <ac:chgData name="Philippe Baucour" userId="5102170ae7533958" providerId="LiveId" clId="{40F711FF-06EA-48FB-94E5-8AF9239032B0}" dt="2024-09-11T04:59:32.395" v="496" actId="478"/>
           <ac:spMkLst>
             <pc:docMk/>
             <pc:sldMk cId="1373706002" sldId="264"/>
             <ac:spMk id="32" creationId="{34BDCDB2-F20B-FD27-E7E3-E43D6DE7388E}"/>
           </ac:spMkLst>
         </pc:spChg>
-        <pc:spChg chg="add mod">
-          <ac:chgData name="Philippe Baucour" userId="5102170ae7533958" providerId="LiveId" clId="{40F711FF-06EA-48FB-94E5-8AF9239032B0}" dt="2024-09-08T09:30:06.291" v="342" actId="1076"/>
+        <pc:spChg chg="add del mod">
+          <ac:chgData name="Philippe Baucour" userId="5102170ae7533958" providerId="LiveId" clId="{40F711FF-06EA-48FB-94E5-8AF9239032B0}" dt="2024-09-11T04:59:28.596" v="495" actId="478"/>
           <ac:spMkLst>
             <pc:docMk/>
             <pc:sldMk cId="1373706002" sldId="264"/>
             <ac:spMk id="34" creationId="{CAFCA1A0-F0BA-9899-5CBF-6E88EDB24470}"/>
           </ac:spMkLst>
         </pc:spChg>
-        <pc:spChg chg="add mod">
-          <ac:chgData name="Philippe Baucour" userId="5102170ae7533958" providerId="LiveId" clId="{40F711FF-06EA-48FB-94E5-8AF9239032B0}" dt="2024-09-08T09:30:28.861" v="344" actId="1076"/>
+        <pc:spChg chg="add mod ord">
+          <ac:chgData name="Philippe Baucour" userId="5102170ae7533958" providerId="LiveId" clId="{40F711FF-06EA-48FB-94E5-8AF9239032B0}" dt="2024-09-11T05:13:19.417" v="696"/>
           <ac:spMkLst>
             <pc:docMk/>
             <pc:sldMk cId="1373706002" sldId="264"/>
@@ -842,7 +859,15 @@
           </ac:spMkLst>
         </pc:spChg>
         <pc:cxnChg chg="add mod">
-          <ac:chgData name="Philippe Baucour" userId="5102170ae7533958" providerId="LiveId" clId="{40F711FF-06EA-48FB-94E5-8AF9239032B0}" dt="2024-09-08T09:21:02.825" v="319" actId="1036"/>
+          <ac:chgData name="Philippe Baucour" userId="5102170ae7533958" providerId="LiveId" clId="{40F711FF-06EA-48FB-94E5-8AF9239032B0}" dt="2024-09-11T05:04:03.526" v="617" actId="1037"/>
+          <ac:cxnSpMkLst>
+            <pc:docMk/>
+            <pc:sldMk cId="1373706002" sldId="264"/>
+            <ac:cxnSpMk id="2" creationId="{B36EC4F8-62B4-1849-DFFA-DC24000F5CE0}"/>
+          </ac:cxnSpMkLst>
+        </pc:cxnChg>
+        <pc:cxnChg chg="add mod">
+          <ac:chgData name="Philippe Baucour" userId="5102170ae7533958" providerId="LiveId" clId="{40F711FF-06EA-48FB-94E5-8AF9239032B0}" dt="2024-09-11T05:05:20.977" v="685" actId="1037"/>
           <ac:cxnSpMkLst>
             <pc:docMk/>
             <pc:sldMk cId="1373706002" sldId="264"/>
@@ -850,7 +875,15 @@
           </ac:cxnSpMkLst>
         </pc:cxnChg>
         <pc:cxnChg chg="add mod">
-          <ac:chgData name="Philippe Baucour" userId="5102170ae7533958" providerId="LiveId" clId="{40F711FF-06EA-48FB-94E5-8AF9239032B0}" dt="2024-09-08T09:21:02.825" v="319" actId="1036"/>
+          <ac:chgData name="Philippe Baucour" userId="5102170ae7533958" providerId="LiveId" clId="{40F711FF-06EA-48FB-94E5-8AF9239032B0}" dt="2024-09-11T05:03:17.223" v="605" actId="1035"/>
+          <ac:cxnSpMkLst>
+            <pc:docMk/>
+            <pc:sldMk cId="1373706002" sldId="264"/>
+            <ac:cxnSpMk id="7" creationId="{E10C21FF-6C4B-E066-FC1C-20401C66BA32}"/>
+          </ac:cxnSpMkLst>
+        </pc:cxnChg>
+        <pc:cxnChg chg="add mod">
+          <ac:chgData name="Philippe Baucour" userId="5102170ae7533958" providerId="LiveId" clId="{40F711FF-06EA-48FB-94E5-8AF9239032B0}" dt="2024-09-11T05:04:08.586" v="630" actId="1038"/>
           <ac:cxnSpMkLst>
             <pc:docMk/>
             <pc:sldMk cId="1373706002" sldId="264"/>
@@ -858,15 +891,15 @@
           </ac:cxnSpMkLst>
         </pc:cxnChg>
         <pc:cxnChg chg="add mod">
-          <ac:chgData name="Philippe Baucour" userId="5102170ae7533958" providerId="LiveId" clId="{40F711FF-06EA-48FB-94E5-8AF9239032B0}" dt="2024-09-08T09:21:02.825" v="319" actId="1036"/>
+          <ac:chgData name="Philippe Baucour" userId="5102170ae7533958" providerId="LiveId" clId="{40F711FF-06EA-48FB-94E5-8AF9239032B0}" dt="2024-09-11T05:03:17.223" v="605" actId="1035"/>
           <ac:cxnSpMkLst>
             <pc:docMk/>
             <pc:sldMk cId="1373706002" sldId="264"/>
             <ac:cxnSpMk id="10" creationId="{1461492B-30E9-14D3-4B67-A7AB21C72095}"/>
           </ac:cxnSpMkLst>
         </pc:cxnChg>
-        <pc:cxnChg chg="add mod">
-          <ac:chgData name="Philippe Baucour" userId="5102170ae7533958" providerId="LiveId" clId="{40F711FF-06EA-48FB-94E5-8AF9239032B0}" dt="2024-09-08T09:21:02.825" v="319" actId="1036"/>
+        <pc:cxnChg chg="add mod ord">
+          <ac:chgData name="Philippe Baucour" userId="5102170ae7533958" providerId="LiveId" clId="{40F711FF-06EA-48FB-94E5-8AF9239032B0}" dt="2024-09-11T06:19:14.780" v="700" actId="167"/>
           <ac:cxnSpMkLst>
             <pc:docMk/>
             <pc:sldMk cId="1373706002" sldId="264"/>
@@ -874,63 +907,63 @@
           </ac:cxnSpMkLst>
         </pc:cxnChg>
         <pc:cxnChg chg="add mod">
-          <ac:chgData name="Philippe Baucour" userId="5102170ae7533958" providerId="LiveId" clId="{40F711FF-06EA-48FB-94E5-8AF9239032B0}" dt="2024-09-08T09:21:02.825" v="319" actId="1036"/>
+          <ac:chgData name="Philippe Baucour" userId="5102170ae7533958" providerId="LiveId" clId="{40F711FF-06EA-48FB-94E5-8AF9239032B0}" dt="2024-09-11T05:04:13.489" v="631" actId="14100"/>
           <ac:cxnSpMkLst>
             <pc:docMk/>
             <pc:sldMk cId="1373706002" sldId="264"/>
             <ac:cxnSpMk id="16" creationId="{1C501005-199D-04BE-9B33-319FC66165D3}"/>
           </ac:cxnSpMkLst>
         </pc:cxnChg>
-        <pc:cxnChg chg="add mod">
-          <ac:chgData name="Philippe Baucour" userId="5102170ae7533958" providerId="LiveId" clId="{40F711FF-06EA-48FB-94E5-8AF9239032B0}" dt="2024-09-08T09:21:16.481" v="321" actId="1076"/>
+        <pc:cxnChg chg="add del mod">
+          <ac:chgData name="Philippe Baucour" userId="5102170ae7533958" providerId="LiveId" clId="{40F711FF-06EA-48FB-94E5-8AF9239032B0}" dt="2024-09-11T04:59:32.395" v="496" actId="478"/>
           <ac:cxnSpMkLst>
             <pc:docMk/>
             <pc:sldMk cId="1373706002" sldId="264"/>
             <ac:cxnSpMk id="21" creationId="{81523577-FD19-D04F-3F30-57B4E540E5E3}"/>
           </ac:cxnSpMkLst>
         </pc:cxnChg>
-        <pc:cxnChg chg="add mod">
-          <ac:chgData name="Philippe Baucour" userId="5102170ae7533958" providerId="LiveId" clId="{40F711FF-06EA-48FB-94E5-8AF9239032B0}" dt="2024-09-08T09:21:16.481" v="321" actId="1076"/>
+        <pc:cxnChg chg="add del mod">
+          <ac:chgData name="Philippe Baucour" userId="5102170ae7533958" providerId="LiveId" clId="{40F711FF-06EA-48FB-94E5-8AF9239032B0}" dt="2024-09-11T04:59:32.395" v="496" actId="478"/>
           <ac:cxnSpMkLst>
             <pc:docMk/>
             <pc:sldMk cId="1373706002" sldId="264"/>
             <ac:cxnSpMk id="22" creationId="{4BC151CE-11AA-0B7F-6099-435D4C9F4439}"/>
           </ac:cxnSpMkLst>
         </pc:cxnChg>
-        <pc:cxnChg chg="add mod">
-          <ac:chgData name="Philippe Baucour" userId="5102170ae7533958" providerId="LiveId" clId="{40F711FF-06EA-48FB-94E5-8AF9239032B0}" dt="2024-09-08T09:21:16.481" v="321" actId="1076"/>
+        <pc:cxnChg chg="add del mod">
+          <ac:chgData name="Philippe Baucour" userId="5102170ae7533958" providerId="LiveId" clId="{40F711FF-06EA-48FB-94E5-8AF9239032B0}" dt="2024-09-11T04:59:32.395" v="496" actId="478"/>
           <ac:cxnSpMkLst>
             <pc:docMk/>
             <pc:sldMk cId="1373706002" sldId="264"/>
             <ac:cxnSpMk id="23" creationId="{A5668EAF-C4E9-1377-8E78-81FD6D03B64F}"/>
           </ac:cxnSpMkLst>
         </pc:cxnChg>
-        <pc:cxnChg chg="add mod">
-          <ac:chgData name="Philippe Baucour" userId="5102170ae7533958" providerId="LiveId" clId="{40F711FF-06EA-48FB-94E5-8AF9239032B0}" dt="2024-09-08T09:21:16.481" v="321" actId="1076"/>
+        <pc:cxnChg chg="add del mod">
+          <ac:chgData name="Philippe Baucour" userId="5102170ae7533958" providerId="LiveId" clId="{40F711FF-06EA-48FB-94E5-8AF9239032B0}" dt="2024-09-11T04:59:28.596" v="495" actId="478"/>
           <ac:cxnSpMkLst>
             <pc:docMk/>
             <pc:sldMk cId="1373706002" sldId="264"/>
             <ac:cxnSpMk id="25" creationId="{61B12A27-6F20-C959-CBA6-CD8D504D3F1E}"/>
           </ac:cxnSpMkLst>
         </pc:cxnChg>
-        <pc:cxnChg chg="add mod">
-          <ac:chgData name="Philippe Baucour" userId="5102170ae7533958" providerId="LiveId" clId="{40F711FF-06EA-48FB-94E5-8AF9239032B0}" dt="2024-09-08T09:21:16.481" v="321" actId="1076"/>
+        <pc:cxnChg chg="add del mod">
+          <ac:chgData name="Philippe Baucour" userId="5102170ae7533958" providerId="LiveId" clId="{40F711FF-06EA-48FB-94E5-8AF9239032B0}" dt="2024-09-11T04:59:32.395" v="496" actId="478"/>
           <ac:cxnSpMkLst>
             <pc:docMk/>
             <pc:sldMk cId="1373706002" sldId="264"/>
             <ac:cxnSpMk id="28" creationId="{04A48406-9438-F992-B86A-1B252122AFFD}"/>
           </ac:cxnSpMkLst>
         </pc:cxnChg>
-        <pc:cxnChg chg="add mod">
-          <ac:chgData name="Philippe Baucour" userId="5102170ae7533958" providerId="LiveId" clId="{40F711FF-06EA-48FB-94E5-8AF9239032B0}" dt="2024-09-08T09:29:54.415" v="340" actId="1076"/>
+        <pc:cxnChg chg="add del mod">
+          <ac:chgData name="Philippe Baucour" userId="5102170ae7533958" providerId="LiveId" clId="{40F711FF-06EA-48FB-94E5-8AF9239032B0}" dt="2024-09-11T04:59:32.395" v="496" actId="478"/>
           <ac:cxnSpMkLst>
             <pc:docMk/>
             <pc:sldMk cId="1373706002" sldId="264"/>
             <ac:cxnSpMk id="31" creationId="{8AC3B853-9E2C-2D89-88CA-A5B4D5D7B4B2}"/>
           </ac:cxnSpMkLst>
         </pc:cxnChg>
-        <pc:cxnChg chg="add mod">
-          <ac:chgData name="Philippe Baucour" userId="5102170ae7533958" providerId="LiveId" clId="{40F711FF-06EA-48FB-94E5-8AF9239032B0}" dt="2024-09-08T09:30:06.291" v="342" actId="1076"/>
+        <pc:cxnChg chg="add del mod">
+          <ac:chgData name="Philippe Baucour" userId="5102170ae7533958" providerId="LiveId" clId="{40F711FF-06EA-48FB-94E5-8AF9239032B0}" dt="2024-09-11T04:59:28.596" v="495" actId="478"/>
           <ac:cxnSpMkLst>
             <pc:docMk/>
             <pc:sldMk cId="1373706002" sldId="264"/>
@@ -938,13 +971,20 @@
           </ac:cxnSpMkLst>
         </pc:cxnChg>
         <pc:cxnChg chg="add mod">
-          <ac:chgData name="Philippe Baucour" userId="5102170ae7533958" providerId="LiveId" clId="{40F711FF-06EA-48FB-94E5-8AF9239032B0}" dt="2024-09-08T09:30:28.861" v="344" actId="1076"/>
+          <ac:chgData name="Philippe Baucour" userId="5102170ae7533958" providerId="LiveId" clId="{40F711FF-06EA-48FB-94E5-8AF9239032B0}" dt="2024-09-11T05:03:17.223" v="605" actId="1035"/>
           <ac:cxnSpMkLst>
             <pc:docMk/>
             <pc:sldMk cId="1373706002" sldId="264"/>
             <ac:cxnSpMk id="35" creationId="{59E07000-C642-A948-9CD6-721F82EE2FA6}"/>
           </ac:cxnSpMkLst>
         </pc:cxnChg>
+      </pc:sldChg>
+      <pc:sldChg chg="add">
+        <pc:chgData name="Philippe Baucour" userId="5102170ae7533958" providerId="LiveId" clId="{40F711FF-06EA-48FB-94E5-8AF9239032B0}" dt="2024-09-11T04:57:36.132" v="468"/>
+        <pc:sldMkLst>
+          <pc:docMk/>
+          <pc:sldMk cId="710411366" sldId="265"/>
+        </pc:sldMkLst>
       </pc:sldChg>
     </pc:docChg>
   </pc:docChgLst>
@@ -1935,7 +1975,7 @@
           <a:p>
             <a:fld id="{FD1752CD-A7D2-4825-BC26-9DAEFBD0A5FF}" type="datetimeFigureOut">
               <a:rPr lang="fr-FR" smtClean="0"/>
-              <a:t>08/09/2024</a:t>
+              <a:t>11/09/2024</a:t>
             </a:fld>
             <a:endParaRPr lang="fr-FR"/>
           </a:p>
@@ -2779,7 +2819,7 @@
           <a:p>
             <a:fld id="{7ECB9D5A-E5E4-41FE-AF39-634902D6D5D2}" type="datetimeFigureOut">
               <a:rPr lang="fr-FR" smtClean="0"/>
-              <a:t>08/09/2024</a:t>
+              <a:t>11/09/2024</a:t>
             </a:fld>
             <a:endParaRPr lang="fr-FR"/>
           </a:p>
@@ -2977,7 +3017,7 @@
           <a:p>
             <a:fld id="{7ECB9D5A-E5E4-41FE-AF39-634902D6D5D2}" type="datetimeFigureOut">
               <a:rPr lang="fr-FR" smtClean="0"/>
-              <a:t>08/09/2024</a:t>
+              <a:t>11/09/2024</a:t>
             </a:fld>
             <a:endParaRPr lang="fr-FR"/>
           </a:p>
@@ -3185,7 +3225,7 @@
           <a:p>
             <a:fld id="{7ECB9D5A-E5E4-41FE-AF39-634902D6D5D2}" type="datetimeFigureOut">
               <a:rPr lang="fr-FR" smtClean="0"/>
-              <a:t>08/09/2024</a:t>
+              <a:t>11/09/2024</a:t>
             </a:fld>
             <a:endParaRPr lang="fr-FR"/>
           </a:p>
@@ -3383,7 +3423,7 @@
           <a:p>
             <a:fld id="{7ECB9D5A-E5E4-41FE-AF39-634902D6D5D2}" type="datetimeFigureOut">
               <a:rPr lang="fr-FR" smtClean="0"/>
-              <a:t>08/09/2024</a:t>
+              <a:t>11/09/2024</a:t>
             </a:fld>
             <a:endParaRPr lang="fr-FR"/>
           </a:p>
@@ -3658,7 +3698,7 @@
           <a:p>
             <a:fld id="{7ECB9D5A-E5E4-41FE-AF39-634902D6D5D2}" type="datetimeFigureOut">
               <a:rPr lang="fr-FR" smtClean="0"/>
-              <a:t>08/09/2024</a:t>
+              <a:t>11/09/2024</a:t>
             </a:fld>
             <a:endParaRPr lang="fr-FR"/>
           </a:p>
@@ -3923,7 +3963,7 @@
           <a:p>
             <a:fld id="{7ECB9D5A-E5E4-41FE-AF39-634902D6D5D2}" type="datetimeFigureOut">
               <a:rPr lang="fr-FR" smtClean="0"/>
-              <a:t>08/09/2024</a:t>
+              <a:t>11/09/2024</a:t>
             </a:fld>
             <a:endParaRPr lang="fr-FR"/>
           </a:p>
@@ -4335,7 +4375,7 @@
           <a:p>
             <a:fld id="{7ECB9D5A-E5E4-41FE-AF39-634902D6D5D2}" type="datetimeFigureOut">
               <a:rPr lang="fr-FR" smtClean="0"/>
-              <a:t>08/09/2024</a:t>
+              <a:t>11/09/2024</a:t>
             </a:fld>
             <a:endParaRPr lang="fr-FR"/>
           </a:p>
@@ -4476,7 +4516,7 @@
           <a:p>
             <a:fld id="{7ECB9D5A-E5E4-41FE-AF39-634902D6D5D2}" type="datetimeFigureOut">
               <a:rPr lang="fr-FR" smtClean="0"/>
-              <a:t>08/09/2024</a:t>
+              <a:t>11/09/2024</a:t>
             </a:fld>
             <a:endParaRPr lang="fr-FR"/>
           </a:p>
@@ -4589,7 +4629,7 @@
           <a:p>
             <a:fld id="{7ECB9D5A-E5E4-41FE-AF39-634902D6D5D2}" type="datetimeFigureOut">
               <a:rPr lang="fr-FR" smtClean="0"/>
-              <a:t>08/09/2024</a:t>
+              <a:t>11/09/2024</a:t>
             </a:fld>
             <a:endParaRPr lang="fr-FR"/>
           </a:p>
@@ -4900,7 +4940,7 @@
           <a:p>
             <a:fld id="{7ECB9D5A-E5E4-41FE-AF39-634902D6D5D2}" type="datetimeFigureOut">
               <a:rPr lang="fr-FR" smtClean="0"/>
-              <a:t>08/09/2024</a:t>
+              <a:t>11/09/2024</a:t>
             </a:fld>
             <a:endParaRPr lang="fr-FR"/>
           </a:p>
@@ -5191,7 +5231,7 @@
           <a:p>
             <a:fld id="{7ECB9D5A-E5E4-41FE-AF39-634902D6D5D2}" type="datetimeFigureOut">
               <a:rPr lang="fr-FR" smtClean="0"/>
-              <a:t>08/09/2024</a:t>
+              <a:t>11/09/2024</a:t>
             </a:fld>
             <a:endParaRPr lang="fr-FR"/>
           </a:p>
@@ -5432,7 +5472,7 @@
           <a:p>
             <a:fld id="{7ECB9D5A-E5E4-41FE-AF39-634902D6D5D2}" type="datetimeFigureOut">
               <a:rPr lang="fr-FR" smtClean="0"/>
-              <a:t>08/09/2024</a:t>
+              <a:t>11/09/2024</a:t>
             </a:fld>
             <a:endParaRPr lang="fr-FR"/>
           </a:p>
@@ -6290,6 +6330,730 @@
           <a:chExt cx="0" cy="0"/>
         </a:xfrm>
       </p:grpSpPr>
+      <p:cxnSp>
+        <p:nvCxnSpPr>
+          <p:cNvPr id="12" name="Connecteur droit 11">
+            <a:extLst>
+              <a:ext uri="{FF2B5EF4-FFF2-40B4-BE49-F238E27FC236}">
+                <a16:creationId xmlns:a16="http://schemas.microsoft.com/office/drawing/2014/main" id="{9DA77857-9345-9C55-EC4E-BC52E4F7EBA1}"/>
+              </a:ext>
+            </a:extLst>
+          </p:cNvPr>
+          <p:cNvCxnSpPr>
+            <a:cxnSpLocks/>
+          </p:cNvCxnSpPr>
+          <p:nvPr/>
+        </p:nvCxnSpPr>
+        <p:spPr>
+          <a:xfrm>
+            <a:off x="5946036" y="3402426"/>
+            <a:ext cx="0" cy="823450"/>
+          </a:xfrm>
+          <a:prstGeom prst="line">
+            <a:avLst/>
+          </a:prstGeom>
+          <a:ln w="76200">
+            <a:solidFill>
+              <a:srgbClr val="92D050"/>
+            </a:solidFill>
+          </a:ln>
+        </p:spPr>
+        <p:style>
+          <a:lnRef idx="1">
+            <a:schemeClr val="accent1"/>
+          </a:lnRef>
+          <a:fillRef idx="0">
+            <a:schemeClr val="accent1"/>
+          </a:fillRef>
+          <a:effectRef idx="0">
+            <a:schemeClr val="accent1"/>
+          </a:effectRef>
+          <a:fontRef idx="minor">
+            <a:schemeClr val="tx1"/>
+          </a:fontRef>
+        </p:style>
+      </p:cxnSp>
+      <p:sp>
+        <p:nvSpPr>
+          <p:cNvPr id="36" name="ZoneTexte 35">
+            <a:extLst>
+              <a:ext uri="{FF2B5EF4-FFF2-40B4-BE49-F238E27FC236}">
+                <a16:creationId xmlns:a16="http://schemas.microsoft.com/office/drawing/2014/main" id="{928554EF-5E4A-CE84-0556-0D865FC42DCB}"/>
+              </a:ext>
+            </a:extLst>
+          </p:cNvPr>
+          <p:cNvSpPr txBox="1"/>
+          <p:nvPr/>
+        </p:nvSpPr>
+        <p:spPr>
+          <a:xfrm>
+            <a:off x="6812826" y="4558188"/>
+            <a:ext cx="1672253" cy="461665"/>
+          </a:xfrm>
+          <a:prstGeom prst="rect">
+            <a:avLst/>
+          </a:prstGeom>
+          <a:solidFill>
+            <a:schemeClr val="accent2">
+              <a:lumMod val="20000"/>
+              <a:lumOff val="80000"/>
+            </a:schemeClr>
+          </a:solidFill>
+        </p:spPr>
+        <p:txBody>
+          <a:bodyPr wrap="none" rtlCol="0">
+            <a:spAutoFit/>
+          </a:bodyPr>
+          <a:lstStyle/>
+          <a:p>
+            <a:r>
+              <a:rPr lang="fr-FR" sz="1200" dirty="0">
+                <a:latin typeface="Courier New" panose="02070309020205020404" pitchFamily="49" charset="0"/>
+                <a:cs typeface="Courier New" panose="02070309020205020404" pitchFamily="49" charset="0"/>
+              </a:rPr>
+              <a:t> Previous driver</a:t>
+            </a:r>
+          </a:p>
+          <a:p>
+            <a:r>
+              <a:rPr lang="fr-FR" sz="1200" dirty="0">
+                <a:latin typeface="Courier New" panose="02070309020205020404" pitchFamily="49" charset="0"/>
+                <a:cs typeface="Courier New" panose="02070309020205020404" pitchFamily="49" charset="0"/>
+              </a:rPr>
+              <a:t>Late Return </a:t>
+            </a:r>
+          </a:p>
+        </p:txBody>
+      </p:sp>
+      <p:sp>
+        <p:nvSpPr>
+          <p:cNvPr id="9" name="ZoneTexte 8">
+            <a:extLst>
+              <a:ext uri="{FF2B5EF4-FFF2-40B4-BE49-F238E27FC236}">
+                <a16:creationId xmlns:a16="http://schemas.microsoft.com/office/drawing/2014/main" id="{A05D6E0C-459A-8375-8C2F-EC30F32D46CF}"/>
+              </a:ext>
+            </a:extLst>
+          </p:cNvPr>
+          <p:cNvSpPr txBox="1"/>
+          <p:nvPr/>
+        </p:nvSpPr>
+        <p:spPr>
+          <a:xfrm>
+            <a:off x="4251232" y="4558188"/>
+            <a:ext cx="1672253" cy="461665"/>
+          </a:xfrm>
+          <a:prstGeom prst="rect">
+            <a:avLst/>
+          </a:prstGeom>
+          <a:solidFill>
+            <a:schemeClr val="accent2">
+              <a:lumMod val="20000"/>
+              <a:lumOff val="80000"/>
+            </a:schemeClr>
+          </a:solidFill>
+        </p:spPr>
+        <p:txBody>
+          <a:bodyPr wrap="none" rtlCol="0">
+            <a:spAutoFit/>
+          </a:bodyPr>
+          <a:lstStyle/>
+          <a:p>
+            <a:r>
+              <a:rPr lang="fr-FR" sz="1200" dirty="0">
+                <a:latin typeface="Courier New" panose="02070309020205020404" pitchFamily="49" charset="0"/>
+                <a:cs typeface="Courier New" panose="02070309020205020404" pitchFamily="49" charset="0"/>
+              </a:rPr>
+              <a:t> Previous driver</a:t>
+            </a:r>
+          </a:p>
+          <a:p>
+            <a:r>
+              <a:rPr lang="fr-FR" sz="1200" dirty="0">
+                <a:latin typeface="Courier New" panose="02070309020205020404" pitchFamily="49" charset="0"/>
+                <a:cs typeface="Courier New" panose="02070309020205020404" pitchFamily="49" charset="0"/>
+              </a:rPr>
+              <a:t>Return on time </a:t>
+            </a:r>
+          </a:p>
+        </p:txBody>
+      </p:sp>
+      <p:sp>
+        <p:nvSpPr>
+          <p:cNvPr id="13" name="ZoneTexte 12">
+            <a:extLst>
+              <a:ext uri="{FF2B5EF4-FFF2-40B4-BE49-F238E27FC236}">
+                <a16:creationId xmlns:a16="http://schemas.microsoft.com/office/drawing/2014/main" id="{3CEDE262-9D4C-7F42-0C0A-790346E96373}"/>
+              </a:ext>
+            </a:extLst>
+          </p:cNvPr>
+          <p:cNvSpPr txBox="1"/>
+          <p:nvPr/>
+        </p:nvSpPr>
+        <p:spPr>
+          <a:xfrm>
+            <a:off x="4872561" y="1963129"/>
+            <a:ext cx="1858201" cy="461665"/>
+          </a:xfrm>
+          <a:prstGeom prst="rect">
+            <a:avLst/>
+          </a:prstGeom>
+          <a:solidFill>
+            <a:schemeClr val="accent5">
+              <a:lumMod val="20000"/>
+              <a:lumOff val="80000"/>
+            </a:schemeClr>
+          </a:solidFill>
+        </p:spPr>
+        <p:txBody>
+          <a:bodyPr wrap="none" rtlCol="0">
+            <a:spAutoFit/>
+          </a:bodyPr>
+          <a:lstStyle/>
+          <a:p>
+            <a:r>
+              <a:rPr lang="fr-FR" sz="1200" dirty="0">
+                <a:latin typeface="Courier New" panose="02070309020205020404" pitchFamily="49" charset="0"/>
+                <a:cs typeface="Courier New" panose="02070309020205020404" pitchFamily="49" charset="0"/>
+              </a:rPr>
+              <a:t>No previous driver</a:t>
+            </a:r>
+          </a:p>
+          <a:p>
+            <a:r>
+              <a:rPr lang="fr-FR" sz="1200" dirty="0">
+                <a:latin typeface="Courier New" panose="02070309020205020404" pitchFamily="49" charset="0"/>
+                <a:cs typeface="Courier New" panose="02070309020205020404" pitchFamily="49" charset="0"/>
+              </a:rPr>
+              <a:t> Late Return </a:t>
+            </a:r>
+          </a:p>
+        </p:txBody>
+      </p:sp>
+      <p:sp>
+        <p:nvSpPr>
+          <p:cNvPr id="3" name="ZoneTexte 2">
+            <a:extLst>
+              <a:ext uri="{FF2B5EF4-FFF2-40B4-BE49-F238E27FC236}">
+                <a16:creationId xmlns:a16="http://schemas.microsoft.com/office/drawing/2014/main" id="{A0D54A11-9FCC-9D7A-C69A-C8AB026CEBF4}"/>
+              </a:ext>
+            </a:extLst>
+          </p:cNvPr>
+          <p:cNvSpPr txBox="1"/>
+          <p:nvPr/>
+        </p:nvSpPr>
+        <p:spPr>
+          <a:xfrm>
+            <a:off x="2553375" y="1957222"/>
+            <a:ext cx="1858201" cy="461665"/>
+          </a:xfrm>
+          <a:prstGeom prst="rect">
+            <a:avLst/>
+          </a:prstGeom>
+          <a:solidFill>
+            <a:schemeClr val="accent5">
+              <a:lumMod val="20000"/>
+              <a:lumOff val="80000"/>
+            </a:schemeClr>
+          </a:solidFill>
+        </p:spPr>
+        <p:txBody>
+          <a:bodyPr wrap="none" rtlCol="0">
+            <a:spAutoFit/>
+          </a:bodyPr>
+          <a:lstStyle/>
+          <a:p>
+            <a:r>
+              <a:rPr lang="fr-FR" sz="1200" dirty="0">
+                <a:latin typeface="Courier New" panose="02070309020205020404" pitchFamily="49" charset="0"/>
+                <a:cs typeface="Courier New" panose="02070309020205020404" pitchFamily="49" charset="0"/>
+              </a:rPr>
+              <a:t>No previous driver</a:t>
+            </a:r>
+          </a:p>
+          <a:p>
+            <a:r>
+              <a:rPr lang="fr-FR" sz="1200" dirty="0">
+                <a:latin typeface="Courier New" panose="02070309020205020404" pitchFamily="49" charset="0"/>
+                <a:cs typeface="Courier New" panose="02070309020205020404" pitchFamily="49" charset="0"/>
+              </a:rPr>
+              <a:t> Return on time </a:t>
+            </a:r>
+          </a:p>
+        </p:txBody>
+      </p:sp>
+      <p:sp>
+        <p:nvSpPr>
+          <p:cNvPr id="4" name="Titre 3">
+            <a:extLst>
+              <a:ext uri="{FF2B5EF4-FFF2-40B4-BE49-F238E27FC236}">
+                <a16:creationId xmlns:a16="http://schemas.microsoft.com/office/drawing/2014/main" id="{EF2A8F15-8E22-7123-9084-834452AB8F63}"/>
+              </a:ext>
+            </a:extLst>
+          </p:cNvPr>
+          <p:cNvSpPr>
+            <a:spLocks noGrp="1"/>
+          </p:cNvSpPr>
+          <p:nvPr>
+            <p:ph type="title"/>
+          </p:nvPr>
+        </p:nvSpPr>
+        <p:spPr/>
+        <p:txBody>
+          <a:bodyPr/>
+          <a:lstStyle/>
+          <a:p>
+            <a:r>
+              <a:rPr lang="fr-FR" dirty="0"/>
+              <a:t>No </a:t>
+            </a:r>
+            <a:r>
+              <a:rPr lang="fr-FR" dirty="0" err="1"/>
+              <a:t>Theshold</a:t>
+            </a:r>
+            <a:endParaRPr lang="fr-FR" dirty="0"/>
+          </a:p>
+        </p:txBody>
+      </p:sp>
+      <p:cxnSp>
+        <p:nvCxnSpPr>
+          <p:cNvPr id="6" name="Connecteur droit avec flèche 5">
+            <a:extLst>
+              <a:ext uri="{FF2B5EF4-FFF2-40B4-BE49-F238E27FC236}">
+                <a16:creationId xmlns:a16="http://schemas.microsoft.com/office/drawing/2014/main" id="{D3449578-2B85-6D82-4C71-94229B9D7969}"/>
+              </a:ext>
+            </a:extLst>
+          </p:cNvPr>
+          <p:cNvCxnSpPr>
+            <a:cxnSpLocks/>
+          </p:cNvCxnSpPr>
+          <p:nvPr/>
+        </p:nvCxnSpPr>
+        <p:spPr>
+          <a:xfrm>
+            <a:off x="1820253" y="3402426"/>
+            <a:ext cx="7560000" cy="0"/>
+          </a:xfrm>
+          <a:prstGeom prst="straightConnector1">
+            <a:avLst/>
+          </a:prstGeom>
+          <a:ln w="76200">
+            <a:tailEnd type="triangle"/>
+          </a:ln>
+        </p:spPr>
+        <p:style>
+          <a:lnRef idx="1">
+            <a:schemeClr val="accent1"/>
+          </a:lnRef>
+          <a:fillRef idx="0">
+            <a:schemeClr val="accent1"/>
+          </a:fillRef>
+          <a:effectRef idx="0">
+            <a:schemeClr val="accent1"/>
+          </a:effectRef>
+          <a:fontRef idx="minor">
+            <a:schemeClr val="tx1"/>
+          </a:fontRef>
+        </p:style>
+      </p:cxnSp>
+      <p:cxnSp>
+        <p:nvCxnSpPr>
+          <p:cNvPr id="8" name="Connecteur droit avec flèche 7">
+            <a:extLst>
+              <a:ext uri="{FF2B5EF4-FFF2-40B4-BE49-F238E27FC236}">
+                <a16:creationId xmlns:a16="http://schemas.microsoft.com/office/drawing/2014/main" id="{53D696E9-A257-E150-14A8-D2D64BF39073}"/>
+              </a:ext>
+            </a:extLst>
+          </p:cNvPr>
+          <p:cNvCxnSpPr/>
+          <p:nvPr/>
+        </p:nvCxnSpPr>
+        <p:spPr>
+          <a:xfrm>
+            <a:off x="4983687" y="2191022"/>
+            <a:ext cx="0" cy="1074656"/>
+          </a:xfrm>
+          <a:prstGeom prst="straightConnector1">
+            <a:avLst/>
+          </a:prstGeom>
+          <a:ln w="38100">
+            <a:solidFill>
+              <a:schemeClr val="tx1"/>
+            </a:solidFill>
+            <a:tailEnd type="triangle"/>
+          </a:ln>
+        </p:spPr>
+        <p:style>
+          <a:lnRef idx="1">
+            <a:schemeClr val="accent1"/>
+          </a:lnRef>
+          <a:fillRef idx="0">
+            <a:schemeClr val="accent1"/>
+          </a:fillRef>
+          <a:effectRef idx="0">
+            <a:schemeClr val="accent1"/>
+          </a:effectRef>
+          <a:fontRef idx="minor">
+            <a:schemeClr val="tx1"/>
+          </a:fontRef>
+        </p:style>
+      </p:cxnSp>
+      <p:cxnSp>
+        <p:nvCxnSpPr>
+          <p:cNvPr id="10" name="Connecteur droit 9">
+            <a:extLst>
+              <a:ext uri="{FF2B5EF4-FFF2-40B4-BE49-F238E27FC236}">
+                <a16:creationId xmlns:a16="http://schemas.microsoft.com/office/drawing/2014/main" id="{1461492B-30E9-14D3-4B67-A7AB21C72095}"/>
+              </a:ext>
+            </a:extLst>
+          </p:cNvPr>
+          <p:cNvCxnSpPr/>
+          <p:nvPr/>
+        </p:nvCxnSpPr>
+        <p:spPr>
+          <a:xfrm>
+            <a:off x="3789576" y="2642173"/>
+            <a:ext cx="0" cy="1583703"/>
+          </a:xfrm>
+          <a:prstGeom prst="line">
+            <a:avLst/>
+          </a:prstGeom>
+          <a:ln w="76200">
+            <a:solidFill>
+              <a:srgbClr val="C00000"/>
+            </a:solidFill>
+          </a:ln>
+        </p:spPr>
+        <p:style>
+          <a:lnRef idx="1">
+            <a:schemeClr val="accent1"/>
+          </a:lnRef>
+          <a:fillRef idx="0">
+            <a:schemeClr val="accent1"/>
+          </a:fillRef>
+          <a:effectRef idx="0">
+            <a:schemeClr val="accent1"/>
+          </a:effectRef>
+          <a:fontRef idx="minor">
+            <a:schemeClr val="tx1"/>
+          </a:fontRef>
+        </p:style>
+      </p:cxnSp>
+      <p:sp>
+        <p:nvSpPr>
+          <p:cNvPr id="14" name="ZoneTexte 13">
+            <a:extLst>
+              <a:ext uri="{FF2B5EF4-FFF2-40B4-BE49-F238E27FC236}">
+                <a16:creationId xmlns:a16="http://schemas.microsoft.com/office/drawing/2014/main" id="{4B2711C6-E93E-A998-96E4-6C08DBC1A816}"/>
+              </a:ext>
+            </a:extLst>
+          </p:cNvPr>
+          <p:cNvSpPr txBox="1"/>
+          <p:nvPr/>
+        </p:nvSpPr>
+        <p:spPr>
+          <a:xfrm>
+            <a:off x="5570220" y="4268268"/>
+            <a:ext cx="742511" cy="276999"/>
+          </a:xfrm>
+          <a:prstGeom prst="rect">
+            <a:avLst/>
+          </a:prstGeom>
+          <a:noFill/>
+        </p:spPr>
+        <p:txBody>
+          <a:bodyPr wrap="none" rtlCol="0">
+            <a:spAutoFit/>
+          </a:bodyPr>
+          <a:lstStyle/>
+          <a:p>
+            <a:r>
+              <a:rPr lang="fr-FR" sz="1200" dirty="0">
+                <a:latin typeface="Courier New" panose="02070309020205020404" pitchFamily="49" charset="0"/>
+                <a:cs typeface="Courier New" panose="02070309020205020404" pitchFamily="49" charset="0"/>
+              </a:rPr>
+              <a:t>Time ∆</a:t>
+            </a:r>
+          </a:p>
+        </p:txBody>
+      </p:sp>
+      <p:cxnSp>
+        <p:nvCxnSpPr>
+          <p:cNvPr id="16" name="Connecteur droit avec flèche 15">
+            <a:extLst>
+              <a:ext uri="{FF2B5EF4-FFF2-40B4-BE49-F238E27FC236}">
+                <a16:creationId xmlns:a16="http://schemas.microsoft.com/office/drawing/2014/main" id="{1C501005-199D-04BE-9B33-319FC66165D3}"/>
+              </a:ext>
+            </a:extLst>
+          </p:cNvPr>
+          <p:cNvCxnSpPr>
+            <a:cxnSpLocks/>
+          </p:cNvCxnSpPr>
+          <p:nvPr/>
+        </p:nvCxnSpPr>
+        <p:spPr>
+          <a:xfrm>
+            <a:off x="3924300" y="2844300"/>
+            <a:ext cx="948261" cy="0"/>
+          </a:xfrm>
+          <a:prstGeom prst="straightConnector1">
+            <a:avLst/>
+          </a:prstGeom>
+          <a:ln>
+            <a:headEnd type="triangle"/>
+            <a:tailEnd type="triangle"/>
+          </a:ln>
+        </p:spPr>
+        <p:style>
+          <a:lnRef idx="1">
+            <a:schemeClr val="accent1"/>
+          </a:lnRef>
+          <a:fillRef idx="0">
+            <a:schemeClr val="accent1"/>
+          </a:fillRef>
+          <a:effectRef idx="0">
+            <a:schemeClr val="accent1"/>
+          </a:effectRef>
+          <a:fontRef idx="minor">
+            <a:schemeClr val="tx1"/>
+          </a:fontRef>
+        </p:style>
+      </p:cxnSp>
+      <p:sp>
+        <p:nvSpPr>
+          <p:cNvPr id="17" name="ZoneTexte 16">
+            <a:extLst>
+              <a:ext uri="{FF2B5EF4-FFF2-40B4-BE49-F238E27FC236}">
+                <a16:creationId xmlns:a16="http://schemas.microsoft.com/office/drawing/2014/main" id="{25628DB1-D95E-C931-B0CB-1FDE2E4AF51A}"/>
+              </a:ext>
+            </a:extLst>
+          </p:cNvPr>
+          <p:cNvSpPr txBox="1"/>
+          <p:nvPr/>
+        </p:nvSpPr>
+        <p:spPr>
+          <a:xfrm>
+            <a:off x="4080611" y="2624863"/>
+            <a:ext cx="649537" cy="276999"/>
+          </a:xfrm>
+          <a:prstGeom prst="rect">
+            <a:avLst/>
+          </a:prstGeom>
+          <a:noFill/>
+        </p:spPr>
+        <p:txBody>
+          <a:bodyPr wrap="none" rtlCol="0">
+            <a:spAutoFit/>
+          </a:bodyPr>
+          <a:lstStyle/>
+          <a:p>
+            <a:r>
+              <a:rPr lang="fr-FR" sz="1200" dirty="0">
+                <a:latin typeface="Courier New" panose="02070309020205020404" pitchFamily="49" charset="0"/>
+                <a:cs typeface="Courier New" panose="02070309020205020404" pitchFamily="49" charset="0"/>
+              </a:rPr>
+              <a:t>Delay</a:t>
+            </a:r>
+          </a:p>
+        </p:txBody>
+      </p:sp>
+      <p:sp>
+        <p:nvSpPr>
+          <p:cNvPr id="18" name="ZoneTexte 17">
+            <a:extLst>
+              <a:ext uri="{FF2B5EF4-FFF2-40B4-BE49-F238E27FC236}">
+                <a16:creationId xmlns:a16="http://schemas.microsoft.com/office/drawing/2014/main" id="{08C4FBDB-8965-E9BE-0584-C82D2C367616}"/>
+              </a:ext>
+            </a:extLst>
+          </p:cNvPr>
+          <p:cNvSpPr txBox="1"/>
+          <p:nvPr/>
+        </p:nvSpPr>
+        <p:spPr>
+          <a:xfrm>
+            <a:off x="3311334" y="4268268"/>
+            <a:ext cx="928459" cy="276999"/>
+          </a:xfrm>
+          <a:prstGeom prst="rect">
+            <a:avLst/>
+          </a:prstGeom>
+          <a:noFill/>
+        </p:spPr>
+        <p:txBody>
+          <a:bodyPr wrap="none" rtlCol="0">
+            <a:spAutoFit/>
+          </a:bodyPr>
+          <a:lstStyle/>
+          <a:p>
+            <a:r>
+              <a:rPr lang="fr-FR" sz="1200" dirty="0">
+                <a:latin typeface="Courier New" panose="02070309020205020404" pitchFamily="49" charset="0"/>
+                <a:cs typeface="Courier New" panose="02070309020205020404" pitchFamily="49" charset="0"/>
+              </a:rPr>
+              <a:t>Checkout</a:t>
+            </a:r>
+          </a:p>
+        </p:txBody>
+      </p:sp>
+      <p:cxnSp>
+        <p:nvCxnSpPr>
+          <p:cNvPr id="35" name="Connecteur droit avec flèche 34">
+            <a:extLst>
+              <a:ext uri="{FF2B5EF4-FFF2-40B4-BE49-F238E27FC236}">
+                <a16:creationId xmlns:a16="http://schemas.microsoft.com/office/drawing/2014/main" id="{59E07000-C642-A948-9CD6-721F82EE2FA6}"/>
+              </a:ext>
+            </a:extLst>
+          </p:cNvPr>
+          <p:cNvCxnSpPr>
+            <a:cxnSpLocks/>
+          </p:cNvCxnSpPr>
+          <p:nvPr/>
+        </p:nvCxnSpPr>
+        <p:spPr>
+          <a:xfrm flipV="1">
+            <a:off x="6930048" y="3490476"/>
+            <a:ext cx="0" cy="1274400"/>
+          </a:xfrm>
+          <a:prstGeom prst="straightConnector1">
+            <a:avLst/>
+          </a:prstGeom>
+          <a:ln w="38100">
+            <a:solidFill>
+              <a:schemeClr val="tx1"/>
+            </a:solidFill>
+            <a:tailEnd type="triangle"/>
+          </a:ln>
+        </p:spPr>
+        <p:style>
+          <a:lnRef idx="1">
+            <a:schemeClr val="accent1"/>
+          </a:lnRef>
+          <a:fillRef idx="0">
+            <a:schemeClr val="accent1"/>
+          </a:fillRef>
+          <a:effectRef idx="0">
+            <a:schemeClr val="accent1"/>
+          </a:effectRef>
+          <a:fontRef idx="minor">
+            <a:schemeClr val="tx1"/>
+          </a:fontRef>
+        </p:style>
+      </p:cxnSp>
+      <p:cxnSp>
+        <p:nvCxnSpPr>
+          <p:cNvPr id="2" name="Connecteur droit avec flèche 1">
+            <a:extLst>
+              <a:ext uri="{FF2B5EF4-FFF2-40B4-BE49-F238E27FC236}">
+                <a16:creationId xmlns:a16="http://schemas.microsoft.com/office/drawing/2014/main" id="{B36EC4F8-62B4-1849-DFFA-DC24000F5CE0}"/>
+              </a:ext>
+            </a:extLst>
+          </p:cNvPr>
+          <p:cNvCxnSpPr/>
+          <p:nvPr/>
+        </p:nvCxnSpPr>
+        <p:spPr>
+          <a:xfrm>
+            <a:off x="2658405" y="2185115"/>
+            <a:ext cx="0" cy="1074656"/>
+          </a:xfrm>
+          <a:prstGeom prst="straightConnector1">
+            <a:avLst/>
+          </a:prstGeom>
+          <a:ln w="38100">
+            <a:solidFill>
+              <a:schemeClr val="tx1"/>
+            </a:solidFill>
+            <a:tailEnd type="triangle"/>
+          </a:ln>
+        </p:spPr>
+        <p:style>
+          <a:lnRef idx="1">
+            <a:schemeClr val="accent1"/>
+          </a:lnRef>
+          <a:fillRef idx="0">
+            <a:schemeClr val="accent1"/>
+          </a:fillRef>
+          <a:effectRef idx="0">
+            <a:schemeClr val="accent1"/>
+          </a:effectRef>
+          <a:fontRef idx="minor">
+            <a:schemeClr val="tx1"/>
+          </a:fontRef>
+        </p:style>
+      </p:cxnSp>
+      <p:cxnSp>
+        <p:nvCxnSpPr>
+          <p:cNvPr id="7" name="Connecteur droit avec flèche 6">
+            <a:extLst>
+              <a:ext uri="{FF2B5EF4-FFF2-40B4-BE49-F238E27FC236}">
+                <a16:creationId xmlns:a16="http://schemas.microsoft.com/office/drawing/2014/main" id="{E10C21FF-6C4B-E066-FC1C-20401C66BA32}"/>
+              </a:ext>
+            </a:extLst>
+          </p:cNvPr>
+          <p:cNvCxnSpPr>
+            <a:cxnSpLocks/>
+          </p:cNvCxnSpPr>
+          <p:nvPr/>
+        </p:nvCxnSpPr>
+        <p:spPr>
+          <a:xfrm flipV="1">
+            <a:off x="4368454" y="3490476"/>
+            <a:ext cx="0" cy="1273268"/>
+          </a:xfrm>
+          <a:prstGeom prst="straightConnector1">
+            <a:avLst/>
+          </a:prstGeom>
+          <a:ln w="38100">
+            <a:solidFill>
+              <a:schemeClr val="tx1"/>
+            </a:solidFill>
+            <a:tailEnd type="triangle"/>
+          </a:ln>
+        </p:spPr>
+        <p:style>
+          <a:lnRef idx="1">
+            <a:schemeClr val="accent1"/>
+          </a:lnRef>
+          <a:fillRef idx="0">
+            <a:schemeClr val="accent1"/>
+          </a:fillRef>
+          <a:effectRef idx="0">
+            <a:schemeClr val="accent1"/>
+          </a:effectRef>
+          <a:fontRef idx="minor">
+            <a:schemeClr val="tx1"/>
+          </a:fontRef>
+        </p:style>
+      </p:cxnSp>
+    </p:spTree>
+    <p:extLst>
+      <p:ext uri="{BB962C8B-B14F-4D97-AF65-F5344CB8AC3E}">
+        <p14:creationId xmlns:p14="http://schemas.microsoft.com/office/powerpoint/2010/main" val="1373706002"/>
+      </p:ext>
+    </p:extLst>
+  </p:cSld>
+  <p:clrMapOvr>
+    <a:masterClrMapping/>
+  </p:clrMapOvr>
+</p:sld>
+</file>
+
+<file path=ppt/slides/slide6.xml><?xml version="1.0" encoding="utf-8"?>
+<p:sld xmlns:a="http://schemas.openxmlformats.org/drawingml/2006/main" xmlns:r="http://schemas.openxmlformats.org/officeDocument/2006/relationships" xmlns:p="http://schemas.openxmlformats.org/presentationml/2006/main">
+  <p:cSld>
+    <p:spTree>
+      <p:nvGrpSpPr>
+        <p:cNvPr id="1" name=""/>
+        <p:cNvGrpSpPr/>
+        <p:nvPr/>
+      </p:nvGrpSpPr>
+      <p:grpSpPr>
+        <a:xfrm>
+          <a:off x="0" y="0"/>
+          <a:ext cx="0" cy="0"/>
+          <a:chOff x="0" y="0"/>
+          <a:chExt cx="0" cy="0"/>
+        </a:xfrm>
+      </p:grpSpPr>
       <p:sp>
         <p:nvSpPr>
           <p:cNvPr id="4" name="Titre 3">
@@ -6499,7 +7263,7 @@
         <p:spPr>
           <a:xfrm>
             <a:off x="4648200" y="520909"/>
-            <a:ext cx="1207382" cy="276999"/>
+            <a:ext cx="1951175" cy="461665"/>
           </a:xfrm>
           <a:prstGeom prst="rect">
             <a:avLst/>
@@ -6517,7 +7281,16 @@
                 <a:latin typeface="Courier New" panose="02070309020205020404" pitchFamily="49" charset="0"/>
                 <a:cs typeface="Courier New" panose="02070309020205020404" pitchFamily="49" charset="0"/>
               </a:rPr>
-              <a:t>Return Time</a:t>
+              <a:t>Late Return</a:t>
+            </a:r>
+          </a:p>
+          <a:p>
+            <a:r>
+              <a:rPr lang="fr-FR" sz="1200" dirty="0">
+                <a:latin typeface="Courier New" panose="02070309020205020404" pitchFamily="49" charset="0"/>
+                <a:cs typeface="Courier New" panose="02070309020205020404" pitchFamily="49" charset="0"/>
+              </a:rPr>
+              <a:t> No previous driver</a:t>
             </a:r>
           </a:p>
         </p:txBody>
@@ -6816,7 +7589,7 @@
         </p:nvSpPr>
         <p:spPr>
           <a:xfrm>
-            <a:off x="5549796" y="4981480"/>
+            <a:off x="3800244" y="4981480"/>
             <a:ext cx="2686639" cy="339362"/>
           </a:xfrm>
           <a:prstGeom prst="rect">
@@ -6874,7 +7647,7 @@
         </p:nvCxnSpPr>
         <p:spPr>
           <a:xfrm>
-            <a:off x="5513892" y="4186964"/>
+            <a:off x="960180" y="3909965"/>
             <a:ext cx="0" cy="1583703"/>
           </a:xfrm>
           <a:prstGeom prst="line">
@@ -6953,7 +7726,7 @@
         </p:nvSpPr>
         <p:spPr>
           <a:xfrm>
-            <a:off x="5138076" y="5813059"/>
+            <a:off x="584364" y="5536060"/>
             <a:ext cx="742511" cy="276999"/>
           </a:xfrm>
           <a:prstGeom prst="rect">
@@ -7189,7 +7962,7 @@
         </p:nvCxnSpPr>
         <p:spPr>
           <a:xfrm>
-            <a:off x="9053106" y="3751194"/>
+            <a:off x="345829" y="3417357"/>
             <a:ext cx="0" cy="1074656"/>
           </a:xfrm>
           <a:prstGeom prst="straightConnector1">
@@ -7231,7 +8004,7 @@
         </p:nvSpPr>
         <p:spPr>
           <a:xfrm>
-            <a:off x="8948076" y="3523301"/>
+            <a:off x="240799" y="3189464"/>
             <a:ext cx="1207382" cy="276999"/>
           </a:xfrm>
           <a:prstGeom prst="rect">
@@ -7312,7 +8085,7 @@
         <p:spPr>
           <a:xfrm>
             <a:off x="6995706" y="520909"/>
-            <a:ext cx="1207382" cy="276999"/>
+            <a:ext cx="1672253" cy="461665"/>
           </a:xfrm>
           <a:prstGeom prst="rect">
             <a:avLst/>
@@ -7330,7 +8103,16 @@
                 <a:latin typeface="Courier New" panose="02070309020205020404" pitchFamily="49" charset="0"/>
                 <a:cs typeface="Courier New" panose="02070309020205020404" pitchFamily="49" charset="0"/>
               </a:rPr>
-              <a:t>Return Time</a:t>
+              <a:t>Late Return</a:t>
+            </a:r>
+          </a:p>
+          <a:p>
+            <a:r>
+              <a:rPr lang="fr-FR" sz="1200" dirty="0">
+                <a:latin typeface="Courier New" panose="02070309020205020404" pitchFamily="49" charset="0"/>
+                <a:cs typeface="Courier New" panose="02070309020205020404" pitchFamily="49" charset="0"/>
+              </a:rPr>
+              <a:t> Previous driver</a:t>
             </a:r>
           </a:p>
         </p:txBody>
@@ -7338,7 +8120,7 @@
     </p:spTree>
     <p:extLst>
       <p:ext uri="{BB962C8B-B14F-4D97-AF65-F5344CB8AC3E}">
-        <p14:creationId xmlns:p14="http://schemas.microsoft.com/office/powerpoint/2010/main" val="1373706002"/>
+        <p14:creationId xmlns:p14="http://schemas.microsoft.com/office/powerpoint/2010/main" val="710411366"/>
       </p:ext>
     </p:extLst>
   </p:cSld>

</xml_diff>

<commit_message>
getaround : work on the slides for next week presentation
</commit_message>
<xml_diff>
--- a/08_deployment/99_Project_getaround/01_getaround_project.pptx
+++ b/08_deployment/99_Project_getaround/01_getaround_project.pptx
@@ -5,15 +5,21 @@
     <p:sldMasterId id="2147483660" r:id="rId1"/>
   </p:sldMasterIdLst>
   <p:notesMasterIdLst>
-    <p:notesMasterId r:id="rId8"/>
+    <p:notesMasterId r:id="rId14"/>
   </p:notesMasterIdLst>
   <p:sldIdLst>
     <p:sldId id="256" r:id="rId2"/>
-    <p:sldId id="258" r:id="rId3"/>
-    <p:sldId id="257" r:id="rId4"/>
-    <p:sldId id="263" r:id="rId5"/>
-    <p:sldId id="264" r:id="rId6"/>
-    <p:sldId id="265" r:id="rId7"/>
+    <p:sldId id="272" r:id="rId3"/>
+    <p:sldId id="266" r:id="rId4"/>
+    <p:sldId id="273" r:id="rId5"/>
+    <p:sldId id="267" r:id="rId6"/>
+    <p:sldId id="270" r:id="rId7"/>
+    <p:sldId id="268" r:id="rId8"/>
+    <p:sldId id="269" r:id="rId9"/>
+    <p:sldId id="257" r:id="rId10"/>
+    <p:sldId id="263" r:id="rId11"/>
+    <p:sldId id="264" r:id="rId12"/>
+    <p:sldId id="265" r:id="rId13"/>
   </p:sldIdLst>
   <p:sldSz cx="12192000" cy="6858000"/>
   <p:notesSz cx="6858000" cy="9144000"/>
@@ -123,7 +129,7 @@
 <file path=ppt/revisionInfo.xml><?xml version="1.0" encoding="utf-8"?>
 <p1510:revInfo xmlns:a="http://schemas.openxmlformats.org/drawingml/2006/main" xmlns:r="http://schemas.openxmlformats.org/officeDocument/2006/relationships" xmlns:p1510="http://schemas.microsoft.com/office/powerpoint/2015/10/main">
   <p1510:revLst>
-    <p1510:client id="{40F711FF-06EA-48FB-94E5-8AF9239032B0}" v="21" dt="2024-09-11T05:06:18.137"/>
+    <p1510:client id="{40F711FF-06EA-48FB-94E5-8AF9239032B0}" v="43" dt="2024-09-15T12:40:48.836"/>
   </p1510:revLst>
 </p1510:revInfo>
 </file>
@@ -659,19 +665,19 @@
   </pc:docChgLst>
   <pc:docChgLst>
     <pc:chgData name="Philippe Baucour" userId="5102170ae7533958" providerId="LiveId" clId="{40F711FF-06EA-48FB-94E5-8AF9239032B0}"/>
-    <pc:docChg chg="undo custSel addSld modSld sldOrd">
-      <pc:chgData name="Philippe Baucour" userId="5102170ae7533958" providerId="LiveId" clId="{40F711FF-06EA-48FB-94E5-8AF9239032B0}" dt="2024-09-11T06:19:14.780" v="700" actId="167"/>
+    <pc:docChg chg="undo custSel addSld delSld modSld sldOrd">
+      <pc:chgData name="Philippe Baucour" userId="5102170ae7533958" providerId="LiveId" clId="{40F711FF-06EA-48FB-94E5-8AF9239032B0}" dt="2024-09-15T12:43:12.050" v="1954" actId="47"/>
       <pc:docMkLst>
         <pc:docMk/>
       </pc:docMkLst>
       <pc:sldChg chg="modSp mod modNotesTx">
-        <pc:chgData name="Philippe Baucour" userId="5102170ae7533958" providerId="LiveId" clId="{40F711FF-06EA-48FB-94E5-8AF9239032B0}" dt="2024-08-26T08:49:06.628" v="58" actId="20577"/>
+        <pc:chgData name="Philippe Baucour" userId="5102170ae7533958" providerId="LiveId" clId="{40F711FF-06EA-48FB-94E5-8AF9239032B0}" dt="2024-09-15T12:08:40.222" v="1532" actId="20577"/>
         <pc:sldMkLst>
           <pc:docMk/>
           <pc:sldMk cId="1392602265" sldId="256"/>
         </pc:sldMkLst>
         <pc:spChg chg="mod">
-          <ac:chgData name="Philippe Baucour" userId="5102170ae7533958" providerId="LiveId" clId="{40F711FF-06EA-48FB-94E5-8AF9239032B0}" dt="2024-08-24T17:17:09.847" v="19" actId="6549"/>
+          <ac:chgData name="Philippe Baucour" userId="5102170ae7533958" providerId="LiveId" clId="{40F711FF-06EA-48FB-94E5-8AF9239032B0}" dt="2024-09-15T12:06:34.728" v="1512" actId="20577"/>
           <ac:spMkLst>
             <pc:docMk/>
             <pc:sldMk cId="1392602265" sldId="256"/>
@@ -679,7 +685,7 @@
           </ac:spMkLst>
         </pc:spChg>
         <pc:spChg chg="mod">
-          <ac:chgData name="Philippe Baucour" userId="5102170ae7533958" providerId="LiveId" clId="{40F711FF-06EA-48FB-94E5-8AF9239032B0}" dt="2024-08-24T17:20:09.779" v="31" actId="27636"/>
+          <ac:chgData name="Philippe Baucour" userId="5102170ae7533958" providerId="LiveId" clId="{40F711FF-06EA-48FB-94E5-8AF9239032B0}" dt="2024-09-15T12:08:40.222" v="1532" actId="20577"/>
           <ac:spMkLst>
             <pc:docMk/>
             <pc:sldMk cId="1392602265" sldId="256"/>
@@ -694,8 +700,8 @@
           <pc:sldMk cId="3201622378" sldId="257"/>
         </pc:sldMkLst>
       </pc:sldChg>
-      <pc:sldChg chg="mod modShow">
-        <pc:chgData name="Philippe Baucour" userId="5102170ae7533958" providerId="LiveId" clId="{40F711FF-06EA-48FB-94E5-8AF9239032B0}" dt="2024-09-06T09:20:15.092" v="63" actId="729"/>
+      <pc:sldChg chg="del mod modShow">
+        <pc:chgData name="Philippe Baucour" userId="5102170ae7533958" providerId="LiveId" clId="{40F711FF-06EA-48FB-94E5-8AF9239032B0}" dt="2024-09-15T12:43:00.187" v="1953" actId="47"/>
         <pc:sldMkLst>
           <pc:docMk/>
           <pc:sldMk cId="246086491" sldId="258"/>
@@ -985,6 +991,422 @@
           <pc:docMk/>
           <pc:sldMk cId="710411366" sldId="265"/>
         </pc:sldMkLst>
+      </pc:sldChg>
+      <pc:sldChg chg="addSp delSp modSp new mod modClrScheme chgLayout modNotesTx">
+        <pc:chgData name="Philippe Baucour" userId="5102170ae7533958" providerId="LiveId" clId="{40F711FF-06EA-48FB-94E5-8AF9239032B0}" dt="2024-09-15T12:38:00.888" v="1902" actId="6549"/>
+        <pc:sldMkLst>
+          <pc:docMk/>
+          <pc:sldMk cId="3580628546" sldId="266"/>
+        </pc:sldMkLst>
+        <pc:spChg chg="mod ord">
+          <ac:chgData name="Philippe Baucour" userId="5102170ae7533958" providerId="LiveId" clId="{40F711FF-06EA-48FB-94E5-8AF9239032B0}" dt="2024-09-15T12:38:00.888" v="1902" actId="6549"/>
+          <ac:spMkLst>
+            <pc:docMk/>
+            <pc:sldMk cId="3580628546" sldId="266"/>
+            <ac:spMk id="2" creationId="{FC7D7D61-5212-F8DF-8A01-7BF2EB86AE7E}"/>
+          </ac:spMkLst>
+        </pc:spChg>
+        <pc:spChg chg="del">
+          <ac:chgData name="Philippe Baucour" userId="5102170ae7533958" providerId="LiveId" clId="{40F711FF-06EA-48FB-94E5-8AF9239032B0}" dt="2024-09-15T12:15:22.457" v="1576"/>
+          <ac:spMkLst>
+            <pc:docMk/>
+            <pc:sldMk cId="3580628546" sldId="266"/>
+            <ac:spMk id="3" creationId="{7C15B039-8894-3B19-F9B1-1B68ABC08070}"/>
+          </ac:spMkLst>
+        </pc:spChg>
+        <pc:spChg chg="add del mod">
+          <ac:chgData name="Philippe Baucour" userId="5102170ae7533958" providerId="LiveId" clId="{40F711FF-06EA-48FB-94E5-8AF9239032B0}" dt="2024-09-15T12:18:41.820" v="1594" actId="700"/>
+          <ac:spMkLst>
+            <pc:docMk/>
+            <pc:sldMk cId="3580628546" sldId="266"/>
+            <ac:spMk id="9" creationId="{6F6EB8D2-F104-B419-54E5-348D37DB7F34}"/>
+          </ac:spMkLst>
+        </pc:spChg>
+        <pc:spChg chg="add mod ord">
+          <ac:chgData name="Philippe Baucour" userId="5102170ae7533958" providerId="LiveId" clId="{40F711FF-06EA-48FB-94E5-8AF9239032B0}" dt="2024-09-15T12:36:36.249" v="1873" actId="20577"/>
+          <ac:spMkLst>
+            <pc:docMk/>
+            <pc:sldMk cId="3580628546" sldId="266"/>
+            <ac:spMk id="12" creationId="{3BF23DB9-20EA-6B31-5964-B4051286AE1C}"/>
+          </ac:spMkLst>
+        </pc:spChg>
+        <pc:picChg chg="add del mod">
+          <ac:chgData name="Philippe Baucour" userId="5102170ae7533958" providerId="LiveId" clId="{40F711FF-06EA-48FB-94E5-8AF9239032B0}" dt="2024-09-15T12:17:15.331" v="1589" actId="21"/>
+          <ac:picMkLst>
+            <pc:docMk/>
+            <pc:sldMk cId="3580628546" sldId="266"/>
+            <ac:picMk id="5" creationId="{59DAF2EC-5648-77E9-552C-5A4723193AB0}"/>
+          </ac:picMkLst>
+        </pc:picChg>
+        <pc:picChg chg="add mod">
+          <ac:chgData name="Philippe Baucour" userId="5102170ae7533958" providerId="LiveId" clId="{40F711FF-06EA-48FB-94E5-8AF9239032B0}" dt="2024-09-15T12:34:59.233" v="1836" actId="1038"/>
+          <ac:picMkLst>
+            <pc:docMk/>
+            <pc:sldMk cId="3580628546" sldId="266"/>
+            <ac:picMk id="7" creationId="{27865B6C-4F03-D048-F461-31FC5E107F55}"/>
+          </ac:picMkLst>
+        </pc:picChg>
+        <pc:picChg chg="add del mod">
+          <ac:chgData name="Philippe Baucour" userId="5102170ae7533958" providerId="LiveId" clId="{40F711FF-06EA-48FB-94E5-8AF9239032B0}" dt="2024-09-15T12:22:58.298" v="1612" actId="21"/>
+          <ac:picMkLst>
+            <pc:docMk/>
+            <pc:sldMk cId="3580628546" sldId="266"/>
+            <ac:picMk id="11" creationId="{44B3A22C-30AF-1092-A41B-E7671122F03F}"/>
+          </ac:picMkLst>
+        </pc:picChg>
+        <pc:picChg chg="add mod">
+          <ac:chgData name="Philippe Baucour" userId="5102170ae7533958" providerId="LiveId" clId="{40F711FF-06EA-48FB-94E5-8AF9239032B0}" dt="2024-09-15T12:35:04.083" v="1852" actId="1038"/>
+          <ac:picMkLst>
+            <pc:docMk/>
+            <pc:sldMk cId="3580628546" sldId="266"/>
+            <ac:picMk id="14" creationId="{AEF54AAA-07A6-5DD6-5763-917D55F13FCD}"/>
+          </ac:picMkLst>
+        </pc:picChg>
+      </pc:sldChg>
+      <pc:sldChg chg="modSp new mod">
+        <pc:chgData name="Philippe Baucour" userId="5102170ae7533958" providerId="LiveId" clId="{40F711FF-06EA-48FB-94E5-8AF9239032B0}" dt="2024-09-15T10:42:23.438" v="761" actId="6549"/>
+        <pc:sldMkLst>
+          <pc:docMk/>
+          <pc:sldMk cId="3903331035" sldId="267"/>
+        </pc:sldMkLst>
+        <pc:spChg chg="mod">
+          <ac:chgData name="Philippe Baucour" userId="5102170ae7533958" providerId="LiveId" clId="{40F711FF-06EA-48FB-94E5-8AF9239032B0}" dt="2024-09-15T10:42:23.438" v="761" actId="6549"/>
+          <ac:spMkLst>
+            <pc:docMk/>
+            <pc:sldMk cId="3903331035" sldId="267"/>
+            <ac:spMk id="2" creationId="{B4D97055-99E9-D072-BFAC-6A2769619FC4}"/>
+          </ac:spMkLst>
+        </pc:spChg>
+      </pc:sldChg>
+      <pc:sldChg chg="addSp modSp new mod">
+        <pc:chgData name="Philippe Baucour" userId="5102170ae7533958" providerId="LiveId" clId="{40F711FF-06EA-48FB-94E5-8AF9239032B0}" dt="2024-09-15T12:01:04.173" v="1398" actId="20577"/>
+        <pc:sldMkLst>
+          <pc:docMk/>
+          <pc:sldMk cId="2699701360" sldId="268"/>
+        </pc:sldMkLst>
+        <pc:spChg chg="mod">
+          <ac:chgData name="Philippe Baucour" userId="5102170ae7533958" providerId="LiveId" clId="{40F711FF-06EA-48FB-94E5-8AF9239032B0}" dt="2024-09-15T10:47:41.949" v="902" actId="20577"/>
+          <ac:spMkLst>
+            <pc:docMk/>
+            <pc:sldMk cId="2699701360" sldId="268"/>
+            <ac:spMk id="2" creationId="{80E264B2-7E88-C9E0-981F-F9A083C5D9E8}"/>
+          </ac:spMkLst>
+        </pc:spChg>
+        <pc:spChg chg="mod">
+          <ac:chgData name="Philippe Baucour" userId="5102170ae7533958" providerId="LiveId" clId="{40F711FF-06EA-48FB-94E5-8AF9239032B0}" dt="2024-09-15T12:01:04.173" v="1398" actId="20577"/>
+          <ac:spMkLst>
+            <pc:docMk/>
+            <pc:sldMk cId="2699701360" sldId="268"/>
+            <ac:spMk id="3" creationId="{53098DBF-2DFC-77BE-B0FF-629FEE740045}"/>
+          </ac:spMkLst>
+        </pc:spChg>
+        <pc:picChg chg="add mod">
+          <ac:chgData name="Philippe Baucour" userId="5102170ae7533958" providerId="LiveId" clId="{40F711FF-06EA-48FB-94E5-8AF9239032B0}" dt="2024-09-15T10:47:23.535" v="900" actId="1076"/>
+          <ac:picMkLst>
+            <pc:docMk/>
+            <pc:sldMk cId="2699701360" sldId="268"/>
+            <ac:picMk id="5" creationId="{2D6ABB88-F757-7A0F-B644-0B6F3238940E}"/>
+          </ac:picMkLst>
+        </pc:picChg>
+      </pc:sldChg>
+      <pc:sldChg chg="addSp delSp modSp new mod modClrScheme chgLayout">
+        <pc:chgData name="Philippe Baucour" userId="5102170ae7533958" providerId="LiveId" clId="{40F711FF-06EA-48FB-94E5-8AF9239032B0}" dt="2024-09-15T12:12:35.856" v="1575" actId="1076"/>
+        <pc:sldMkLst>
+          <pc:docMk/>
+          <pc:sldMk cId="870064705" sldId="269"/>
+        </pc:sldMkLst>
+        <pc:spChg chg="mod ord">
+          <ac:chgData name="Philippe Baucour" userId="5102170ae7533958" providerId="LiveId" clId="{40F711FF-06EA-48FB-94E5-8AF9239032B0}" dt="2024-09-15T10:48:10.157" v="915" actId="700"/>
+          <ac:spMkLst>
+            <pc:docMk/>
+            <pc:sldMk cId="870064705" sldId="269"/>
+            <ac:spMk id="2" creationId="{EE71F234-EA1F-7C6D-6C0D-DF35052DEE0B}"/>
+          </ac:spMkLst>
+        </pc:spChg>
+        <pc:spChg chg="del">
+          <ac:chgData name="Philippe Baucour" userId="5102170ae7533958" providerId="LiveId" clId="{40F711FF-06EA-48FB-94E5-8AF9239032B0}" dt="2024-09-15T10:48:10.157" v="915" actId="700"/>
+          <ac:spMkLst>
+            <pc:docMk/>
+            <pc:sldMk cId="870064705" sldId="269"/>
+            <ac:spMk id="3" creationId="{8106911F-1F50-B214-689E-58AE8D4B1A76}"/>
+          </ac:spMkLst>
+        </pc:spChg>
+        <pc:spChg chg="add del">
+          <ac:chgData name="Philippe Baucour" userId="5102170ae7533958" providerId="LiveId" clId="{40F711FF-06EA-48FB-94E5-8AF9239032B0}" dt="2024-09-15T10:49:16.761" v="917" actId="22"/>
+          <ac:spMkLst>
+            <pc:docMk/>
+            <pc:sldMk cId="870064705" sldId="269"/>
+            <ac:spMk id="5" creationId="{FD484D9A-3A56-9A8B-4538-C63D66D8D8C5}"/>
+          </ac:spMkLst>
+        </pc:spChg>
+        <pc:spChg chg="add mod">
+          <ac:chgData name="Philippe Baucour" userId="5102170ae7533958" providerId="LiveId" clId="{40F711FF-06EA-48FB-94E5-8AF9239032B0}" dt="2024-09-15T12:06:17.746" v="1510" actId="6549"/>
+          <ac:spMkLst>
+            <pc:docMk/>
+            <pc:sldMk cId="870064705" sldId="269"/>
+            <ac:spMk id="12" creationId="{3EDAEE3E-9534-2FE4-E433-C4D06345CDAD}"/>
+          </ac:spMkLst>
+        </pc:spChg>
+        <pc:spChg chg="add mod">
+          <ac:chgData name="Philippe Baucour" userId="5102170ae7533958" providerId="LiveId" clId="{40F711FF-06EA-48FB-94E5-8AF9239032B0}" dt="2024-09-15T12:06:04.112" v="1487" actId="20577"/>
+          <ac:spMkLst>
+            <pc:docMk/>
+            <pc:sldMk cId="870064705" sldId="269"/>
+            <ac:spMk id="13" creationId="{0A092700-8F20-7FBD-C187-6FF0B6C92193}"/>
+          </ac:spMkLst>
+        </pc:spChg>
+        <pc:spChg chg="add mod">
+          <ac:chgData name="Philippe Baucour" userId="5102170ae7533958" providerId="LiveId" clId="{40F711FF-06EA-48FB-94E5-8AF9239032B0}" dt="2024-09-15T12:05:38.022" v="1472" actId="1076"/>
+          <ac:spMkLst>
+            <pc:docMk/>
+            <pc:sldMk cId="870064705" sldId="269"/>
+            <ac:spMk id="14" creationId="{87E7EC36-44BF-F058-40E3-3318A742466F}"/>
+          </ac:spMkLst>
+        </pc:spChg>
+        <pc:spChg chg="add mod">
+          <ac:chgData name="Philippe Baucour" userId="5102170ae7533958" providerId="LiveId" clId="{40F711FF-06EA-48FB-94E5-8AF9239032B0}" dt="2024-09-15T12:10:11.795" v="1564" actId="1037"/>
+          <ac:spMkLst>
+            <pc:docMk/>
+            <pc:sldMk cId="870064705" sldId="269"/>
+            <ac:spMk id="15" creationId="{458D2F9F-204D-5EF0-C7C3-BFF934CE7128}"/>
+          </ac:spMkLst>
+        </pc:spChg>
+        <pc:spChg chg="add mod">
+          <ac:chgData name="Philippe Baucour" userId="5102170ae7533958" providerId="LiveId" clId="{40F711FF-06EA-48FB-94E5-8AF9239032B0}" dt="2024-09-15T12:11:08.059" v="1571" actId="1076"/>
+          <ac:spMkLst>
+            <pc:docMk/>
+            <pc:sldMk cId="870064705" sldId="269"/>
+            <ac:spMk id="16" creationId="{99637A9F-4875-6B35-2C80-E60F31097D41}"/>
+          </ac:spMkLst>
+        </pc:spChg>
+        <pc:picChg chg="add mod modCrop">
+          <ac:chgData name="Philippe Baucour" userId="5102170ae7533958" providerId="LiveId" clId="{40F711FF-06EA-48FB-94E5-8AF9239032B0}" dt="2024-09-15T12:03:23.368" v="1406" actId="1076"/>
+          <ac:picMkLst>
+            <pc:docMk/>
+            <pc:sldMk cId="870064705" sldId="269"/>
+            <ac:picMk id="7" creationId="{25090FA8-5DFE-F79C-2E60-CD349F5FDAB1}"/>
+          </ac:picMkLst>
+        </pc:picChg>
+        <pc:picChg chg="add mod">
+          <ac:chgData name="Philippe Baucour" userId="5102170ae7533958" providerId="LiveId" clId="{40F711FF-06EA-48FB-94E5-8AF9239032B0}" dt="2024-09-15T12:03:34.856" v="1409" actId="1076"/>
+          <ac:picMkLst>
+            <pc:docMk/>
+            <pc:sldMk cId="870064705" sldId="269"/>
+            <ac:picMk id="9" creationId="{3D845B31-CE49-51BC-3AB9-B3DAA408B64A}"/>
+          </ac:picMkLst>
+        </pc:picChg>
+        <pc:picChg chg="add mod">
+          <ac:chgData name="Philippe Baucour" userId="5102170ae7533958" providerId="LiveId" clId="{40F711FF-06EA-48FB-94E5-8AF9239032B0}" dt="2024-09-15T12:04:29.981" v="1413" actId="1076"/>
+          <ac:picMkLst>
+            <pc:docMk/>
+            <pc:sldMk cId="870064705" sldId="269"/>
+            <ac:picMk id="11" creationId="{DC406100-7C11-6592-7844-15E2C8E9B90F}"/>
+          </ac:picMkLst>
+        </pc:picChg>
+        <pc:picChg chg="add mod">
+          <ac:chgData name="Philippe Baucour" userId="5102170ae7533958" providerId="LiveId" clId="{40F711FF-06EA-48FB-94E5-8AF9239032B0}" dt="2024-09-15T12:12:35.856" v="1575" actId="1076"/>
+          <ac:picMkLst>
+            <pc:docMk/>
+            <pc:sldMk cId="870064705" sldId="269"/>
+            <ac:picMk id="17" creationId="{5DAEB0F8-1249-B806-9727-91B0CEFD251C}"/>
+          </ac:picMkLst>
+        </pc:picChg>
+        <pc:picChg chg="add mod">
+          <ac:chgData name="Philippe Baucour" userId="5102170ae7533958" providerId="LiveId" clId="{40F711FF-06EA-48FB-94E5-8AF9239032B0}" dt="2024-09-15T12:12:29.121" v="1574" actId="1076"/>
+          <ac:picMkLst>
+            <pc:docMk/>
+            <pc:sldMk cId="870064705" sldId="269"/>
+            <ac:picMk id="18" creationId="{9F9A45FB-E1CD-C0A9-C031-4112CF122F01}"/>
+          </ac:picMkLst>
+        </pc:picChg>
+        <pc:picChg chg="add mod">
+          <ac:chgData name="Philippe Baucour" userId="5102170ae7533958" providerId="LiveId" clId="{40F711FF-06EA-48FB-94E5-8AF9239032B0}" dt="2024-09-15T12:12:23.477" v="1573" actId="1076"/>
+          <ac:picMkLst>
+            <pc:docMk/>
+            <pc:sldMk cId="870064705" sldId="269"/>
+            <ac:picMk id="19" creationId="{DCD5BCB3-FECD-0F0C-68ED-78B838DFBE0A}"/>
+          </ac:picMkLst>
+        </pc:picChg>
+      </pc:sldChg>
+      <pc:sldChg chg="addSp modSp new mod modNotesTx">
+        <pc:chgData name="Philippe Baucour" userId="5102170ae7533958" providerId="LiveId" clId="{40F711FF-06EA-48FB-94E5-8AF9239032B0}" dt="2024-09-15T12:00:10.226" v="1386" actId="1037"/>
+        <pc:sldMkLst>
+          <pc:docMk/>
+          <pc:sldMk cId="4157245695" sldId="270"/>
+        </pc:sldMkLst>
+        <pc:spChg chg="mod">
+          <ac:chgData name="Philippe Baucour" userId="5102170ae7533958" providerId="LiveId" clId="{40F711FF-06EA-48FB-94E5-8AF9239032B0}" dt="2024-09-15T10:55:01.658" v="973" actId="20577"/>
+          <ac:spMkLst>
+            <pc:docMk/>
+            <pc:sldMk cId="4157245695" sldId="270"/>
+            <ac:spMk id="2" creationId="{111DB58F-DBEF-971C-6E7F-5E73545B868A}"/>
+          </ac:spMkLst>
+        </pc:spChg>
+        <pc:spChg chg="mod">
+          <ac:chgData name="Philippe Baucour" userId="5102170ae7533958" providerId="LiveId" clId="{40F711FF-06EA-48FB-94E5-8AF9239032B0}" dt="2024-09-15T11:53:50.486" v="1168" actId="20577"/>
+          <ac:spMkLst>
+            <pc:docMk/>
+            <pc:sldMk cId="4157245695" sldId="270"/>
+            <ac:spMk id="3" creationId="{3E592FDF-3643-E91C-8F24-9D2C34BDDD80}"/>
+          </ac:spMkLst>
+        </pc:spChg>
+        <pc:spChg chg="add mod">
+          <ac:chgData name="Philippe Baucour" userId="5102170ae7533958" providerId="LiveId" clId="{40F711FF-06EA-48FB-94E5-8AF9239032B0}" dt="2024-09-15T11:54:25.137" v="1336" actId="1038"/>
+          <ac:spMkLst>
+            <pc:docMk/>
+            <pc:sldMk cId="4157245695" sldId="270"/>
+            <ac:spMk id="10" creationId="{6CB5A37B-494E-775E-BDE7-0C04F375E69F}"/>
+          </ac:spMkLst>
+        </pc:spChg>
+        <pc:picChg chg="add mod">
+          <ac:chgData name="Philippe Baucour" userId="5102170ae7533958" providerId="LiveId" clId="{40F711FF-06EA-48FB-94E5-8AF9239032B0}" dt="2024-09-15T12:00:10.226" v="1386" actId="1037"/>
+          <ac:picMkLst>
+            <pc:docMk/>
+            <pc:sldMk cId="4157245695" sldId="270"/>
+            <ac:picMk id="5" creationId="{CF5491DE-BCC9-7085-74C9-9EF97B3DCD05}"/>
+          </ac:picMkLst>
+        </pc:picChg>
+        <pc:picChg chg="add mod">
+          <ac:chgData name="Philippe Baucour" userId="5102170ae7533958" providerId="LiveId" clId="{40F711FF-06EA-48FB-94E5-8AF9239032B0}" dt="2024-09-15T11:54:17.265" v="1261" actId="1038"/>
+          <ac:picMkLst>
+            <pc:docMk/>
+            <pc:sldMk cId="4157245695" sldId="270"/>
+            <ac:picMk id="7" creationId="{AAC86818-0C7F-92EC-3533-472B4874AC08}"/>
+          </ac:picMkLst>
+        </pc:picChg>
+        <pc:picChg chg="add mod">
+          <ac:chgData name="Philippe Baucour" userId="5102170ae7533958" providerId="LiveId" clId="{40F711FF-06EA-48FB-94E5-8AF9239032B0}" dt="2024-09-15T11:54:11.175" v="1233" actId="1038"/>
+          <ac:picMkLst>
+            <pc:docMk/>
+            <pc:sldMk cId="4157245695" sldId="270"/>
+            <ac:picMk id="9" creationId="{780A8172-615B-B4DE-815B-9DCE85BA51AF}"/>
+          </ac:picMkLst>
+        </pc:picChg>
+      </pc:sldChg>
+      <pc:sldChg chg="addSp delSp modSp new del mod">
+        <pc:chgData name="Philippe Baucour" userId="5102170ae7533958" providerId="LiveId" clId="{40F711FF-06EA-48FB-94E5-8AF9239032B0}" dt="2024-09-15T12:43:12.050" v="1954" actId="47"/>
+        <pc:sldMkLst>
+          <pc:docMk/>
+          <pc:sldMk cId="317899141" sldId="271"/>
+        </pc:sldMkLst>
+        <pc:picChg chg="add del mod">
+          <ac:chgData name="Philippe Baucour" userId="5102170ae7533958" providerId="LiveId" clId="{40F711FF-06EA-48FB-94E5-8AF9239032B0}" dt="2024-09-15T12:38:21.830" v="1905" actId="21"/>
+          <ac:picMkLst>
+            <pc:docMk/>
+            <pc:sldMk cId="317899141" sldId="271"/>
+            <ac:picMk id="5" creationId="{59DAF2EC-5648-77E9-552C-5A4723193AB0}"/>
+          </ac:picMkLst>
+        </pc:picChg>
+      </pc:sldChg>
+      <pc:sldChg chg="addSp modSp new mod ord modNotesTx">
+        <pc:chgData name="Philippe Baucour" userId="5102170ae7533958" providerId="LiveId" clId="{40F711FF-06EA-48FB-94E5-8AF9239032B0}" dt="2024-09-15T12:31:25.249" v="1761" actId="1035"/>
+        <pc:sldMkLst>
+          <pc:docMk/>
+          <pc:sldMk cId="706215125" sldId="272"/>
+        </pc:sldMkLst>
+        <pc:spChg chg="mod">
+          <ac:chgData name="Philippe Baucour" userId="5102170ae7533958" providerId="LiveId" clId="{40F711FF-06EA-48FB-94E5-8AF9239032B0}" dt="2024-09-15T12:21:34.400" v="1602"/>
+          <ac:spMkLst>
+            <pc:docMk/>
+            <pc:sldMk cId="706215125" sldId="272"/>
+            <ac:spMk id="2" creationId="{E4746BB8-0AD8-17AF-FDFF-D5E39420DCC3}"/>
+          </ac:spMkLst>
+        </pc:spChg>
+        <pc:spChg chg="add mod">
+          <ac:chgData name="Philippe Baucour" userId="5102170ae7533958" providerId="LiveId" clId="{40F711FF-06EA-48FB-94E5-8AF9239032B0}" dt="2024-09-15T12:25:57.650" v="1639" actId="1037"/>
+          <ac:spMkLst>
+            <pc:docMk/>
+            <pc:sldMk cId="706215125" sldId="272"/>
+            <ac:spMk id="7" creationId="{6060BC2E-5019-C04F-D81E-2789ECAE25E0}"/>
+          </ac:spMkLst>
+        </pc:spChg>
+        <pc:spChg chg="add mod">
+          <ac:chgData name="Philippe Baucour" userId="5102170ae7533958" providerId="LiveId" clId="{40F711FF-06EA-48FB-94E5-8AF9239032B0}" dt="2024-09-15T12:30:11.483" v="1740" actId="20577"/>
+          <ac:spMkLst>
+            <pc:docMk/>
+            <pc:sldMk cId="706215125" sldId="272"/>
+            <ac:spMk id="8" creationId="{F9727D45-6A67-A4D5-645D-DC8717284C4E}"/>
+          </ac:spMkLst>
+        </pc:spChg>
+        <pc:picChg chg="add mod">
+          <ac:chgData name="Philippe Baucour" userId="5102170ae7533958" providerId="LiveId" clId="{40F711FF-06EA-48FB-94E5-8AF9239032B0}" dt="2024-09-15T12:22:48.748" v="1610" actId="1076"/>
+          <ac:picMkLst>
+            <pc:docMk/>
+            <pc:sldMk cId="706215125" sldId="272"/>
+            <ac:picMk id="4" creationId="{553A133D-0173-BB18-F704-971391777E60}"/>
+          </ac:picMkLst>
+        </pc:picChg>
+        <pc:picChg chg="add mod">
+          <ac:chgData name="Philippe Baucour" userId="5102170ae7533958" providerId="LiveId" clId="{40F711FF-06EA-48FB-94E5-8AF9239032B0}" dt="2024-09-15T12:22:52.715" v="1611" actId="1076"/>
+          <ac:picMkLst>
+            <pc:docMk/>
+            <pc:sldMk cId="706215125" sldId="272"/>
+            <ac:picMk id="6" creationId="{0354AD57-A904-D0BC-7AD9-8D76056E8050}"/>
+          </ac:picMkLst>
+        </pc:picChg>
+        <pc:picChg chg="add mod">
+          <ac:chgData name="Philippe Baucour" userId="5102170ae7533958" providerId="LiveId" clId="{40F711FF-06EA-48FB-94E5-8AF9239032B0}" dt="2024-09-15T12:31:25.249" v="1761" actId="1035"/>
+          <ac:picMkLst>
+            <pc:docMk/>
+            <pc:sldMk cId="706215125" sldId="272"/>
+            <ac:picMk id="10" creationId="{3BC81B83-FC89-A55D-B0AA-907A25D78F59}"/>
+          </ac:picMkLst>
+        </pc:picChg>
+        <pc:picChg chg="add mod">
+          <ac:chgData name="Philippe Baucour" userId="5102170ae7533958" providerId="LiveId" clId="{40F711FF-06EA-48FB-94E5-8AF9239032B0}" dt="2024-09-15T12:23:17.094" v="1614" actId="1076"/>
+          <ac:picMkLst>
+            <pc:docMk/>
+            <pc:sldMk cId="706215125" sldId="272"/>
+            <ac:picMk id="11" creationId="{44B3A22C-30AF-1092-A41B-E7671122F03F}"/>
+          </ac:picMkLst>
+        </pc:picChg>
+      </pc:sldChg>
+      <pc:sldChg chg="addSp delSp modSp new mod">
+        <pc:chgData name="Philippe Baucour" userId="5102170ae7533958" providerId="LiveId" clId="{40F711FF-06EA-48FB-94E5-8AF9239032B0}" dt="2024-09-15T12:41:39.110" v="1952" actId="1076"/>
+        <pc:sldMkLst>
+          <pc:docMk/>
+          <pc:sldMk cId="585511404" sldId="273"/>
+        </pc:sldMkLst>
+        <pc:spChg chg="mod">
+          <ac:chgData name="Philippe Baucour" userId="5102170ae7533958" providerId="LiveId" clId="{40F711FF-06EA-48FB-94E5-8AF9239032B0}" dt="2024-09-15T12:38:13.238" v="1904"/>
+          <ac:spMkLst>
+            <pc:docMk/>
+            <pc:sldMk cId="585511404" sldId="273"/>
+            <ac:spMk id="2" creationId="{ACD283A2-235E-3D8D-4CCF-84779E1B1693}"/>
+          </ac:spMkLst>
+        </pc:spChg>
+        <pc:spChg chg="mod">
+          <ac:chgData name="Philippe Baucour" userId="5102170ae7533958" providerId="LiveId" clId="{40F711FF-06EA-48FB-94E5-8AF9239032B0}" dt="2024-09-15T12:40:29.927" v="1920"/>
+          <ac:spMkLst>
+            <pc:docMk/>
+            <pc:sldMk cId="585511404" sldId="273"/>
+            <ac:spMk id="3" creationId="{8F29940B-4FD0-ABE4-DB5C-9C9331F1A44D}"/>
+          </ac:spMkLst>
+        </pc:spChg>
+        <pc:picChg chg="add mod">
+          <ac:chgData name="Philippe Baucour" userId="5102170ae7533958" providerId="LiveId" clId="{40F711FF-06EA-48FB-94E5-8AF9239032B0}" dt="2024-09-15T12:41:29.998" v="1951" actId="1076"/>
+          <ac:picMkLst>
+            <pc:docMk/>
+            <pc:sldMk cId="585511404" sldId="273"/>
+            <ac:picMk id="5" creationId="{59DAF2EC-5648-77E9-552C-5A4723193AB0}"/>
+          </ac:picMkLst>
+        </pc:picChg>
+        <pc:picChg chg="add mod">
+          <ac:chgData name="Philippe Baucour" userId="5102170ae7533958" providerId="LiveId" clId="{40F711FF-06EA-48FB-94E5-8AF9239032B0}" dt="2024-09-15T12:41:39.110" v="1952" actId="1076"/>
+          <ac:picMkLst>
+            <pc:docMk/>
+            <pc:sldMk cId="585511404" sldId="273"/>
+            <ac:picMk id="6" creationId="{1C7ADBB9-4A2B-F296-AA53-6B93BEEBDA66}"/>
+          </ac:picMkLst>
+        </pc:picChg>
+        <pc:picChg chg="add del mod">
+          <ac:chgData name="Philippe Baucour" userId="5102170ae7533958" providerId="LiveId" clId="{40F711FF-06EA-48FB-94E5-8AF9239032B0}" dt="2024-09-15T12:41:00.054" v="1924" actId="478"/>
+          <ac:picMkLst>
+            <pc:docMk/>
+            <pc:sldMk cId="585511404" sldId="273"/>
+            <ac:picMk id="7" creationId="{61D4C087-E96E-F587-4764-66EEB23DC30F}"/>
+          </ac:picMkLst>
+        </pc:picChg>
       </pc:sldChg>
     </pc:docChg>
   </pc:docChgLst>
@@ -1975,7 +2397,7 @@
           <a:p>
             <a:fld id="{FD1752CD-A7D2-4825-BC26-9DAEFBD0A5FF}" type="datetimeFigureOut">
               <a:rPr lang="fr-FR" smtClean="0"/>
-              <a:t>11/09/2024</a:t>
+              <a:t>15/09/2024</a:t>
             </a:fld>
             <a:endParaRPr lang="fr-FR"/>
           </a:p>
@@ -2581,55 +3003,200 @@
           <a:lstStyle/>
           <a:p>
             <a:r>
-              <a:rPr lang="en-US" dirty="0"/>
-              <a:t>EDA                     	: The recipe</a:t>
-            </a:r>
-          </a:p>
-          <a:p>
-            <a:r>
-              <a:rPr lang="en-US" dirty="0"/>
-              <a:t>Features Engineering	: The secret sauce</a:t>
-            </a:r>
-          </a:p>
-          <a:p>
-            <a:r>
-              <a:rPr lang="en-US" dirty="0"/>
-              <a:t>Baseline model          	: The first taste</a:t>
-            </a:r>
-          </a:p>
-          <a:p>
-            <a:r>
-              <a:rPr lang="en-US" dirty="0"/>
-              <a:t>Interpreting results    	: The tasting notes</a:t>
-            </a:r>
-          </a:p>
-          <a:p>
-            <a:endParaRPr lang="en-US" dirty="0"/>
-          </a:p>
-          <a:p>
-            <a:r>
-              <a:rPr lang="en-US" dirty="0"/>
-              <a:t>Don't mess with EDA     	: Never!</a:t>
-            </a:r>
-          </a:p>
-          <a:p>
-            <a:r>
-              <a:rPr lang="en-US" dirty="0"/>
-              <a:t>Feature engineering	: Smart!</a:t>
-            </a:r>
-          </a:p>
-          <a:p>
-            <a:r>
-              <a:rPr lang="en-US" dirty="0"/>
-              <a:t>Get a baseline model    	: Fast!</a:t>
-            </a:r>
-          </a:p>
-          <a:p>
-            <a:r>
-              <a:rPr lang="en-US" dirty="0"/>
-              <a:t>Results analysis        	: Always! </a:t>
-            </a:r>
-            <a:endParaRPr lang="fr-FR" dirty="0"/>
+              <a:rPr lang="en-US" b="0" dirty="0">
+                <a:solidFill>
+                  <a:srgbClr val="6796E6"/>
+                </a:solidFill>
+                <a:effectLst/>
+                <a:latin typeface="JetBrains Mono" panose="02000009000000000000" pitchFamily="49" charset="0"/>
+              </a:rPr>
+              <a:t>*</a:t>
+            </a:r>
+            <a:r>
+              <a:rPr lang="en-US" b="0" dirty="0">
+                <a:solidFill>
+                  <a:srgbClr val="CCCCCC"/>
+                </a:solidFill>
+                <a:effectLst/>
+                <a:latin typeface="JetBrains Mono" panose="02000009000000000000" pitchFamily="49" charset="0"/>
+              </a:rPr>
+              <a:t> When 2 bookings are consecutive with a Time $</a:t>
+            </a:r>
+            <a:r>
+              <a:rPr lang="en-US" b="0" dirty="0">
+                <a:solidFill>
+                  <a:srgbClr val="569CD6"/>
+                </a:solidFill>
+                <a:effectLst/>
+                <a:latin typeface="JetBrains Mono" panose="02000009000000000000" pitchFamily="49" charset="0"/>
+              </a:rPr>
+              <a:t>\Delta</a:t>
+            </a:r>
+            <a:r>
+              <a:rPr lang="en-US" b="0" dirty="0">
+                <a:solidFill>
+                  <a:srgbClr val="CCCCCC"/>
+                </a:solidFill>
+                <a:effectLst/>
+                <a:latin typeface="JetBrains Mono" panose="02000009000000000000" pitchFamily="49" charset="0"/>
+              </a:rPr>
+              <a:t>$ between them most of the rentals are on time (returns happen before </a:t>
+            </a:r>
+            <a:r>
+              <a:rPr lang="en-US" b="0" dirty="0">
+                <a:solidFill>
+                  <a:srgbClr val="CE9178"/>
+                </a:solidFill>
+                <a:effectLst/>
+                <a:latin typeface="JetBrains Mono" panose="02000009000000000000" pitchFamily="49" charset="0"/>
+              </a:rPr>
+              <a:t>`</a:t>
+            </a:r>
+            <a:r>
+              <a:rPr lang="en-US" b="0" dirty="0" err="1">
+                <a:solidFill>
+                  <a:srgbClr val="CE9178"/>
+                </a:solidFill>
+                <a:effectLst/>
+                <a:latin typeface="JetBrains Mono" panose="02000009000000000000" pitchFamily="49" charset="0"/>
+              </a:rPr>
+              <a:t>time_delta_with_previous_rental_in_minutes</a:t>
+            </a:r>
+            <a:r>
+              <a:rPr lang="en-US" b="0" dirty="0">
+                <a:solidFill>
+                  <a:srgbClr val="CE9178"/>
+                </a:solidFill>
+                <a:effectLst/>
+                <a:latin typeface="JetBrains Mono" panose="02000009000000000000" pitchFamily="49" charset="0"/>
+              </a:rPr>
+              <a:t>`</a:t>
+            </a:r>
+            <a:r>
+              <a:rPr lang="en-US" b="0" dirty="0">
+                <a:solidFill>
+                  <a:srgbClr val="CCCCCC"/>
+                </a:solidFill>
+                <a:effectLst/>
+                <a:latin typeface="JetBrains Mono" panose="02000009000000000000" pitchFamily="49" charset="0"/>
+              </a:rPr>
+              <a:t>)</a:t>
+            </a:r>
+          </a:p>
+          <a:p>
+            <a:r>
+              <a:rPr lang="en-US" b="0" dirty="0">
+                <a:solidFill>
+                  <a:srgbClr val="CCCCCC"/>
+                </a:solidFill>
+                <a:effectLst/>
+                <a:latin typeface="JetBrains Mono" panose="02000009000000000000" pitchFamily="49" charset="0"/>
+              </a:rPr>
+              <a:t>    </a:t>
+            </a:r>
+            <a:r>
+              <a:rPr lang="en-US" b="0" dirty="0">
+                <a:solidFill>
+                  <a:srgbClr val="6796E6"/>
+                </a:solidFill>
+                <a:effectLst/>
+                <a:latin typeface="JetBrains Mono" panose="02000009000000000000" pitchFamily="49" charset="0"/>
+              </a:rPr>
+              <a:t>*</a:t>
+            </a:r>
+            <a:r>
+              <a:rPr lang="en-US" b="0" dirty="0">
+                <a:solidFill>
+                  <a:srgbClr val="CCCCCC"/>
+                </a:solidFill>
+                <a:effectLst/>
+                <a:latin typeface="JetBrains Mono" panose="02000009000000000000" pitchFamily="49" charset="0"/>
+              </a:rPr>
+              <a:t> See 270 vs 1245</a:t>
+            </a:r>
+          </a:p>
+          <a:p>
+            <a:endParaRPr lang="en-US" b="0" dirty="0">
+              <a:solidFill>
+                <a:srgbClr val="6796E6"/>
+              </a:solidFill>
+              <a:effectLst/>
+              <a:latin typeface="JetBrains Mono" panose="02000009000000000000" pitchFamily="49" charset="0"/>
+            </a:endParaRPr>
+          </a:p>
+          <a:p>
+            <a:r>
+              <a:rPr lang="en-US" b="0" dirty="0">
+                <a:solidFill>
+                  <a:srgbClr val="6796E6"/>
+                </a:solidFill>
+                <a:effectLst/>
+                <a:latin typeface="JetBrains Mono" panose="02000009000000000000" pitchFamily="49" charset="0"/>
+              </a:rPr>
+              <a:t>*</a:t>
+            </a:r>
+            <a:r>
+              <a:rPr lang="en-US" b="0" dirty="0">
+                <a:solidFill>
+                  <a:srgbClr val="CCCCCC"/>
+                </a:solidFill>
+                <a:effectLst/>
+                <a:latin typeface="JetBrains Mono" panose="02000009000000000000" pitchFamily="49" charset="0"/>
+              </a:rPr>
+              <a:t> When there is no Time $</a:t>
+            </a:r>
+            <a:r>
+              <a:rPr lang="en-US" b="0" dirty="0">
+                <a:solidFill>
+                  <a:srgbClr val="569CD6"/>
+                </a:solidFill>
+                <a:effectLst/>
+                <a:latin typeface="JetBrains Mono" panose="02000009000000000000" pitchFamily="49" charset="0"/>
+              </a:rPr>
+              <a:t>\Delta</a:t>
+            </a:r>
+            <a:r>
+              <a:rPr lang="en-US" b="0" dirty="0">
+                <a:solidFill>
+                  <a:srgbClr val="CCCCCC"/>
+                </a:solidFill>
+                <a:effectLst/>
+                <a:latin typeface="JetBrains Mono" panose="02000009000000000000" pitchFamily="49" charset="0"/>
+              </a:rPr>
+              <a:t>$ (no previous driver) most of the returns are late</a:t>
+            </a:r>
+          </a:p>
+          <a:p>
+            <a:r>
+              <a:rPr lang="en-US" b="0" dirty="0">
+                <a:solidFill>
+                  <a:srgbClr val="CCCCCC"/>
+                </a:solidFill>
+                <a:effectLst/>
+                <a:latin typeface="JetBrains Mono" panose="02000009000000000000" pitchFamily="49" charset="0"/>
+              </a:rPr>
+              <a:t>    </a:t>
+            </a:r>
+            <a:r>
+              <a:rPr lang="en-US" b="0" dirty="0">
+                <a:solidFill>
+                  <a:srgbClr val="6796E6"/>
+                </a:solidFill>
+                <a:effectLst/>
+                <a:latin typeface="JetBrains Mono" panose="02000009000000000000" pitchFamily="49" charset="0"/>
+              </a:rPr>
+              <a:t>*</a:t>
+            </a:r>
+            <a:r>
+              <a:rPr lang="en-US" b="0" dirty="0">
+                <a:solidFill>
+                  <a:srgbClr val="CCCCCC"/>
+                </a:solidFill>
+                <a:effectLst/>
+                <a:latin typeface="JetBrains Mono" panose="02000009000000000000" pitchFamily="49" charset="0"/>
+              </a:rPr>
+              <a:t> See 8602 vs 6228</a:t>
+            </a:r>
           </a:p>
           <a:p>
             <a:endParaRPr lang="fr-FR" dirty="0"/>
@@ -2653,7 +3220,726 @@
           <a:p>
             <a:fld id="{341AEC00-4977-4C47-A11B-52155DC12F54}" type="slidenum">
               <a:rPr lang="fr-FR" smtClean="0"/>
+              <a:t>2</a:t>
+            </a:fld>
+            <a:endParaRPr lang="fr-FR"/>
+          </a:p>
+        </p:txBody>
+      </p:sp>
+    </p:spTree>
+    <p:extLst>
+      <p:ext uri="{BB962C8B-B14F-4D97-AF65-F5344CB8AC3E}">
+        <p14:creationId xmlns:p14="http://schemas.microsoft.com/office/powerpoint/2010/main" val="2268223710"/>
+      </p:ext>
+    </p:extLst>
+  </p:cSld>
+  <p:clrMapOvr>
+    <a:masterClrMapping/>
+  </p:clrMapOvr>
+</p:notes>
+</file>
+
+<file path=ppt/notesSlides/notesSlide3.xml><?xml version="1.0" encoding="utf-8"?>
+<p:notes xmlns:a="http://schemas.openxmlformats.org/drawingml/2006/main" xmlns:r="http://schemas.openxmlformats.org/officeDocument/2006/relationships" xmlns:p="http://schemas.openxmlformats.org/presentationml/2006/main">
+  <p:cSld>
+    <p:spTree>
+      <p:nvGrpSpPr>
+        <p:cNvPr id="1" name=""/>
+        <p:cNvGrpSpPr/>
+        <p:nvPr/>
+      </p:nvGrpSpPr>
+      <p:grpSpPr>
+        <a:xfrm>
+          <a:off x="0" y="0"/>
+          <a:ext cx="0" cy="0"/>
+          <a:chOff x="0" y="0"/>
+          <a:chExt cx="0" cy="0"/>
+        </a:xfrm>
+      </p:grpSpPr>
+      <p:sp>
+        <p:nvSpPr>
+          <p:cNvPr id="2" name="Espace réservé de l'image des diapositives 1"/>
+          <p:cNvSpPr>
+            <a:spLocks noGrp="1" noRot="1" noChangeAspect="1"/>
+          </p:cNvSpPr>
+          <p:nvPr>
+            <p:ph type="sldImg"/>
+          </p:nvPr>
+        </p:nvSpPr>
+        <p:spPr/>
+      </p:sp>
+      <p:sp>
+        <p:nvSpPr>
+          <p:cNvPr id="3" name="Espace réservé des notes 2"/>
+          <p:cNvSpPr>
+            <a:spLocks noGrp="1"/>
+          </p:cNvSpPr>
+          <p:nvPr>
+            <p:ph type="body" idx="1"/>
+          </p:nvPr>
+        </p:nvSpPr>
+        <p:spPr/>
+        <p:txBody>
+          <a:bodyPr/>
+          <a:lstStyle/>
+          <a:p>
+            <a:r>
+              <a:rPr lang="fr-FR" dirty="0"/>
+              <a:t>Q2</a:t>
+            </a:r>
+          </a:p>
+          <a:p>
+            <a:r>
+              <a:rPr lang="en-US" b="0" dirty="0">
+                <a:solidFill>
+                  <a:srgbClr val="CCCCCC"/>
+                </a:solidFill>
+                <a:effectLst/>
+                <a:latin typeface="JetBrains Mono" panose="02000009000000000000" pitchFamily="49" charset="0"/>
+              </a:rPr>
+              <a:t>We consider as problematic the following kind of returns :</a:t>
+            </a:r>
+          </a:p>
+          <a:p>
+            <a:r>
+              <a:rPr lang="en-US" b="0" dirty="0">
+                <a:solidFill>
+                  <a:srgbClr val="6796E6"/>
+                </a:solidFill>
+                <a:effectLst/>
+                <a:latin typeface="JetBrains Mono" panose="02000009000000000000" pitchFamily="49" charset="0"/>
+              </a:rPr>
+              <a:t>1.</a:t>
+            </a:r>
+            <a:r>
+              <a:rPr lang="en-US" b="0" dirty="0">
+                <a:solidFill>
+                  <a:srgbClr val="CCCCCC"/>
+                </a:solidFill>
+                <a:effectLst/>
+                <a:latin typeface="JetBrains Mono" panose="02000009000000000000" pitchFamily="49" charset="0"/>
+              </a:rPr>
+              <a:t> Cars returned after Checkout</a:t>
+            </a:r>
+          </a:p>
+          <a:p>
+            <a:r>
+              <a:rPr lang="en-US" b="0" dirty="0">
+                <a:solidFill>
+                  <a:srgbClr val="CCCCCC"/>
+                </a:solidFill>
+                <a:effectLst/>
+                <a:latin typeface="JetBrains Mono" panose="02000009000000000000" pitchFamily="49" charset="0"/>
+              </a:rPr>
+              <a:t>    </a:t>
+            </a:r>
+            <a:r>
+              <a:rPr lang="en-US" b="0" dirty="0">
+                <a:solidFill>
+                  <a:srgbClr val="6796E6"/>
+                </a:solidFill>
+                <a:effectLst/>
+                <a:latin typeface="JetBrains Mono" panose="02000009000000000000" pitchFamily="49" charset="0"/>
+              </a:rPr>
+              <a:t>*</a:t>
+            </a:r>
+            <a:r>
+              <a:rPr lang="en-US" b="0" dirty="0">
+                <a:solidFill>
+                  <a:srgbClr val="CCCCCC"/>
+                </a:solidFill>
+                <a:effectLst/>
+                <a:latin typeface="JetBrains Mono" panose="02000009000000000000" pitchFamily="49" charset="0"/>
+              </a:rPr>
+              <a:t> Because the owner of the car can't use it  </a:t>
+            </a:r>
+          </a:p>
+          <a:p>
+            <a:r>
+              <a:rPr lang="en-US" b="0" dirty="0">
+                <a:solidFill>
+                  <a:srgbClr val="6796E6"/>
+                </a:solidFill>
+                <a:effectLst/>
+                <a:latin typeface="JetBrains Mono" panose="02000009000000000000" pitchFamily="49" charset="0"/>
+              </a:rPr>
+              <a:t>1.</a:t>
+            </a:r>
+            <a:r>
+              <a:rPr lang="en-US" b="0" dirty="0">
+                <a:solidFill>
+                  <a:srgbClr val="CCCCCC"/>
+                </a:solidFill>
+                <a:effectLst/>
+                <a:latin typeface="JetBrains Mono" panose="02000009000000000000" pitchFamily="49" charset="0"/>
+              </a:rPr>
+              <a:t> Cars returned after Time $</a:t>
+            </a:r>
+            <a:r>
+              <a:rPr lang="en-US" b="0" dirty="0">
+                <a:solidFill>
+                  <a:srgbClr val="569CD6"/>
+                </a:solidFill>
+                <a:effectLst/>
+                <a:latin typeface="JetBrains Mono" panose="02000009000000000000" pitchFamily="49" charset="0"/>
+              </a:rPr>
+              <a:t>\Delta</a:t>
+            </a:r>
+            <a:r>
+              <a:rPr lang="en-US" b="0" dirty="0">
+                <a:solidFill>
+                  <a:srgbClr val="CCCCCC"/>
+                </a:solidFill>
+                <a:effectLst/>
+                <a:latin typeface="JetBrains Mono" panose="02000009000000000000" pitchFamily="49" charset="0"/>
+              </a:rPr>
+              <a:t>$</a:t>
+            </a:r>
+          </a:p>
+          <a:p>
+            <a:r>
+              <a:rPr lang="en-US" b="0" dirty="0">
+                <a:solidFill>
+                  <a:srgbClr val="CCCCCC"/>
+                </a:solidFill>
+                <a:effectLst/>
+                <a:latin typeface="JetBrains Mono" panose="02000009000000000000" pitchFamily="49" charset="0"/>
+              </a:rPr>
+              <a:t>    </a:t>
+            </a:r>
+            <a:r>
+              <a:rPr lang="en-US" b="0" dirty="0">
+                <a:solidFill>
+                  <a:srgbClr val="6796E6"/>
+                </a:solidFill>
+                <a:effectLst/>
+                <a:latin typeface="JetBrains Mono" panose="02000009000000000000" pitchFamily="49" charset="0"/>
+              </a:rPr>
+              <a:t>*</a:t>
+            </a:r>
+            <a:r>
+              <a:rPr lang="en-US" b="0" dirty="0">
+                <a:solidFill>
+                  <a:srgbClr val="CCCCCC"/>
+                </a:solidFill>
+                <a:effectLst/>
+                <a:latin typeface="JetBrains Mono" panose="02000009000000000000" pitchFamily="49" charset="0"/>
+              </a:rPr>
+              <a:t> Because the next driver can't get the car</a:t>
+            </a:r>
+          </a:p>
+          <a:p>
+            <a:r>
+              <a:rPr lang="en-US" b="0" dirty="0">
+                <a:solidFill>
+                  <a:srgbClr val="6796E6"/>
+                </a:solidFill>
+                <a:effectLst/>
+                <a:latin typeface="JetBrains Mono" panose="02000009000000000000" pitchFamily="49" charset="0"/>
+              </a:rPr>
+              <a:t>1.</a:t>
+            </a:r>
+            <a:r>
+              <a:rPr lang="en-US" b="0" dirty="0">
+                <a:solidFill>
+                  <a:srgbClr val="CCCCCC"/>
+                </a:solidFill>
+                <a:effectLst/>
+                <a:latin typeface="JetBrains Mono" panose="02000009000000000000" pitchFamily="49" charset="0"/>
+              </a:rPr>
+              <a:t> The number of bookings which are canceled because the previous driver is late</a:t>
+            </a:r>
+          </a:p>
+          <a:p>
+            <a:endParaRPr lang="fr-FR" dirty="0"/>
+          </a:p>
+        </p:txBody>
+      </p:sp>
+      <p:sp>
+        <p:nvSpPr>
+          <p:cNvPr id="4" name="Espace réservé du numéro de diapositive 3"/>
+          <p:cNvSpPr>
+            <a:spLocks noGrp="1"/>
+          </p:cNvSpPr>
+          <p:nvPr>
+            <p:ph type="sldNum" sz="quarter" idx="5"/>
+          </p:nvPr>
+        </p:nvSpPr>
+        <p:spPr/>
+        <p:txBody>
+          <a:bodyPr/>
+          <a:lstStyle/>
+          <a:p>
+            <a:fld id="{341AEC00-4977-4C47-A11B-52155DC12F54}" type="slidenum">
+              <a:rPr lang="fr-FR" smtClean="0"/>
               <a:t>3</a:t>
+            </a:fld>
+            <a:endParaRPr lang="fr-FR"/>
+          </a:p>
+        </p:txBody>
+      </p:sp>
+    </p:spTree>
+    <p:extLst>
+      <p:ext uri="{BB962C8B-B14F-4D97-AF65-F5344CB8AC3E}">
+        <p14:creationId xmlns:p14="http://schemas.microsoft.com/office/powerpoint/2010/main" val="2599063757"/>
+      </p:ext>
+    </p:extLst>
+  </p:cSld>
+  <p:clrMapOvr>
+    <a:masterClrMapping/>
+  </p:clrMapOvr>
+</p:notes>
+</file>
+
+<file path=ppt/notesSlides/notesSlide4.xml><?xml version="1.0" encoding="utf-8"?>
+<p:notes xmlns:a="http://schemas.openxmlformats.org/drawingml/2006/main" xmlns:r="http://schemas.openxmlformats.org/officeDocument/2006/relationships" xmlns:p="http://schemas.openxmlformats.org/presentationml/2006/main">
+  <p:cSld>
+    <p:spTree>
+      <p:nvGrpSpPr>
+        <p:cNvPr id="1" name=""/>
+        <p:cNvGrpSpPr/>
+        <p:nvPr/>
+      </p:nvGrpSpPr>
+      <p:grpSpPr>
+        <a:xfrm>
+          <a:off x="0" y="0"/>
+          <a:ext cx="0" cy="0"/>
+          <a:chOff x="0" y="0"/>
+          <a:chExt cx="0" cy="0"/>
+        </a:xfrm>
+      </p:grpSpPr>
+      <p:sp>
+        <p:nvSpPr>
+          <p:cNvPr id="2" name="Espace réservé de l'image des diapositives 1"/>
+          <p:cNvSpPr>
+            <a:spLocks noGrp="1" noRot="1" noChangeAspect="1"/>
+          </p:cNvSpPr>
+          <p:nvPr>
+            <p:ph type="sldImg"/>
+          </p:nvPr>
+        </p:nvSpPr>
+        <p:spPr/>
+      </p:sp>
+      <p:sp>
+        <p:nvSpPr>
+          <p:cNvPr id="3" name="Espace réservé des notes 2"/>
+          <p:cNvSpPr>
+            <a:spLocks noGrp="1"/>
+          </p:cNvSpPr>
+          <p:nvPr>
+            <p:ph type="body" idx="1"/>
+          </p:nvPr>
+        </p:nvSpPr>
+        <p:spPr/>
+        <p:txBody>
+          <a:bodyPr/>
+          <a:lstStyle/>
+          <a:p>
+            <a:r>
+              <a:rPr lang="en-US" b="0" dirty="0">
+                <a:solidFill>
+                  <a:srgbClr val="6A9955"/>
+                </a:solidFill>
+                <a:effectLst/>
+                <a:latin typeface="JetBrains Mono" panose="02000009000000000000" pitchFamily="49" charset="0"/>
+              </a:rPr>
+              <a:t>R² : measures the proportion of variance explained by the model</a:t>
+            </a:r>
+            <a:endParaRPr lang="en-US" b="0" dirty="0">
+              <a:solidFill>
+                <a:srgbClr val="CCCCCC"/>
+              </a:solidFill>
+              <a:effectLst/>
+              <a:latin typeface="JetBrains Mono" panose="02000009000000000000" pitchFamily="49" charset="0"/>
+            </a:endParaRPr>
+          </a:p>
+          <a:p>
+            <a:r>
+              <a:rPr lang="en-US" b="0" dirty="0">
+                <a:solidFill>
+                  <a:srgbClr val="6A9955"/>
+                </a:solidFill>
+                <a:effectLst/>
+                <a:latin typeface="JetBrains Mono" panose="02000009000000000000" pitchFamily="49" charset="0"/>
+              </a:rPr>
+              <a:t>It is used to judge how close the predictions are to the actual values </a:t>
+            </a:r>
+            <a:endParaRPr lang="en-US" b="0" dirty="0">
+              <a:solidFill>
+                <a:srgbClr val="CCCCCC"/>
+              </a:solidFill>
+              <a:effectLst/>
+              <a:latin typeface="JetBrains Mono" panose="02000009000000000000" pitchFamily="49" charset="0"/>
+            </a:endParaRPr>
+          </a:p>
+          <a:p>
+            <a:r>
+              <a:rPr lang="en-US" b="0" dirty="0">
+                <a:solidFill>
+                  <a:srgbClr val="6A9955"/>
+                </a:solidFill>
+                <a:effectLst/>
+                <a:latin typeface="JetBrains Mono" panose="02000009000000000000" pitchFamily="49" charset="0"/>
+              </a:rPr>
+              <a:t>An R² close to 1 means that the model explains 100% of data variability</a:t>
+            </a:r>
+            <a:endParaRPr lang="en-US" b="0" dirty="0">
+              <a:solidFill>
+                <a:srgbClr val="CCCCCC"/>
+              </a:solidFill>
+              <a:effectLst/>
+              <a:latin typeface="JetBrains Mono" panose="02000009000000000000" pitchFamily="49" charset="0"/>
+            </a:endParaRPr>
+          </a:p>
+          <a:p>
+            <a:endParaRPr lang="en-US" b="0" dirty="0">
+              <a:solidFill>
+                <a:srgbClr val="6A9955"/>
+              </a:solidFill>
+              <a:effectLst/>
+              <a:latin typeface="JetBrains Mono" panose="02000009000000000000" pitchFamily="49" charset="0"/>
+            </a:endParaRPr>
+          </a:p>
+          <a:p>
+            <a:r>
+              <a:rPr lang="en-US" b="0" dirty="0">
+                <a:solidFill>
+                  <a:srgbClr val="6A9955"/>
+                </a:solidFill>
+                <a:effectLst/>
+                <a:latin typeface="JetBrains Mono" panose="02000009000000000000" pitchFamily="49" charset="0"/>
+              </a:rPr>
+              <a:t>MSE (Mean Squared Error): penalizes larger errors, which can be useful for detecting inaccurate extreme predictions</a:t>
+            </a:r>
+            <a:endParaRPr lang="en-US" b="0" dirty="0">
+              <a:solidFill>
+                <a:srgbClr val="CCCCCC"/>
+              </a:solidFill>
+              <a:effectLst/>
+              <a:latin typeface="JetBrains Mono" panose="02000009000000000000" pitchFamily="49" charset="0"/>
+            </a:endParaRPr>
+          </a:p>
+          <a:p>
+            <a:r>
+              <a:rPr lang="en-US" b="0" dirty="0">
+                <a:solidFill>
+                  <a:srgbClr val="6A9955"/>
+                </a:solidFill>
+                <a:effectLst/>
+                <a:latin typeface="JetBrains Mono" panose="02000009000000000000" pitchFamily="49" charset="0"/>
+              </a:rPr>
+              <a:t>MAE (Mean Absolute Error): measures the mean absolute error, giving a simpler, more intuitive idea of the errors committed by the model</a:t>
+            </a:r>
+            <a:endParaRPr lang="en-US" b="0" dirty="0">
+              <a:solidFill>
+                <a:srgbClr val="CCCCCC"/>
+              </a:solidFill>
+              <a:effectLst/>
+              <a:latin typeface="JetBrains Mono" panose="02000009000000000000" pitchFamily="49" charset="0"/>
+            </a:endParaRPr>
+          </a:p>
+          <a:p>
+            <a:br>
+              <a:rPr lang="en-US" b="0" dirty="0">
+                <a:solidFill>
+                  <a:srgbClr val="CCCCCC"/>
+                </a:solidFill>
+                <a:effectLst/>
+                <a:latin typeface="JetBrains Mono" panose="02000009000000000000" pitchFamily="49" charset="0"/>
+              </a:rPr>
+            </a:br>
+            <a:r>
+              <a:rPr lang="en-US" b="0" dirty="0">
+                <a:solidFill>
+                  <a:srgbClr val="6A9955"/>
+                </a:solidFill>
+                <a:effectLst/>
+                <a:latin typeface="JetBrains Mono" panose="02000009000000000000" pitchFamily="49" charset="0"/>
+              </a:rPr>
+              <a:t>R² train vs. R² test: Compare these two values to check whether your model is overfitting. </a:t>
+            </a:r>
+            <a:endParaRPr lang="en-US" b="0" dirty="0">
+              <a:solidFill>
+                <a:srgbClr val="CCCCCC"/>
+              </a:solidFill>
+              <a:effectLst/>
+              <a:latin typeface="JetBrains Mono" panose="02000009000000000000" pitchFamily="49" charset="0"/>
+            </a:endParaRPr>
+          </a:p>
+          <a:p>
+            <a:r>
+              <a:rPr lang="en-US" b="0" dirty="0">
+                <a:solidFill>
+                  <a:srgbClr val="6A9955"/>
+                </a:solidFill>
+                <a:effectLst/>
+                <a:latin typeface="JetBrains Mono" panose="02000009000000000000" pitchFamily="49" charset="0"/>
+              </a:rPr>
+              <a:t>A large difference between R² train and R² test may indicate overfitting.</a:t>
+            </a:r>
+            <a:endParaRPr lang="en-US" b="0" dirty="0">
+              <a:solidFill>
+                <a:srgbClr val="CCCCCC"/>
+              </a:solidFill>
+              <a:effectLst/>
+              <a:latin typeface="JetBrains Mono" panose="02000009000000000000" pitchFamily="49" charset="0"/>
+            </a:endParaRPr>
+          </a:p>
+          <a:p>
+            <a:r>
+              <a:rPr lang="en-US" b="0" dirty="0">
+                <a:solidFill>
+                  <a:srgbClr val="6A9955"/>
+                </a:solidFill>
+                <a:effectLst/>
+                <a:latin typeface="JetBrains Mono" panose="02000009000000000000" pitchFamily="49" charset="0"/>
+              </a:rPr>
+              <a:t>MSE and MAE: These metrics give you an idea of the magnitude of errors. </a:t>
+            </a:r>
+            <a:endParaRPr lang="en-US" b="0" dirty="0">
+              <a:solidFill>
+                <a:srgbClr val="CCCCCC"/>
+              </a:solidFill>
+              <a:effectLst/>
+              <a:latin typeface="JetBrains Mono" panose="02000009000000000000" pitchFamily="49" charset="0"/>
+            </a:endParaRPr>
+          </a:p>
+          <a:p>
+            <a:r>
+              <a:rPr lang="en-US" b="0" dirty="0">
+                <a:solidFill>
+                  <a:srgbClr val="6A9955"/>
+                </a:solidFill>
+                <a:effectLst/>
+                <a:latin typeface="JetBrains Mono" panose="02000009000000000000" pitchFamily="49" charset="0"/>
+              </a:rPr>
+              <a:t>If MSE is much larger than MAE, this may indicate the presence of outliers with a strong impact on the error.</a:t>
+            </a:r>
+            <a:endParaRPr lang="en-US" b="0" dirty="0">
+              <a:solidFill>
+                <a:srgbClr val="CCCCCC"/>
+              </a:solidFill>
+              <a:effectLst/>
+              <a:latin typeface="JetBrains Mono" panose="02000009000000000000" pitchFamily="49" charset="0"/>
+            </a:endParaRPr>
+          </a:p>
+          <a:p>
+            <a:br>
+              <a:rPr lang="en-US" b="0" dirty="0">
+                <a:solidFill>
+                  <a:srgbClr val="CCCCCC"/>
+                </a:solidFill>
+                <a:effectLst/>
+                <a:latin typeface="JetBrains Mono" panose="02000009000000000000" pitchFamily="49" charset="0"/>
+              </a:rPr>
+            </a:br>
+            <a:r>
+              <a:rPr lang="en-US" b="0" dirty="0">
+                <a:solidFill>
+                  <a:srgbClr val="6A9955"/>
+                </a:solidFill>
+                <a:effectLst/>
+                <a:latin typeface="JetBrains Mono" panose="02000009000000000000" pitchFamily="49" charset="0"/>
+              </a:rPr>
+              <a:t>A good model will have a high test R², close to the train R², and relatively low errors (MSE/MAE)</a:t>
+            </a:r>
+          </a:p>
+          <a:p>
+            <a:r>
+              <a:rPr lang="en-US" b="0" dirty="0">
+                <a:solidFill>
+                  <a:srgbClr val="6A9955"/>
+                </a:solidFill>
+                <a:effectLst/>
+                <a:latin typeface="JetBrains Mono" panose="02000009000000000000" pitchFamily="49" charset="0"/>
+              </a:rPr>
+              <a:t>If these errors are low on the test set, this indicates a good ability to generalize.</a:t>
+            </a:r>
+            <a:endParaRPr lang="en-US" b="0" dirty="0">
+              <a:solidFill>
+                <a:srgbClr val="CCCCCC"/>
+              </a:solidFill>
+              <a:effectLst/>
+              <a:latin typeface="JetBrains Mono" panose="02000009000000000000" pitchFamily="49" charset="0"/>
+            </a:endParaRPr>
+          </a:p>
+          <a:p>
+            <a:br>
+              <a:rPr lang="en-US" b="0" dirty="0">
+                <a:solidFill>
+                  <a:srgbClr val="CCCCCC"/>
+                </a:solidFill>
+                <a:effectLst/>
+                <a:latin typeface="JetBrains Mono" panose="02000009000000000000" pitchFamily="49" charset="0"/>
+              </a:rPr>
+            </a:br>
+            <a:endParaRPr lang="en-US" b="0" dirty="0">
+              <a:solidFill>
+                <a:srgbClr val="CCCCCC"/>
+              </a:solidFill>
+              <a:effectLst/>
+              <a:latin typeface="JetBrains Mono" panose="02000009000000000000" pitchFamily="49" charset="0"/>
+            </a:endParaRPr>
+          </a:p>
+          <a:p>
+            <a:endParaRPr lang="fr-FR" dirty="0"/>
+          </a:p>
+        </p:txBody>
+      </p:sp>
+      <p:sp>
+        <p:nvSpPr>
+          <p:cNvPr id="4" name="Espace réservé du numéro de diapositive 3"/>
+          <p:cNvSpPr>
+            <a:spLocks noGrp="1"/>
+          </p:cNvSpPr>
+          <p:nvPr>
+            <p:ph type="sldNum" sz="quarter" idx="5"/>
+          </p:nvPr>
+        </p:nvSpPr>
+        <p:spPr/>
+        <p:txBody>
+          <a:bodyPr/>
+          <a:lstStyle/>
+          <a:p>
+            <a:fld id="{341AEC00-4977-4C47-A11B-52155DC12F54}" type="slidenum">
+              <a:rPr lang="fr-FR" smtClean="0"/>
+              <a:t>6</a:t>
+            </a:fld>
+            <a:endParaRPr lang="fr-FR"/>
+          </a:p>
+        </p:txBody>
+      </p:sp>
+    </p:spTree>
+    <p:extLst>
+      <p:ext uri="{BB962C8B-B14F-4D97-AF65-F5344CB8AC3E}">
+        <p14:creationId xmlns:p14="http://schemas.microsoft.com/office/powerpoint/2010/main" val="3708968091"/>
+      </p:ext>
+    </p:extLst>
+  </p:cSld>
+  <p:clrMapOvr>
+    <a:masterClrMapping/>
+  </p:clrMapOvr>
+</p:notes>
+</file>
+
+<file path=ppt/notesSlides/notesSlide5.xml><?xml version="1.0" encoding="utf-8"?>
+<p:notes xmlns:a="http://schemas.openxmlformats.org/drawingml/2006/main" xmlns:r="http://schemas.openxmlformats.org/officeDocument/2006/relationships" xmlns:p="http://schemas.openxmlformats.org/presentationml/2006/main">
+  <p:cSld>
+    <p:spTree>
+      <p:nvGrpSpPr>
+        <p:cNvPr id="1" name=""/>
+        <p:cNvGrpSpPr/>
+        <p:nvPr/>
+      </p:nvGrpSpPr>
+      <p:grpSpPr>
+        <a:xfrm>
+          <a:off x="0" y="0"/>
+          <a:ext cx="0" cy="0"/>
+          <a:chOff x="0" y="0"/>
+          <a:chExt cx="0" cy="0"/>
+        </a:xfrm>
+      </p:grpSpPr>
+      <p:sp>
+        <p:nvSpPr>
+          <p:cNvPr id="2" name="Espace réservé de l'image des diapositives 1"/>
+          <p:cNvSpPr>
+            <a:spLocks noGrp="1" noRot="1" noChangeAspect="1"/>
+          </p:cNvSpPr>
+          <p:nvPr>
+            <p:ph type="sldImg"/>
+          </p:nvPr>
+        </p:nvSpPr>
+        <p:spPr/>
+      </p:sp>
+      <p:sp>
+        <p:nvSpPr>
+          <p:cNvPr id="3" name="Espace réservé des notes 2"/>
+          <p:cNvSpPr>
+            <a:spLocks noGrp="1"/>
+          </p:cNvSpPr>
+          <p:nvPr>
+            <p:ph type="body" idx="1"/>
+          </p:nvPr>
+        </p:nvSpPr>
+        <p:spPr/>
+        <p:txBody>
+          <a:bodyPr/>
+          <a:lstStyle/>
+          <a:p>
+            <a:r>
+              <a:rPr lang="en-US" dirty="0"/>
+              <a:t>EDA                     	: The recipe</a:t>
+            </a:r>
+          </a:p>
+          <a:p>
+            <a:r>
+              <a:rPr lang="en-US" dirty="0"/>
+              <a:t>Features Engineering	: The secret sauce</a:t>
+            </a:r>
+          </a:p>
+          <a:p>
+            <a:r>
+              <a:rPr lang="en-US" dirty="0"/>
+              <a:t>Baseline model          	: The first taste</a:t>
+            </a:r>
+          </a:p>
+          <a:p>
+            <a:r>
+              <a:rPr lang="en-US" dirty="0"/>
+              <a:t>Interpreting results    	: The tasting notes</a:t>
+            </a:r>
+          </a:p>
+          <a:p>
+            <a:endParaRPr lang="en-US" dirty="0"/>
+          </a:p>
+          <a:p>
+            <a:r>
+              <a:rPr lang="en-US" dirty="0"/>
+              <a:t>Don't mess with EDA     	: Never!</a:t>
+            </a:r>
+          </a:p>
+          <a:p>
+            <a:r>
+              <a:rPr lang="en-US" dirty="0"/>
+              <a:t>Feature engineering	: Smart!</a:t>
+            </a:r>
+          </a:p>
+          <a:p>
+            <a:r>
+              <a:rPr lang="en-US" dirty="0"/>
+              <a:t>Get a baseline model    	: Fast!</a:t>
+            </a:r>
+          </a:p>
+          <a:p>
+            <a:r>
+              <a:rPr lang="en-US" dirty="0"/>
+              <a:t>Results analysis        	: Always! </a:t>
+            </a:r>
+            <a:endParaRPr lang="fr-FR" dirty="0"/>
+          </a:p>
+          <a:p>
+            <a:endParaRPr lang="fr-FR" dirty="0"/>
+          </a:p>
+        </p:txBody>
+      </p:sp>
+      <p:sp>
+        <p:nvSpPr>
+          <p:cNvPr id="4" name="Espace réservé du numéro de diapositive 3"/>
+          <p:cNvSpPr>
+            <a:spLocks noGrp="1"/>
+          </p:cNvSpPr>
+          <p:nvPr>
+            <p:ph type="sldNum" sz="quarter" idx="5"/>
+          </p:nvPr>
+        </p:nvSpPr>
+        <p:spPr/>
+        <p:txBody>
+          <a:bodyPr/>
+          <a:lstStyle/>
+          <a:p>
+            <a:fld id="{341AEC00-4977-4C47-A11B-52155DC12F54}" type="slidenum">
+              <a:rPr lang="fr-FR" smtClean="0"/>
+              <a:t>9</a:t>
             </a:fld>
             <a:endParaRPr lang="fr-FR"/>
           </a:p>
@@ -2819,7 +4105,7 @@
           <a:p>
             <a:fld id="{7ECB9D5A-E5E4-41FE-AF39-634902D6D5D2}" type="datetimeFigureOut">
               <a:rPr lang="fr-FR" smtClean="0"/>
-              <a:t>11/09/2024</a:t>
+              <a:t>15/09/2024</a:t>
             </a:fld>
             <a:endParaRPr lang="fr-FR"/>
           </a:p>
@@ -3017,7 +4303,7 @@
           <a:p>
             <a:fld id="{7ECB9D5A-E5E4-41FE-AF39-634902D6D5D2}" type="datetimeFigureOut">
               <a:rPr lang="fr-FR" smtClean="0"/>
-              <a:t>11/09/2024</a:t>
+              <a:t>15/09/2024</a:t>
             </a:fld>
             <a:endParaRPr lang="fr-FR"/>
           </a:p>
@@ -3225,7 +4511,7 @@
           <a:p>
             <a:fld id="{7ECB9D5A-E5E4-41FE-AF39-634902D6D5D2}" type="datetimeFigureOut">
               <a:rPr lang="fr-FR" smtClean="0"/>
-              <a:t>11/09/2024</a:t>
+              <a:t>15/09/2024</a:t>
             </a:fld>
             <a:endParaRPr lang="fr-FR"/>
           </a:p>
@@ -3423,7 +4709,7 @@
           <a:p>
             <a:fld id="{7ECB9D5A-E5E4-41FE-AF39-634902D6D5D2}" type="datetimeFigureOut">
               <a:rPr lang="fr-FR" smtClean="0"/>
-              <a:t>11/09/2024</a:t>
+              <a:t>15/09/2024</a:t>
             </a:fld>
             <a:endParaRPr lang="fr-FR"/>
           </a:p>
@@ -3698,7 +4984,7 @@
           <a:p>
             <a:fld id="{7ECB9D5A-E5E4-41FE-AF39-634902D6D5D2}" type="datetimeFigureOut">
               <a:rPr lang="fr-FR" smtClean="0"/>
-              <a:t>11/09/2024</a:t>
+              <a:t>15/09/2024</a:t>
             </a:fld>
             <a:endParaRPr lang="fr-FR"/>
           </a:p>
@@ -3963,7 +5249,7 @@
           <a:p>
             <a:fld id="{7ECB9D5A-E5E4-41FE-AF39-634902D6D5D2}" type="datetimeFigureOut">
               <a:rPr lang="fr-FR" smtClean="0"/>
-              <a:t>11/09/2024</a:t>
+              <a:t>15/09/2024</a:t>
             </a:fld>
             <a:endParaRPr lang="fr-FR"/>
           </a:p>
@@ -4375,7 +5661,7 @@
           <a:p>
             <a:fld id="{7ECB9D5A-E5E4-41FE-AF39-634902D6D5D2}" type="datetimeFigureOut">
               <a:rPr lang="fr-FR" smtClean="0"/>
-              <a:t>11/09/2024</a:t>
+              <a:t>15/09/2024</a:t>
             </a:fld>
             <a:endParaRPr lang="fr-FR"/>
           </a:p>
@@ -4516,7 +5802,7 @@
           <a:p>
             <a:fld id="{7ECB9D5A-E5E4-41FE-AF39-634902D6D5D2}" type="datetimeFigureOut">
               <a:rPr lang="fr-FR" smtClean="0"/>
-              <a:t>11/09/2024</a:t>
+              <a:t>15/09/2024</a:t>
             </a:fld>
             <a:endParaRPr lang="fr-FR"/>
           </a:p>
@@ -4629,7 +5915,7 @@
           <a:p>
             <a:fld id="{7ECB9D5A-E5E4-41FE-AF39-634902D6D5D2}" type="datetimeFigureOut">
               <a:rPr lang="fr-FR" smtClean="0"/>
-              <a:t>11/09/2024</a:t>
+              <a:t>15/09/2024</a:t>
             </a:fld>
             <a:endParaRPr lang="fr-FR"/>
           </a:p>
@@ -4940,7 +6226,7 @@
           <a:p>
             <a:fld id="{7ECB9D5A-E5E4-41FE-AF39-634902D6D5D2}" type="datetimeFigureOut">
               <a:rPr lang="fr-FR" smtClean="0"/>
-              <a:t>11/09/2024</a:t>
+              <a:t>15/09/2024</a:t>
             </a:fld>
             <a:endParaRPr lang="fr-FR"/>
           </a:p>
@@ -5231,7 +6517,7 @@
           <a:p>
             <a:fld id="{7ECB9D5A-E5E4-41FE-AF39-634902D6D5D2}" type="datetimeFigureOut">
               <a:rPr lang="fr-FR" smtClean="0"/>
-              <a:t>11/09/2024</a:t>
+              <a:t>15/09/2024</a:t>
             </a:fld>
             <a:endParaRPr lang="fr-FR"/>
           </a:p>
@@ -5472,7 +6758,7 @@
           <a:p>
             <a:fld id="{7ECB9D5A-E5E4-41FE-AF39-634902D6D5D2}" type="datetimeFigureOut">
               <a:rPr lang="fr-FR" smtClean="0"/>
-              <a:t>11/09/2024</a:t>
+              <a:t>15/09/2024</a:t>
             </a:fld>
             <a:endParaRPr lang="fr-FR"/>
           </a:p>
@@ -5912,7 +7198,7 @@
           <a:p>
             <a:r>
               <a:rPr lang="fr-FR" dirty="0" err="1"/>
-              <a:t>Getaround</a:t>
+              <a:t>getaround</a:t>
             </a:r>
             <a:r>
               <a:rPr lang="fr-FR" dirty="0"/>
@@ -5939,24 +7225,28 @@
         </p:nvSpPr>
         <p:spPr>
           <a:xfrm>
-            <a:off x="225552" y="3602038"/>
-            <a:ext cx="11740896" cy="1655762"/>
+            <a:off x="225552" y="3602037"/>
+            <a:ext cx="11740896" cy="2133599"/>
           </a:xfrm>
         </p:spPr>
         <p:txBody>
           <a:bodyPr>
-            <a:normAutofit fontScale="92500" lnSpcReduction="10000"/>
+            <a:normAutofit/>
           </a:bodyPr>
           <a:lstStyle/>
           <a:p>
-            <a:pPr algn="l"/>
+            <a:pPr algn="l">
+              <a:tabLst>
+                <a:tab pos="982663" algn="l"/>
+              </a:tabLst>
+            </a:pPr>
             <a:r>
               <a:rPr lang="fr-FR" sz="1400" dirty="0" err="1"/>
               <a:t>author</a:t>
             </a:r>
             <a:r>
               <a:rPr lang="fr-FR" sz="1400" dirty="0"/>
-              <a:t> : </a:t>
+              <a:t> :	</a:t>
             </a:r>
             <a:r>
               <a:rPr lang="fr-FR" sz="1400" dirty="0">
@@ -5967,14 +7257,18 @@
             <a:endParaRPr lang="fr-FR" sz="1400" dirty="0"/>
           </a:p>
           <a:p>
-            <a:pPr algn="l"/>
+            <a:pPr algn="l">
+              <a:tabLst>
+                <a:tab pos="982663" algn="l"/>
+              </a:tabLst>
+            </a:pPr>
             <a:r>
               <a:rPr lang="fr-FR" sz="1400" dirty="0" err="1"/>
               <a:t>specs</a:t>
             </a:r>
             <a:r>
               <a:rPr lang="fr-FR" sz="1400" dirty="0"/>
-              <a:t>  : </a:t>
+              <a:t>  :	</a:t>
             </a:r>
             <a:r>
               <a:rPr lang="fr-FR" sz="1400" dirty="0">
@@ -5990,10 +7284,14 @@
             <a:endParaRPr lang="fr-FR" sz="1400" dirty="0"/>
           </a:p>
           <a:p>
-            <a:pPr algn="l"/>
+            <a:pPr algn="l">
+              <a:tabLst>
+                <a:tab pos="982663" algn="l"/>
+              </a:tabLst>
+            </a:pPr>
             <a:r>
               <a:rPr lang="fr-FR" sz="1400" dirty="0"/>
-              <a:t>files  : </a:t>
+              <a:t>files  :	</a:t>
             </a:r>
             <a:r>
               <a:rPr lang="fr-FR" sz="1400" dirty="0">
@@ -6001,10 +7299,27 @@
               </a:rPr>
               <a:t>https://github.com/40tude/fullstack_mars_2024_3/tree/main/08_deployment/99_Project_getaround</a:t>
             </a:r>
+            <a:br>
+              <a:rPr lang="fr-FR" sz="1400" dirty="0"/>
+            </a:br>
+            <a:r>
+              <a:rPr lang="fr-FR" sz="1400" dirty="0"/>
+              <a:t>	</a:t>
+            </a:r>
+            <a:r>
+              <a:rPr lang="fr-FR" sz="1400" dirty="0">
+                <a:hlinkClick r:id="rId6"/>
+              </a:rPr>
+              <a:t>https://api-getaround-4ece015745ea.herokuapp.com/</a:t>
+            </a:r>
             <a:endParaRPr lang="fr-FR" sz="1400" dirty="0"/>
           </a:p>
           <a:p>
-            <a:pPr algn="l"/>
+            <a:pPr algn="l">
+              <a:tabLst>
+                <a:tab pos="982663" algn="l"/>
+              </a:tabLst>
+            </a:pPr>
             <a:endParaRPr lang="fr-FR" sz="1400" dirty="0"/>
           </a:p>
           <a:p>
@@ -6038,7 +7353,7 @@
 </p:sld>
 </file>
 
-<file path=ppt/slides/slide2.xml><?xml version="1.0" encoding="utf-8"?>
+<file path=ppt/slides/slide10.xml><?xml version="1.0" encoding="utf-8"?>
 <p:sld xmlns:a="http://schemas.openxmlformats.org/drawingml/2006/main" xmlns:r="http://schemas.openxmlformats.org/officeDocument/2006/relationships" xmlns:p="http://schemas.openxmlformats.org/presentationml/2006/main" show="0">
   <p:cSld>
     <p:spTree>
@@ -6057,187 +7372,6 @@
       </p:grpSpPr>
       <p:sp>
         <p:nvSpPr>
-          <p:cNvPr id="2" name="Titre 1">
-            <a:extLst>
-              <a:ext uri="{FF2B5EF4-FFF2-40B4-BE49-F238E27FC236}">
-                <a16:creationId xmlns:a16="http://schemas.microsoft.com/office/drawing/2014/main" id="{0973683F-97F4-B09A-A1A0-F35F30E7220F}"/>
-              </a:ext>
-            </a:extLst>
-          </p:cNvPr>
-          <p:cNvSpPr>
-            <a:spLocks noGrp="1"/>
-          </p:cNvSpPr>
-          <p:nvPr>
-            <p:ph type="title"/>
-          </p:nvPr>
-        </p:nvSpPr>
-        <p:spPr/>
-        <p:txBody>
-          <a:bodyPr/>
-          <a:lstStyle/>
-          <a:p>
-            <a:r>
-              <a:rPr lang="fr-FR" dirty="0" err="1"/>
-              <a:t>Specifications</a:t>
-            </a:r>
-            <a:endParaRPr lang="fr-FR" dirty="0"/>
-          </a:p>
-        </p:txBody>
-      </p:sp>
-      <p:sp>
-        <p:nvSpPr>
-          <p:cNvPr id="3" name="Espace réservé du contenu 2">
-            <a:extLst>
-              <a:ext uri="{FF2B5EF4-FFF2-40B4-BE49-F238E27FC236}">
-                <a16:creationId xmlns:a16="http://schemas.microsoft.com/office/drawing/2014/main" id="{A88399CA-BBD6-ECCC-534E-0335C54116C3}"/>
-              </a:ext>
-            </a:extLst>
-          </p:cNvPr>
-          <p:cNvSpPr>
-            <a:spLocks noGrp="1"/>
-          </p:cNvSpPr>
-          <p:nvPr>
-            <p:ph idx="1"/>
-          </p:nvPr>
-        </p:nvSpPr>
-        <p:spPr/>
-        <p:txBody>
-          <a:bodyPr>
-            <a:normAutofit/>
-          </a:bodyPr>
-          <a:lstStyle/>
-          <a:p>
-            <a:pPr marL="0" indent="0">
-              <a:buNone/>
-            </a:pPr>
-            <a:endParaRPr lang="en-US" dirty="0"/>
-          </a:p>
-        </p:txBody>
-      </p:sp>
-    </p:spTree>
-    <p:extLst>
-      <p:ext uri="{BB962C8B-B14F-4D97-AF65-F5344CB8AC3E}">
-        <p14:creationId xmlns:p14="http://schemas.microsoft.com/office/powerpoint/2010/main" val="246086491"/>
-      </p:ext>
-    </p:extLst>
-  </p:cSld>
-  <p:clrMapOvr>
-    <a:masterClrMapping/>
-  </p:clrMapOvr>
-</p:sld>
-</file>
-
-<file path=ppt/slides/slide3.xml><?xml version="1.0" encoding="utf-8"?>
-<p:sld xmlns:a="http://schemas.openxmlformats.org/drawingml/2006/main" xmlns:r="http://schemas.openxmlformats.org/officeDocument/2006/relationships" xmlns:p="http://schemas.openxmlformats.org/presentationml/2006/main">
-  <p:cSld>
-    <p:spTree>
-      <p:nvGrpSpPr>
-        <p:cNvPr id="1" name=""/>
-        <p:cNvGrpSpPr/>
-        <p:nvPr/>
-      </p:nvGrpSpPr>
-      <p:grpSpPr>
-        <a:xfrm>
-          <a:off x="0" y="0"/>
-          <a:ext cx="0" cy="0"/>
-          <a:chOff x="0" y="0"/>
-          <a:chExt cx="0" cy="0"/>
-        </a:xfrm>
-      </p:grpSpPr>
-      <p:sp>
-        <p:nvSpPr>
-          <p:cNvPr id="2" name="Titre 1">
-            <a:extLst>
-              <a:ext uri="{FF2B5EF4-FFF2-40B4-BE49-F238E27FC236}">
-                <a16:creationId xmlns:a16="http://schemas.microsoft.com/office/drawing/2014/main" id="{F13D07B4-C7D9-46E1-38A0-A6EEF16B48EB}"/>
-              </a:ext>
-            </a:extLst>
-          </p:cNvPr>
-          <p:cNvSpPr>
-            <a:spLocks noGrp="1"/>
-          </p:cNvSpPr>
-          <p:nvPr>
-            <p:ph type="title"/>
-          </p:nvPr>
-        </p:nvSpPr>
-        <p:spPr/>
-        <p:txBody>
-          <a:bodyPr/>
-          <a:lstStyle/>
-          <a:p>
-            <a:r>
-              <a:rPr lang="fr-FR" dirty="0" err="1"/>
-              <a:t>Take</a:t>
-            </a:r>
-            <a:r>
-              <a:rPr lang="fr-FR" dirty="0"/>
-              <a:t> </a:t>
-            </a:r>
-            <a:r>
-              <a:rPr lang="fr-FR" dirty="0" err="1"/>
-              <a:t>away</a:t>
-            </a:r>
-            <a:endParaRPr lang="fr-FR" dirty="0"/>
-          </a:p>
-        </p:txBody>
-      </p:sp>
-      <p:sp>
-        <p:nvSpPr>
-          <p:cNvPr id="3" name="Espace réservé du contenu 2">
-            <a:extLst>
-              <a:ext uri="{FF2B5EF4-FFF2-40B4-BE49-F238E27FC236}">
-                <a16:creationId xmlns:a16="http://schemas.microsoft.com/office/drawing/2014/main" id="{1A803C62-BD0B-D0AC-2B41-C4F420891B06}"/>
-              </a:ext>
-            </a:extLst>
-          </p:cNvPr>
-          <p:cNvSpPr>
-            <a:spLocks noGrp="1"/>
-          </p:cNvSpPr>
-          <p:nvPr>
-            <p:ph idx="1"/>
-          </p:nvPr>
-        </p:nvSpPr>
-        <p:spPr/>
-        <p:txBody>
-          <a:bodyPr/>
-          <a:lstStyle/>
-          <a:p>
-            <a:endParaRPr lang="fr-FR" dirty="0"/>
-          </a:p>
-        </p:txBody>
-      </p:sp>
-    </p:spTree>
-    <p:extLst>
-      <p:ext uri="{BB962C8B-B14F-4D97-AF65-F5344CB8AC3E}">
-        <p14:creationId xmlns:p14="http://schemas.microsoft.com/office/powerpoint/2010/main" val="3201622378"/>
-      </p:ext>
-    </p:extLst>
-  </p:cSld>
-  <p:clrMapOvr>
-    <a:masterClrMapping/>
-  </p:clrMapOvr>
-</p:sld>
-</file>
-
-<file path=ppt/slides/slide4.xml><?xml version="1.0" encoding="utf-8"?>
-<p:sld xmlns:a="http://schemas.openxmlformats.org/drawingml/2006/main" xmlns:r="http://schemas.openxmlformats.org/officeDocument/2006/relationships" xmlns:p="http://schemas.openxmlformats.org/presentationml/2006/main" show="0">
-  <p:cSld>
-    <p:spTree>
-      <p:nvGrpSpPr>
-        <p:cNvPr id="1" name=""/>
-        <p:cNvGrpSpPr/>
-        <p:nvPr/>
-      </p:nvGrpSpPr>
-      <p:grpSpPr>
-        <a:xfrm>
-          <a:off x="0" y="0"/>
-          <a:ext cx="0" cy="0"/>
-          <a:chOff x="0" y="0"/>
-          <a:chExt cx="0" cy="0"/>
-        </a:xfrm>
-      </p:grpSpPr>
-      <p:sp>
-        <p:nvSpPr>
           <p:cNvPr id="4" name="Titre 3">
             <a:extLst>
               <a:ext uri="{FF2B5EF4-FFF2-40B4-BE49-F238E27FC236}">
@@ -6313,7 +7447,7 @@
 </p:sld>
 </file>
 
-<file path=ppt/slides/slide5.xml><?xml version="1.0" encoding="utf-8"?>
+<file path=ppt/slides/slide11.xml><?xml version="1.0" encoding="utf-8"?>
 <p:sld xmlns:a="http://schemas.openxmlformats.org/drawingml/2006/main" xmlns:r="http://schemas.openxmlformats.org/officeDocument/2006/relationships" xmlns:p="http://schemas.openxmlformats.org/presentationml/2006/main">
   <p:cSld>
     <p:spTree>
@@ -7037,7 +8171,7 @@
 </p:sld>
 </file>
 
-<file path=ppt/slides/slide6.xml><?xml version="1.0" encoding="utf-8"?>
+<file path=ppt/slides/slide12.xml><?xml version="1.0" encoding="utf-8"?>
 <p:sld xmlns:a="http://schemas.openxmlformats.org/drawingml/2006/main" xmlns:r="http://schemas.openxmlformats.org/officeDocument/2006/relationships" xmlns:p="http://schemas.openxmlformats.org/presentationml/2006/main">
   <p:cSld>
     <p:spTree>
@@ -8121,6 +9255,2003 @@
     <p:extLst>
       <p:ext uri="{BB962C8B-B14F-4D97-AF65-F5344CB8AC3E}">
         <p14:creationId xmlns:p14="http://schemas.microsoft.com/office/powerpoint/2010/main" val="710411366"/>
+      </p:ext>
+    </p:extLst>
+  </p:cSld>
+  <p:clrMapOvr>
+    <a:masterClrMapping/>
+  </p:clrMapOvr>
+</p:sld>
+</file>
+
+<file path=ppt/slides/slide2.xml><?xml version="1.0" encoding="utf-8"?>
+<p:sld xmlns:a="http://schemas.openxmlformats.org/drawingml/2006/main" xmlns:r="http://schemas.openxmlformats.org/officeDocument/2006/relationships" xmlns:p="http://schemas.openxmlformats.org/presentationml/2006/main">
+  <p:cSld>
+    <p:spTree>
+      <p:nvGrpSpPr>
+        <p:cNvPr id="1" name=""/>
+        <p:cNvGrpSpPr/>
+        <p:nvPr/>
+      </p:nvGrpSpPr>
+      <p:grpSpPr>
+        <a:xfrm>
+          <a:off x="0" y="0"/>
+          <a:ext cx="0" cy="0"/>
+          <a:chOff x="0" y="0"/>
+          <a:chExt cx="0" cy="0"/>
+        </a:xfrm>
+      </p:grpSpPr>
+      <p:sp>
+        <p:nvSpPr>
+          <p:cNvPr id="2" name="Titre 1">
+            <a:extLst>
+              <a:ext uri="{FF2B5EF4-FFF2-40B4-BE49-F238E27FC236}">
+                <a16:creationId xmlns:a16="http://schemas.microsoft.com/office/drawing/2014/main" id="{E4746BB8-0AD8-17AF-FDFF-D5E39420DCC3}"/>
+              </a:ext>
+            </a:extLst>
+          </p:cNvPr>
+          <p:cNvSpPr>
+            <a:spLocks noGrp="1"/>
+          </p:cNvSpPr>
+          <p:nvPr>
+            <p:ph type="title"/>
+          </p:nvPr>
+        </p:nvSpPr>
+        <p:spPr/>
+        <p:txBody>
+          <a:bodyPr/>
+          <a:lstStyle/>
+          <a:p>
+            <a:r>
+              <a:rPr lang="fr-FR" dirty="0" err="1"/>
+              <a:t>Delays</a:t>
+            </a:r>
+            <a:r>
+              <a:rPr lang="fr-FR" dirty="0"/>
+              <a:t> EDA</a:t>
+            </a:r>
+          </a:p>
+        </p:txBody>
+      </p:sp>
+      <p:pic>
+        <p:nvPicPr>
+          <p:cNvPr id="4" name="Image 3">
+            <a:extLst>
+              <a:ext uri="{FF2B5EF4-FFF2-40B4-BE49-F238E27FC236}">
+                <a16:creationId xmlns:a16="http://schemas.microsoft.com/office/drawing/2014/main" id="{553A133D-0173-BB18-F704-971391777E60}"/>
+              </a:ext>
+            </a:extLst>
+          </p:cNvPr>
+          <p:cNvPicPr>
+            <a:picLocks noChangeAspect="1"/>
+          </p:cNvPicPr>
+          <p:nvPr/>
+        </p:nvPicPr>
+        <p:blipFill>
+          <a:blip r:embed="rId3"/>
+          <a:stretch>
+            <a:fillRect/>
+          </a:stretch>
+        </p:blipFill>
+        <p:spPr>
+          <a:xfrm>
+            <a:off x="213360" y="1135380"/>
+            <a:ext cx="2219496" cy="2223135"/>
+          </a:xfrm>
+          <a:prstGeom prst="rect">
+            <a:avLst/>
+          </a:prstGeom>
+          <a:effectLst>
+            <a:outerShdw blurRad="50800" dist="38100" dir="2700000" algn="tl" rotWithShape="0">
+              <a:prstClr val="black">
+                <a:alpha val="40000"/>
+              </a:prstClr>
+            </a:outerShdw>
+          </a:effectLst>
+        </p:spPr>
+      </p:pic>
+      <p:pic>
+        <p:nvPicPr>
+          <p:cNvPr id="6" name="Image 5">
+            <a:extLst>
+              <a:ext uri="{FF2B5EF4-FFF2-40B4-BE49-F238E27FC236}">
+                <a16:creationId xmlns:a16="http://schemas.microsoft.com/office/drawing/2014/main" id="{0354AD57-A904-D0BC-7AD9-8D76056E8050}"/>
+              </a:ext>
+            </a:extLst>
+          </p:cNvPr>
+          <p:cNvPicPr>
+            <a:picLocks noChangeAspect="1"/>
+          </p:cNvPicPr>
+          <p:nvPr/>
+        </p:nvPicPr>
+        <p:blipFill>
+          <a:blip r:embed="rId4"/>
+          <a:stretch>
+            <a:fillRect/>
+          </a:stretch>
+        </p:blipFill>
+        <p:spPr>
+          <a:xfrm>
+            <a:off x="2896870" y="1135379"/>
+            <a:ext cx="2219496" cy="2223135"/>
+          </a:xfrm>
+          <a:prstGeom prst="rect">
+            <a:avLst/>
+          </a:prstGeom>
+          <a:effectLst>
+            <a:outerShdw blurRad="50800" dist="38100" dir="2700000" algn="tl" rotWithShape="0">
+              <a:prstClr val="black">
+                <a:alpha val="40000"/>
+              </a:prstClr>
+            </a:outerShdw>
+          </a:effectLst>
+        </p:spPr>
+      </p:pic>
+      <p:pic>
+        <p:nvPicPr>
+          <p:cNvPr id="11" name="Image 10">
+            <a:extLst>
+              <a:ext uri="{FF2B5EF4-FFF2-40B4-BE49-F238E27FC236}">
+                <a16:creationId xmlns:a16="http://schemas.microsoft.com/office/drawing/2014/main" id="{44B3A22C-30AF-1092-A41B-E7671122F03F}"/>
+              </a:ext>
+            </a:extLst>
+          </p:cNvPr>
+          <p:cNvPicPr>
+            <a:picLocks noChangeAspect="1"/>
+          </p:cNvPicPr>
+          <p:nvPr/>
+        </p:nvPicPr>
+        <p:blipFill>
+          <a:blip r:embed="rId5"/>
+          <a:stretch>
+            <a:fillRect/>
+          </a:stretch>
+        </p:blipFill>
+        <p:spPr>
+          <a:xfrm>
+            <a:off x="5395946" y="1135379"/>
+            <a:ext cx="6582694" cy="2629267"/>
+          </a:xfrm>
+          <a:prstGeom prst="rect">
+            <a:avLst/>
+          </a:prstGeom>
+          <a:effectLst>
+            <a:outerShdw blurRad="50800" dist="38100" dir="2700000" algn="tl" rotWithShape="0">
+              <a:prstClr val="black">
+                <a:alpha val="40000"/>
+              </a:prstClr>
+            </a:outerShdw>
+          </a:effectLst>
+        </p:spPr>
+      </p:pic>
+      <p:sp>
+        <p:nvSpPr>
+          <p:cNvPr id="7" name="Rectangle 6">
+            <a:extLst>
+              <a:ext uri="{FF2B5EF4-FFF2-40B4-BE49-F238E27FC236}">
+                <a16:creationId xmlns:a16="http://schemas.microsoft.com/office/drawing/2014/main" id="{6060BC2E-5019-C04F-D81E-2789ECAE25E0}"/>
+              </a:ext>
+            </a:extLst>
+          </p:cNvPr>
+          <p:cNvSpPr/>
+          <p:nvPr/>
+        </p:nvSpPr>
+        <p:spPr>
+          <a:xfrm>
+            <a:off x="6444614" y="2996565"/>
+            <a:ext cx="573405" cy="323850"/>
+          </a:xfrm>
+          <a:prstGeom prst="rect">
+            <a:avLst/>
+          </a:prstGeom>
+          <a:solidFill>
+            <a:srgbClr val="C00000">
+              <a:alpha val="69000"/>
+            </a:srgbClr>
+          </a:solidFill>
+          <a:ln>
+            <a:noFill/>
+          </a:ln>
+        </p:spPr>
+        <p:style>
+          <a:lnRef idx="2">
+            <a:schemeClr val="accent1">
+              <a:shade val="15000"/>
+            </a:schemeClr>
+          </a:lnRef>
+          <a:fillRef idx="1">
+            <a:schemeClr val="accent1"/>
+          </a:fillRef>
+          <a:effectRef idx="0">
+            <a:schemeClr val="accent1"/>
+          </a:effectRef>
+          <a:fontRef idx="minor">
+            <a:schemeClr val="lt1"/>
+          </a:fontRef>
+        </p:style>
+        <p:txBody>
+          <a:bodyPr rtlCol="0" anchor="ctr"/>
+          <a:lstStyle/>
+          <a:p>
+            <a:pPr algn="ctr"/>
+            <a:endParaRPr lang="fr-FR" dirty="0"/>
+          </a:p>
+        </p:txBody>
+      </p:sp>
+      <p:sp>
+        <p:nvSpPr>
+          <p:cNvPr id="8" name="ZoneTexte 7">
+            <a:extLst>
+              <a:ext uri="{FF2B5EF4-FFF2-40B4-BE49-F238E27FC236}">
+                <a16:creationId xmlns:a16="http://schemas.microsoft.com/office/drawing/2014/main" id="{F9727D45-6A67-A4D5-645D-DC8717284C4E}"/>
+              </a:ext>
+            </a:extLst>
+          </p:cNvPr>
+          <p:cNvSpPr txBox="1"/>
+          <p:nvPr/>
+        </p:nvSpPr>
+        <p:spPr>
+          <a:xfrm>
+            <a:off x="8179203" y="3793553"/>
+            <a:ext cx="3799437" cy="261610"/>
+          </a:xfrm>
+          <a:prstGeom prst="rect">
+            <a:avLst/>
+          </a:prstGeom>
+          <a:noFill/>
+        </p:spPr>
+        <p:txBody>
+          <a:bodyPr wrap="none" rtlCol="0">
+            <a:spAutoFit/>
+          </a:bodyPr>
+          <a:lstStyle/>
+          <a:p>
+            <a:pPr algn="r"/>
+            <a:r>
+              <a:rPr lang="fr-FR" sz="1100" i="1" dirty="0" err="1">
+                <a:latin typeface="Times New Roman" panose="02020603050405020304" pitchFamily="18" charset="0"/>
+                <a:cs typeface="Times New Roman" panose="02020603050405020304" pitchFamily="18" charset="0"/>
+              </a:rPr>
+              <a:t>With</a:t>
+            </a:r>
+            <a:r>
+              <a:rPr lang="fr-FR" sz="1100" i="1" dirty="0">
+                <a:latin typeface="Times New Roman" panose="02020603050405020304" pitchFamily="18" charset="0"/>
+                <a:cs typeface="Times New Roman" panose="02020603050405020304" pitchFamily="18" charset="0"/>
+              </a:rPr>
+              <a:t> a time ∆ </a:t>
+            </a:r>
+            <a:r>
+              <a:rPr lang="fr-FR" sz="1100" i="1" dirty="0" err="1">
+                <a:latin typeface="Times New Roman" panose="02020603050405020304" pitchFamily="18" charset="0"/>
+                <a:cs typeface="Times New Roman" panose="02020603050405020304" pitchFamily="18" charset="0"/>
+              </a:rPr>
+              <a:t>most</a:t>
+            </a:r>
+            <a:r>
+              <a:rPr lang="fr-FR" sz="1100" i="1" dirty="0">
+                <a:latin typeface="Times New Roman" panose="02020603050405020304" pitchFamily="18" charset="0"/>
+                <a:cs typeface="Times New Roman" panose="02020603050405020304" pitchFamily="18" charset="0"/>
+              </a:rPr>
+              <a:t> of the </a:t>
+            </a:r>
+            <a:r>
+              <a:rPr lang="fr-FR" sz="1100" i="1" dirty="0" err="1">
+                <a:latin typeface="Times New Roman" panose="02020603050405020304" pitchFamily="18" charset="0"/>
+                <a:cs typeface="Times New Roman" panose="02020603050405020304" pitchFamily="18" charset="0"/>
+              </a:rPr>
+              <a:t>returns</a:t>
+            </a:r>
+            <a:r>
+              <a:rPr lang="fr-FR" sz="1100" i="1" dirty="0">
+                <a:latin typeface="Times New Roman" panose="02020603050405020304" pitchFamily="18" charset="0"/>
+                <a:cs typeface="Times New Roman" panose="02020603050405020304" pitchFamily="18" charset="0"/>
+              </a:rPr>
+              <a:t> are NOT </a:t>
+            </a:r>
+            <a:r>
+              <a:rPr lang="fr-FR" sz="1100" i="1" dirty="0" err="1">
+                <a:latin typeface="Times New Roman" panose="02020603050405020304" pitchFamily="18" charset="0"/>
+                <a:cs typeface="Times New Roman" panose="02020603050405020304" pitchFamily="18" charset="0"/>
+              </a:rPr>
+              <a:t>late</a:t>
+            </a:r>
+            <a:r>
+              <a:rPr lang="fr-FR" sz="1100" i="1" dirty="0">
+                <a:latin typeface="Times New Roman" panose="02020603050405020304" pitchFamily="18" charset="0"/>
+                <a:cs typeface="Times New Roman" panose="02020603050405020304" pitchFamily="18" charset="0"/>
+              </a:rPr>
+              <a:t> (270 vs 1_245)</a:t>
+            </a:r>
+          </a:p>
+        </p:txBody>
+      </p:sp>
+      <p:pic>
+        <p:nvPicPr>
+          <p:cNvPr id="10" name="Image 9">
+            <a:extLst>
+              <a:ext uri="{FF2B5EF4-FFF2-40B4-BE49-F238E27FC236}">
+                <a16:creationId xmlns:a16="http://schemas.microsoft.com/office/drawing/2014/main" id="{3BC81B83-FC89-A55D-B0AA-907A25D78F59}"/>
+              </a:ext>
+            </a:extLst>
+          </p:cNvPr>
+          <p:cNvPicPr>
+            <a:picLocks noChangeAspect="1"/>
+          </p:cNvPicPr>
+          <p:nvPr/>
+        </p:nvPicPr>
+        <p:blipFill>
+          <a:blip r:embed="rId6"/>
+          <a:stretch>
+            <a:fillRect/>
+          </a:stretch>
+        </p:blipFill>
+        <p:spPr>
+          <a:xfrm>
+            <a:off x="213360" y="3505199"/>
+            <a:ext cx="4903006" cy="3190613"/>
+          </a:xfrm>
+          <a:prstGeom prst="rect">
+            <a:avLst/>
+          </a:prstGeom>
+          <a:effectLst>
+            <a:outerShdw blurRad="50800" dist="38100" dir="2700000" algn="tl" rotWithShape="0">
+              <a:prstClr val="black">
+                <a:alpha val="40000"/>
+              </a:prstClr>
+            </a:outerShdw>
+          </a:effectLst>
+        </p:spPr>
+      </p:pic>
+    </p:spTree>
+    <p:extLst>
+      <p:ext uri="{BB962C8B-B14F-4D97-AF65-F5344CB8AC3E}">
+        <p14:creationId xmlns:p14="http://schemas.microsoft.com/office/powerpoint/2010/main" val="706215125"/>
+      </p:ext>
+    </p:extLst>
+  </p:cSld>
+  <p:clrMapOvr>
+    <a:masterClrMapping/>
+  </p:clrMapOvr>
+</p:sld>
+</file>
+
+<file path=ppt/slides/slide3.xml><?xml version="1.0" encoding="utf-8"?>
+<p:sld xmlns:a="http://schemas.openxmlformats.org/drawingml/2006/main" xmlns:r="http://schemas.openxmlformats.org/officeDocument/2006/relationships" xmlns:p="http://schemas.openxmlformats.org/presentationml/2006/main">
+  <p:cSld>
+    <p:spTree>
+      <p:nvGrpSpPr>
+        <p:cNvPr id="1" name=""/>
+        <p:cNvGrpSpPr/>
+        <p:nvPr/>
+      </p:nvGrpSpPr>
+      <p:grpSpPr>
+        <a:xfrm>
+          <a:off x="0" y="0"/>
+          <a:ext cx="0" cy="0"/>
+          <a:chOff x="0" y="0"/>
+          <a:chExt cx="0" cy="0"/>
+        </a:xfrm>
+      </p:grpSpPr>
+      <p:sp>
+        <p:nvSpPr>
+          <p:cNvPr id="2" name="Titre 1">
+            <a:extLst>
+              <a:ext uri="{FF2B5EF4-FFF2-40B4-BE49-F238E27FC236}">
+                <a16:creationId xmlns:a16="http://schemas.microsoft.com/office/drawing/2014/main" id="{FC7D7D61-5212-F8DF-8A01-7BF2EB86AE7E}"/>
+              </a:ext>
+            </a:extLst>
+          </p:cNvPr>
+          <p:cNvSpPr>
+            <a:spLocks noGrp="1"/>
+          </p:cNvSpPr>
+          <p:nvPr>
+            <p:ph type="title"/>
+          </p:nvPr>
+        </p:nvSpPr>
+        <p:spPr/>
+        <p:txBody>
+          <a:bodyPr/>
+          <a:lstStyle/>
+          <a:p>
+            <a:r>
+              <a:rPr lang="fr-FR" dirty="0" err="1"/>
+              <a:t>Delays</a:t>
+            </a:r>
+            <a:r>
+              <a:rPr lang="fr-FR" dirty="0"/>
+              <a:t> – </a:t>
+            </a:r>
+            <a:r>
+              <a:rPr lang="fr-FR" dirty="0" err="1"/>
+              <a:t>Answering</a:t>
+            </a:r>
+            <a:r>
+              <a:rPr lang="fr-FR" dirty="0"/>
+              <a:t> questions</a:t>
+            </a:r>
+          </a:p>
+        </p:txBody>
+      </p:sp>
+      <p:sp>
+        <p:nvSpPr>
+          <p:cNvPr id="12" name="Espace réservé du contenu 11">
+            <a:extLst>
+              <a:ext uri="{FF2B5EF4-FFF2-40B4-BE49-F238E27FC236}">
+                <a16:creationId xmlns:a16="http://schemas.microsoft.com/office/drawing/2014/main" id="{3BF23DB9-20EA-6B31-5964-B4051286AE1C}"/>
+              </a:ext>
+            </a:extLst>
+          </p:cNvPr>
+          <p:cNvSpPr>
+            <a:spLocks noGrp="1"/>
+          </p:cNvSpPr>
+          <p:nvPr>
+            <p:ph idx="1"/>
+          </p:nvPr>
+        </p:nvSpPr>
+        <p:spPr/>
+        <p:txBody>
+          <a:bodyPr/>
+          <a:lstStyle/>
+          <a:p>
+            <a:r>
+              <a:rPr lang="en-US" dirty="0"/>
+              <a:t>How often are drivers late for the next check-in?</a:t>
+            </a:r>
+          </a:p>
+          <a:p>
+            <a:pPr lvl="1"/>
+            <a:r>
+              <a:rPr lang="en-US" dirty="0"/>
+              <a:t>55%</a:t>
+            </a:r>
+          </a:p>
+          <a:p>
+            <a:pPr lvl="1"/>
+            <a:endParaRPr lang="en-US" dirty="0"/>
+          </a:p>
+          <a:p>
+            <a:pPr lvl="1"/>
+            <a:endParaRPr lang="en-US" dirty="0"/>
+          </a:p>
+          <a:p>
+            <a:pPr lvl="1"/>
+            <a:endParaRPr lang="en-US" dirty="0"/>
+          </a:p>
+          <a:p>
+            <a:endParaRPr lang="en-US" dirty="0"/>
+          </a:p>
+          <a:p>
+            <a:r>
+              <a:rPr lang="en-US" dirty="0"/>
+              <a:t>How does it impact the next driver?</a:t>
+            </a:r>
+          </a:p>
+          <a:p>
+            <a:pPr lvl="1"/>
+            <a:r>
+              <a:rPr lang="en-US" dirty="0"/>
+              <a:t>50% of</a:t>
+            </a:r>
+          </a:p>
+          <a:p>
+            <a:endParaRPr lang="fr-FR" dirty="0"/>
+          </a:p>
+        </p:txBody>
+      </p:sp>
+      <p:pic>
+        <p:nvPicPr>
+          <p:cNvPr id="7" name="Image 6" descr="Une image contenant texte, capture d’écran, diagramme, ligne&#10;&#10;Description générée automatiquement">
+            <a:extLst>
+              <a:ext uri="{FF2B5EF4-FFF2-40B4-BE49-F238E27FC236}">
+                <a16:creationId xmlns:a16="http://schemas.microsoft.com/office/drawing/2014/main" id="{27865B6C-4F03-D048-F461-31FC5E107F55}"/>
+              </a:ext>
+            </a:extLst>
+          </p:cNvPr>
+          <p:cNvPicPr>
+            <a:picLocks noChangeAspect="1"/>
+          </p:cNvPicPr>
+          <p:nvPr/>
+        </p:nvPicPr>
+        <p:blipFill>
+          <a:blip r:embed="rId3">
+            <a:extLst>
+              <a:ext uri="{28A0092B-C50C-407E-A947-70E740481C1C}">
+                <a14:useLocalDpi xmlns:a14="http://schemas.microsoft.com/office/drawing/2010/main" val="0"/>
+              </a:ext>
+            </a:extLst>
+          </a:blip>
+          <a:stretch>
+            <a:fillRect/>
+          </a:stretch>
+        </p:blipFill>
+        <p:spPr>
+          <a:xfrm>
+            <a:off x="2042160" y="1692594"/>
+            <a:ext cx="4891095" cy="2064872"/>
+          </a:xfrm>
+          <a:prstGeom prst="rect">
+            <a:avLst/>
+          </a:prstGeom>
+          <a:effectLst>
+            <a:outerShdw blurRad="50800" dist="38100" dir="2700000" algn="tl" rotWithShape="0">
+              <a:prstClr val="black">
+                <a:alpha val="40000"/>
+              </a:prstClr>
+            </a:outerShdw>
+          </a:effectLst>
+        </p:spPr>
+      </p:pic>
+      <p:pic>
+        <p:nvPicPr>
+          <p:cNvPr id="14" name="Image 13">
+            <a:extLst>
+              <a:ext uri="{FF2B5EF4-FFF2-40B4-BE49-F238E27FC236}">
+                <a16:creationId xmlns:a16="http://schemas.microsoft.com/office/drawing/2014/main" id="{AEF54AAA-07A6-5DD6-5763-917D55F13FCD}"/>
+              </a:ext>
+            </a:extLst>
+          </p:cNvPr>
+          <p:cNvPicPr>
+            <a:picLocks noChangeAspect="1"/>
+          </p:cNvPicPr>
+          <p:nvPr/>
+        </p:nvPicPr>
+        <p:blipFill>
+          <a:blip r:embed="rId4"/>
+          <a:stretch>
+            <a:fillRect/>
+          </a:stretch>
+        </p:blipFill>
+        <p:spPr>
+          <a:xfrm>
+            <a:off x="7335063" y="1692593"/>
+            <a:ext cx="3550928" cy="2064872"/>
+          </a:xfrm>
+          <a:prstGeom prst="rect">
+            <a:avLst/>
+          </a:prstGeom>
+          <a:effectLst>
+            <a:outerShdw blurRad="50800" dist="38100" dir="2700000" algn="tl" rotWithShape="0">
+              <a:prstClr val="black">
+                <a:alpha val="40000"/>
+              </a:prstClr>
+            </a:outerShdw>
+          </a:effectLst>
+        </p:spPr>
+      </p:pic>
+    </p:spTree>
+    <p:extLst>
+      <p:ext uri="{BB962C8B-B14F-4D97-AF65-F5344CB8AC3E}">
+        <p14:creationId xmlns:p14="http://schemas.microsoft.com/office/powerpoint/2010/main" val="3580628546"/>
+      </p:ext>
+    </p:extLst>
+  </p:cSld>
+  <p:clrMapOvr>
+    <a:masterClrMapping/>
+  </p:clrMapOvr>
+</p:sld>
+</file>
+
+<file path=ppt/slides/slide4.xml><?xml version="1.0" encoding="utf-8"?>
+<p:sld xmlns:a="http://schemas.openxmlformats.org/drawingml/2006/main" xmlns:r="http://schemas.openxmlformats.org/officeDocument/2006/relationships" xmlns:p="http://schemas.openxmlformats.org/presentationml/2006/main">
+  <p:cSld>
+    <p:spTree>
+      <p:nvGrpSpPr>
+        <p:cNvPr id="1" name=""/>
+        <p:cNvGrpSpPr/>
+        <p:nvPr/>
+      </p:nvGrpSpPr>
+      <p:grpSpPr>
+        <a:xfrm>
+          <a:off x="0" y="0"/>
+          <a:ext cx="0" cy="0"/>
+          <a:chOff x="0" y="0"/>
+          <a:chExt cx="0" cy="0"/>
+        </a:xfrm>
+      </p:grpSpPr>
+      <p:sp>
+        <p:nvSpPr>
+          <p:cNvPr id="2" name="Titre 1">
+            <a:extLst>
+              <a:ext uri="{FF2B5EF4-FFF2-40B4-BE49-F238E27FC236}">
+                <a16:creationId xmlns:a16="http://schemas.microsoft.com/office/drawing/2014/main" id="{ACD283A2-235E-3D8D-4CCF-84779E1B1693}"/>
+              </a:ext>
+            </a:extLst>
+          </p:cNvPr>
+          <p:cNvSpPr>
+            <a:spLocks noGrp="1"/>
+          </p:cNvSpPr>
+          <p:nvPr>
+            <p:ph type="title"/>
+          </p:nvPr>
+        </p:nvSpPr>
+        <p:spPr/>
+        <p:txBody>
+          <a:bodyPr/>
+          <a:lstStyle/>
+          <a:p>
+            <a:r>
+              <a:rPr lang="fr-FR" dirty="0" err="1"/>
+              <a:t>Delays</a:t>
+            </a:r>
+            <a:r>
+              <a:rPr lang="fr-FR" dirty="0"/>
+              <a:t> – </a:t>
+            </a:r>
+            <a:r>
+              <a:rPr lang="fr-FR" dirty="0" err="1"/>
+              <a:t>Answering</a:t>
+            </a:r>
+            <a:r>
+              <a:rPr lang="fr-FR" dirty="0"/>
+              <a:t> questions</a:t>
+            </a:r>
+          </a:p>
+        </p:txBody>
+      </p:sp>
+      <p:sp>
+        <p:nvSpPr>
+          <p:cNvPr id="3" name="Espace réservé du contenu 2">
+            <a:extLst>
+              <a:ext uri="{FF2B5EF4-FFF2-40B4-BE49-F238E27FC236}">
+                <a16:creationId xmlns:a16="http://schemas.microsoft.com/office/drawing/2014/main" id="{8F29940B-4FD0-ABE4-DB5C-9C9331F1A44D}"/>
+              </a:ext>
+            </a:extLst>
+          </p:cNvPr>
+          <p:cNvSpPr>
+            <a:spLocks noGrp="1"/>
+          </p:cNvSpPr>
+          <p:nvPr>
+            <p:ph idx="1"/>
+          </p:nvPr>
+        </p:nvSpPr>
+        <p:spPr/>
+        <p:txBody>
+          <a:bodyPr/>
+          <a:lstStyle/>
+          <a:p>
+            <a:r>
+              <a:rPr lang="en-US" dirty="0"/>
+              <a:t>How many rentals would be affected by the feature depending on the threshold and scope we choose?</a:t>
+            </a:r>
+            <a:endParaRPr lang="fr-FR" dirty="0"/>
+          </a:p>
+        </p:txBody>
+      </p:sp>
+      <p:pic>
+        <p:nvPicPr>
+          <p:cNvPr id="5" name="Espace réservé du contenu 4" descr="Une image contenant ligne, capture d’écran, diagramme, Tracé&#10;&#10;Description générée automatiquement">
+            <a:extLst>
+              <a:ext uri="{FF2B5EF4-FFF2-40B4-BE49-F238E27FC236}">
+                <a16:creationId xmlns:a16="http://schemas.microsoft.com/office/drawing/2014/main" id="{59DAF2EC-5648-77E9-552C-5A4723193AB0}"/>
+              </a:ext>
+            </a:extLst>
+          </p:cNvPr>
+          <p:cNvPicPr>
+            <a:picLocks noChangeAspect="1"/>
+          </p:cNvPicPr>
+          <p:nvPr/>
+        </p:nvPicPr>
+        <p:blipFill>
+          <a:blip r:embed="rId2">
+            <a:extLst>
+              <a:ext uri="{28A0092B-C50C-407E-A947-70E740481C1C}">
+                <a14:useLocalDpi xmlns:a14="http://schemas.microsoft.com/office/drawing/2010/main" val="0"/>
+              </a:ext>
+            </a:extLst>
+          </a:blip>
+          <a:stretch>
+            <a:fillRect/>
+          </a:stretch>
+        </p:blipFill>
+        <p:spPr>
+          <a:xfrm>
+            <a:off x="213360" y="2198951"/>
+            <a:ext cx="5558319" cy="1772877"/>
+          </a:xfrm>
+          <a:prstGeom prst="rect">
+            <a:avLst/>
+          </a:prstGeom>
+          <a:effectLst>
+            <a:outerShdw blurRad="50800" dist="38100" dir="2700000" algn="tl" rotWithShape="0">
+              <a:prstClr val="black">
+                <a:alpha val="40000"/>
+              </a:prstClr>
+            </a:outerShdw>
+          </a:effectLst>
+        </p:spPr>
+      </p:pic>
+      <p:pic>
+        <p:nvPicPr>
+          <p:cNvPr id="6" name="Image 5">
+            <a:extLst>
+              <a:ext uri="{FF2B5EF4-FFF2-40B4-BE49-F238E27FC236}">
+                <a16:creationId xmlns:a16="http://schemas.microsoft.com/office/drawing/2014/main" id="{1C7ADBB9-4A2B-F296-AA53-6B93BEEBDA66}"/>
+              </a:ext>
+            </a:extLst>
+          </p:cNvPr>
+          <p:cNvPicPr>
+            <a:picLocks noChangeAspect="1"/>
+          </p:cNvPicPr>
+          <p:nvPr/>
+        </p:nvPicPr>
+        <p:blipFill>
+          <a:blip r:embed="rId3"/>
+          <a:stretch>
+            <a:fillRect/>
+          </a:stretch>
+        </p:blipFill>
+        <p:spPr>
+          <a:xfrm>
+            <a:off x="7034784" y="2198951"/>
+            <a:ext cx="4943856" cy="3201269"/>
+          </a:xfrm>
+          <a:prstGeom prst="rect">
+            <a:avLst/>
+          </a:prstGeom>
+          <a:effectLst>
+            <a:outerShdw blurRad="50800" dist="38100" dir="2700000" algn="tl" rotWithShape="0">
+              <a:prstClr val="black">
+                <a:alpha val="40000"/>
+              </a:prstClr>
+            </a:outerShdw>
+          </a:effectLst>
+        </p:spPr>
+      </p:pic>
+    </p:spTree>
+    <p:extLst>
+      <p:ext uri="{BB962C8B-B14F-4D97-AF65-F5344CB8AC3E}">
+        <p14:creationId xmlns:p14="http://schemas.microsoft.com/office/powerpoint/2010/main" val="585511404"/>
+      </p:ext>
+    </p:extLst>
+  </p:cSld>
+  <p:clrMapOvr>
+    <a:masterClrMapping/>
+  </p:clrMapOvr>
+</p:sld>
+</file>
+
+<file path=ppt/slides/slide5.xml><?xml version="1.0" encoding="utf-8"?>
+<p:sld xmlns:a="http://schemas.openxmlformats.org/drawingml/2006/main" xmlns:r="http://schemas.openxmlformats.org/officeDocument/2006/relationships" xmlns:p="http://schemas.openxmlformats.org/presentationml/2006/main">
+  <p:cSld>
+    <p:spTree>
+      <p:nvGrpSpPr>
+        <p:cNvPr id="1" name=""/>
+        <p:cNvGrpSpPr/>
+        <p:nvPr/>
+      </p:nvGrpSpPr>
+      <p:grpSpPr>
+        <a:xfrm>
+          <a:off x="0" y="0"/>
+          <a:ext cx="0" cy="0"/>
+          <a:chOff x="0" y="0"/>
+          <a:chExt cx="0" cy="0"/>
+        </a:xfrm>
+      </p:grpSpPr>
+      <p:sp>
+        <p:nvSpPr>
+          <p:cNvPr id="2" name="Titre 1">
+            <a:extLst>
+              <a:ext uri="{FF2B5EF4-FFF2-40B4-BE49-F238E27FC236}">
+                <a16:creationId xmlns:a16="http://schemas.microsoft.com/office/drawing/2014/main" id="{B4D97055-99E9-D072-BFAC-6A2769619FC4}"/>
+              </a:ext>
+            </a:extLst>
+          </p:cNvPr>
+          <p:cNvSpPr>
+            <a:spLocks noGrp="1"/>
+          </p:cNvSpPr>
+          <p:nvPr>
+            <p:ph type="title"/>
+          </p:nvPr>
+        </p:nvSpPr>
+        <p:spPr/>
+        <p:txBody>
+          <a:bodyPr/>
+          <a:lstStyle/>
+          <a:p>
+            <a:r>
+              <a:rPr lang="fr-FR" dirty="0" err="1"/>
+              <a:t>Delays</a:t>
+            </a:r>
+            <a:r>
+              <a:rPr lang="fr-FR" dirty="0"/>
+              <a:t> Dashboard</a:t>
+            </a:r>
+          </a:p>
+        </p:txBody>
+      </p:sp>
+      <p:sp>
+        <p:nvSpPr>
+          <p:cNvPr id="3" name="Espace réservé du contenu 2">
+            <a:extLst>
+              <a:ext uri="{FF2B5EF4-FFF2-40B4-BE49-F238E27FC236}">
+                <a16:creationId xmlns:a16="http://schemas.microsoft.com/office/drawing/2014/main" id="{F18C99FE-9161-B94A-54A3-536554EA1A52}"/>
+              </a:ext>
+            </a:extLst>
+          </p:cNvPr>
+          <p:cNvSpPr>
+            <a:spLocks noGrp="1"/>
+          </p:cNvSpPr>
+          <p:nvPr>
+            <p:ph idx="1"/>
+          </p:nvPr>
+        </p:nvSpPr>
+        <p:spPr/>
+        <p:txBody>
+          <a:bodyPr/>
+          <a:lstStyle/>
+          <a:p>
+            <a:endParaRPr lang="fr-FR"/>
+          </a:p>
+        </p:txBody>
+      </p:sp>
+    </p:spTree>
+    <p:extLst>
+      <p:ext uri="{BB962C8B-B14F-4D97-AF65-F5344CB8AC3E}">
+        <p14:creationId xmlns:p14="http://schemas.microsoft.com/office/powerpoint/2010/main" val="3903331035"/>
+      </p:ext>
+    </p:extLst>
+  </p:cSld>
+  <p:clrMapOvr>
+    <a:masterClrMapping/>
+  </p:clrMapOvr>
+</p:sld>
+</file>
+
+<file path=ppt/slides/slide6.xml><?xml version="1.0" encoding="utf-8"?>
+<p:sld xmlns:a="http://schemas.openxmlformats.org/drawingml/2006/main" xmlns:r="http://schemas.openxmlformats.org/officeDocument/2006/relationships" xmlns:p="http://schemas.openxmlformats.org/presentationml/2006/main">
+  <p:cSld>
+    <p:spTree>
+      <p:nvGrpSpPr>
+        <p:cNvPr id="1" name=""/>
+        <p:cNvGrpSpPr/>
+        <p:nvPr/>
+      </p:nvGrpSpPr>
+      <p:grpSpPr>
+        <a:xfrm>
+          <a:off x="0" y="0"/>
+          <a:ext cx="0" cy="0"/>
+          <a:chOff x="0" y="0"/>
+          <a:chExt cx="0" cy="0"/>
+        </a:xfrm>
+      </p:grpSpPr>
+      <p:sp>
+        <p:nvSpPr>
+          <p:cNvPr id="2" name="Titre 1">
+            <a:extLst>
+              <a:ext uri="{FF2B5EF4-FFF2-40B4-BE49-F238E27FC236}">
+                <a16:creationId xmlns:a16="http://schemas.microsoft.com/office/drawing/2014/main" id="{111DB58F-DBEF-971C-6E7F-5E73545B868A}"/>
+              </a:ext>
+            </a:extLst>
+          </p:cNvPr>
+          <p:cNvSpPr>
+            <a:spLocks noGrp="1"/>
+          </p:cNvSpPr>
+          <p:nvPr>
+            <p:ph type="title"/>
+          </p:nvPr>
+        </p:nvSpPr>
+        <p:spPr/>
+        <p:txBody>
+          <a:bodyPr/>
+          <a:lstStyle/>
+          <a:p>
+            <a:r>
+              <a:rPr lang="fr-FR" dirty="0"/>
+              <a:t>Pricing EDA &amp; model</a:t>
+            </a:r>
+          </a:p>
+        </p:txBody>
+      </p:sp>
+      <p:sp>
+        <p:nvSpPr>
+          <p:cNvPr id="3" name="Espace réservé du contenu 2">
+            <a:extLst>
+              <a:ext uri="{FF2B5EF4-FFF2-40B4-BE49-F238E27FC236}">
+                <a16:creationId xmlns:a16="http://schemas.microsoft.com/office/drawing/2014/main" id="{3E592FDF-3643-E91C-8F24-9D2C34BDDD80}"/>
+              </a:ext>
+            </a:extLst>
+          </p:cNvPr>
+          <p:cNvSpPr>
+            <a:spLocks noGrp="1"/>
+          </p:cNvSpPr>
+          <p:nvPr>
+            <p:ph idx="1"/>
+          </p:nvPr>
+        </p:nvSpPr>
+        <p:spPr/>
+        <p:txBody>
+          <a:bodyPr>
+            <a:normAutofit fontScale="92500" lnSpcReduction="10000"/>
+          </a:bodyPr>
+          <a:lstStyle/>
+          <a:p>
+            <a:endParaRPr lang="fr-FR" dirty="0"/>
+          </a:p>
+          <a:p>
+            <a:endParaRPr lang="fr-FR" dirty="0"/>
+          </a:p>
+          <a:p>
+            <a:endParaRPr lang="fr-FR" dirty="0"/>
+          </a:p>
+          <a:p>
+            <a:endParaRPr lang="fr-FR" dirty="0"/>
+          </a:p>
+          <a:p>
+            <a:endParaRPr lang="fr-FR" dirty="0"/>
+          </a:p>
+          <a:p>
+            <a:endParaRPr lang="fr-FR" dirty="0"/>
+          </a:p>
+          <a:p>
+            <a:r>
+              <a:rPr lang="fr-FR" dirty="0" err="1"/>
+              <a:t>We</a:t>
+            </a:r>
+            <a:r>
+              <a:rPr lang="fr-FR" dirty="0"/>
+              <a:t> </a:t>
+            </a:r>
+            <a:r>
+              <a:rPr lang="fr-FR" dirty="0" err="1"/>
+              <a:t>keep</a:t>
+            </a:r>
+            <a:r>
+              <a:rPr lang="fr-FR" dirty="0"/>
+              <a:t> the outliers</a:t>
+            </a:r>
+          </a:p>
+          <a:p>
+            <a:r>
+              <a:rPr lang="fr-FR" dirty="0" err="1"/>
+              <a:t>Linear</a:t>
+            </a:r>
+            <a:r>
+              <a:rPr lang="fr-FR" dirty="0"/>
+              <a:t> </a:t>
+            </a:r>
+            <a:r>
+              <a:rPr lang="fr-FR" dirty="0" err="1"/>
+              <a:t>baseline</a:t>
+            </a:r>
+            <a:r>
+              <a:rPr lang="fr-FR" dirty="0"/>
+              <a:t> model</a:t>
+            </a:r>
+          </a:p>
+          <a:p>
+            <a:r>
+              <a:rPr lang="fr-FR" dirty="0" err="1"/>
+              <a:t>XGBoost</a:t>
+            </a:r>
+            <a:r>
+              <a:rPr lang="fr-FR" dirty="0"/>
+              <a:t> model</a:t>
+            </a:r>
+          </a:p>
+          <a:p>
+            <a:r>
+              <a:rPr lang="fr-FR" dirty="0"/>
+              <a:t>The pipeline and the model</a:t>
+            </a:r>
+            <a:br>
+              <a:rPr lang="fr-FR" dirty="0"/>
+            </a:br>
+            <a:r>
+              <a:rPr lang="fr-FR" dirty="0"/>
+              <a:t>are </a:t>
+            </a:r>
+            <a:r>
+              <a:rPr lang="fr-FR" dirty="0" err="1"/>
+              <a:t>saved</a:t>
+            </a:r>
+            <a:r>
+              <a:rPr lang="fr-FR" dirty="0"/>
+              <a:t> as .</a:t>
+            </a:r>
+            <a:r>
+              <a:rPr lang="fr-FR" dirty="0" err="1"/>
+              <a:t>pkl</a:t>
+            </a:r>
+            <a:endParaRPr lang="fr-FR" dirty="0"/>
+          </a:p>
+        </p:txBody>
+      </p:sp>
+      <p:pic>
+        <p:nvPicPr>
+          <p:cNvPr id="5" name="Image 4">
+            <a:extLst>
+              <a:ext uri="{FF2B5EF4-FFF2-40B4-BE49-F238E27FC236}">
+                <a16:creationId xmlns:a16="http://schemas.microsoft.com/office/drawing/2014/main" id="{CF5491DE-BCC9-7085-74C9-9EF97B3DCD05}"/>
+              </a:ext>
+            </a:extLst>
+          </p:cNvPr>
+          <p:cNvPicPr>
+            <a:picLocks noChangeAspect="1"/>
+          </p:cNvPicPr>
+          <p:nvPr/>
+        </p:nvPicPr>
+        <p:blipFill>
+          <a:blip r:embed="rId3"/>
+          <a:stretch>
+            <a:fillRect/>
+          </a:stretch>
+        </p:blipFill>
+        <p:spPr>
+          <a:xfrm>
+            <a:off x="6386182" y="4871856"/>
+            <a:ext cx="5144218" cy="1305107"/>
+          </a:xfrm>
+          <a:prstGeom prst="rect">
+            <a:avLst/>
+          </a:prstGeom>
+          <a:effectLst>
+            <a:outerShdw blurRad="50800" dist="38100" dir="2700000" algn="tl" rotWithShape="0">
+              <a:prstClr val="black">
+                <a:alpha val="40000"/>
+              </a:prstClr>
+            </a:outerShdw>
+          </a:effectLst>
+        </p:spPr>
+      </p:pic>
+      <p:pic>
+        <p:nvPicPr>
+          <p:cNvPr id="7" name="Image 6">
+            <a:extLst>
+              <a:ext uri="{FF2B5EF4-FFF2-40B4-BE49-F238E27FC236}">
+                <a16:creationId xmlns:a16="http://schemas.microsoft.com/office/drawing/2014/main" id="{AAC86818-0C7F-92EC-3533-472B4874AC08}"/>
+              </a:ext>
+            </a:extLst>
+          </p:cNvPr>
+          <p:cNvPicPr>
+            <a:picLocks noChangeAspect="1"/>
+          </p:cNvPicPr>
+          <p:nvPr/>
+        </p:nvPicPr>
+        <p:blipFill>
+          <a:blip r:embed="rId4"/>
+          <a:stretch>
+            <a:fillRect/>
+          </a:stretch>
+        </p:blipFill>
+        <p:spPr>
+          <a:xfrm>
+            <a:off x="1085279" y="975202"/>
+            <a:ext cx="3157538" cy="2909888"/>
+          </a:xfrm>
+          <a:prstGeom prst="rect">
+            <a:avLst/>
+          </a:prstGeom>
+          <a:effectLst>
+            <a:outerShdw blurRad="50800" dist="38100" dir="2700000" algn="tl" rotWithShape="0">
+              <a:prstClr val="black">
+                <a:alpha val="40000"/>
+              </a:prstClr>
+            </a:outerShdw>
+          </a:effectLst>
+        </p:spPr>
+      </p:pic>
+      <p:pic>
+        <p:nvPicPr>
+          <p:cNvPr id="9" name="Image 8">
+            <a:extLst>
+              <a:ext uri="{FF2B5EF4-FFF2-40B4-BE49-F238E27FC236}">
+                <a16:creationId xmlns:a16="http://schemas.microsoft.com/office/drawing/2014/main" id="{780A8172-615B-B4DE-815B-9DCE85BA51AF}"/>
+              </a:ext>
+            </a:extLst>
+          </p:cNvPr>
+          <p:cNvPicPr>
+            <a:picLocks noChangeAspect="1"/>
+          </p:cNvPicPr>
+          <p:nvPr/>
+        </p:nvPicPr>
+        <p:blipFill>
+          <a:blip r:embed="rId5"/>
+          <a:stretch>
+            <a:fillRect/>
+          </a:stretch>
+        </p:blipFill>
+        <p:spPr>
+          <a:xfrm>
+            <a:off x="6944767" y="975202"/>
+            <a:ext cx="4471617" cy="2909888"/>
+          </a:xfrm>
+          <a:prstGeom prst="rect">
+            <a:avLst/>
+          </a:prstGeom>
+          <a:effectLst>
+            <a:outerShdw blurRad="50800" dist="38100" dir="2700000" algn="tl" rotWithShape="0">
+              <a:prstClr val="black">
+                <a:alpha val="40000"/>
+              </a:prstClr>
+            </a:outerShdw>
+          </a:effectLst>
+        </p:spPr>
+      </p:pic>
+      <p:sp>
+        <p:nvSpPr>
+          <p:cNvPr id="10" name="ZoneTexte 9">
+            <a:extLst>
+              <a:ext uri="{FF2B5EF4-FFF2-40B4-BE49-F238E27FC236}">
+                <a16:creationId xmlns:a16="http://schemas.microsoft.com/office/drawing/2014/main" id="{6CB5A37B-494E-775E-BDE7-0C04F375E69F}"/>
+              </a:ext>
+            </a:extLst>
+          </p:cNvPr>
+          <p:cNvSpPr txBox="1"/>
+          <p:nvPr/>
+        </p:nvSpPr>
+        <p:spPr>
+          <a:xfrm>
+            <a:off x="9327249" y="3885090"/>
+            <a:ext cx="2100255" cy="261610"/>
+          </a:xfrm>
+          <a:prstGeom prst="rect">
+            <a:avLst/>
+          </a:prstGeom>
+          <a:noFill/>
+        </p:spPr>
+        <p:txBody>
+          <a:bodyPr wrap="none" rtlCol="0">
+            <a:spAutoFit/>
+          </a:bodyPr>
+          <a:lstStyle/>
+          <a:p>
+            <a:pPr algn="r"/>
+            <a:r>
+              <a:rPr lang="fr-FR" sz="1100" i="1" dirty="0">
+                <a:latin typeface="Times New Roman" panose="02020603050405020304" pitchFamily="18" charset="0"/>
+                <a:cs typeface="Times New Roman" panose="02020603050405020304" pitchFamily="18" charset="0"/>
+              </a:rPr>
+              <a:t>5 brands cover 80% of the </a:t>
+            </a:r>
+            <a:r>
+              <a:rPr lang="fr-FR" sz="1100" i="1" dirty="0" err="1">
+                <a:latin typeface="Times New Roman" panose="02020603050405020304" pitchFamily="18" charset="0"/>
+                <a:cs typeface="Times New Roman" panose="02020603050405020304" pitchFamily="18" charset="0"/>
+              </a:rPr>
+              <a:t>market</a:t>
+            </a:r>
+            <a:endParaRPr lang="fr-FR" sz="1100" i="1" dirty="0">
+              <a:latin typeface="Times New Roman" panose="02020603050405020304" pitchFamily="18" charset="0"/>
+              <a:cs typeface="Times New Roman" panose="02020603050405020304" pitchFamily="18" charset="0"/>
+            </a:endParaRPr>
+          </a:p>
+        </p:txBody>
+      </p:sp>
+    </p:spTree>
+    <p:extLst>
+      <p:ext uri="{BB962C8B-B14F-4D97-AF65-F5344CB8AC3E}">
+        <p14:creationId xmlns:p14="http://schemas.microsoft.com/office/powerpoint/2010/main" val="4157245695"/>
+      </p:ext>
+    </p:extLst>
+  </p:cSld>
+  <p:clrMapOvr>
+    <a:masterClrMapping/>
+  </p:clrMapOvr>
+</p:sld>
+</file>
+
+<file path=ppt/slides/slide7.xml><?xml version="1.0" encoding="utf-8"?>
+<p:sld xmlns:a="http://schemas.openxmlformats.org/drawingml/2006/main" xmlns:r="http://schemas.openxmlformats.org/officeDocument/2006/relationships" xmlns:p="http://schemas.openxmlformats.org/presentationml/2006/main">
+  <p:cSld>
+    <p:spTree>
+      <p:nvGrpSpPr>
+        <p:cNvPr id="1" name=""/>
+        <p:cNvGrpSpPr/>
+        <p:nvPr/>
+      </p:nvGrpSpPr>
+      <p:grpSpPr>
+        <a:xfrm>
+          <a:off x="0" y="0"/>
+          <a:ext cx="0" cy="0"/>
+          <a:chOff x="0" y="0"/>
+          <a:chExt cx="0" cy="0"/>
+        </a:xfrm>
+      </p:grpSpPr>
+      <p:sp>
+        <p:nvSpPr>
+          <p:cNvPr id="2" name="Titre 1">
+            <a:extLst>
+              <a:ext uri="{FF2B5EF4-FFF2-40B4-BE49-F238E27FC236}">
+                <a16:creationId xmlns:a16="http://schemas.microsoft.com/office/drawing/2014/main" id="{80E264B2-7E88-C9E0-981F-F9A083C5D9E8}"/>
+              </a:ext>
+            </a:extLst>
+          </p:cNvPr>
+          <p:cNvSpPr>
+            <a:spLocks noGrp="1"/>
+          </p:cNvSpPr>
+          <p:nvPr>
+            <p:ph type="title"/>
+          </p:nvPr>
+        </p:nvSpPr>
+        <p:spPr/>
+        <p:txBody>
+          <a:bodyPr/>
+          <a:lstStyle/>
+          <a:p>
+            <a:r>
+              <a:rPr lang="fr-FR" dirty="0"/>
+              <a:t>Pricing API</a:t>
+            </a:r>
+          </a:p>
+        </p:txBody>
+      </p:sp>
+      <p:sp>
+        <p:nvSpPr>
+          <p:cNvPr id="3" name="Espace réservé du contenu 2">
+            <a:extLst>
+              <a:ext uri="{FF2B5EF4-FFF2-40B4-BE49-F238E27FC236}">
+                <a16:creationId xmlns:a16="http://schemas.microsoft.com/office/drawing/2014/main" id="{53098DBF-2DFC-77BE-B0FF-629FEE740045}"/>
+              </a:ext>
+            </a:extLst>
+          </p:cNvPr>
+          <p:cNvSpPr>
+            <a:spLocks noGrp="1"/>
+          </p:cNvSpPr>
+          <p:nvPr>
+            <p:ph idx="1"/>
+          </p:nvPr>
+        </p:nvSpPr>
+        <p:spPr/>
+        <p:txBody>
+          <a:bodyPr/>
+          <a:lstStyle/>
+          <a:p>
+            <a:r>
+              <a:rPr lang="fr-FR" dirty="0"/>
+              <a:t>The API </a:t>
+            </a:r>
+            <a:r>
+              <a:rPr lang="fr-FR" dirty="0" err="1"/>
+              <a:t>works</a:t>
+            </a:r>
+            <a:r>
+              <a:rPr lang="fr-FR" dirty="0"/>
+              <a:t> </a:t>
+            </a:r>
+          </a:p>
+          <a:p>
+            <a:pPr lvl="1"/>
+            <a:r>
+              <a:rPr lang="fr-FR" dirty="0" err="1"/>
+              <a:t>Locally</a:t>
+            </a:r>
+            <a:r>
+              <a:rPr lang="fr-FR" dirty="0"/>
+              <a:t> (python ./api_getaround.py)</a:t>
+            </a:r>
+          </a:p>
+          <a:p>
+            <a:pPr lvl="1"/>
+            <a:r>
+              <a:rPr lang="fr-FR" dirty="0" err="1"/>
+              <a:t>Locally</a:t>
+            </a:r>
+            <a:r>
+              <a:rPr lang="fr-FR" dirty="0"/>
+              <a:t> in Docker</a:t>
+            </a:r>
+          </a:p>
+          <a:p>
+            <a:pPr lvl="1"/>
+            <a:r>
+              <a:rPr lang="fr-FR" dirty="0"/>
+              <a:t>Online : </a:t>
+            </a:r>
+            <a:r>
+              <a:rPr lang="fr-FR" dirty="0">
+                <a:hlinkClick r:id="rId2"/>
+              </a:rPr>
+              <a:t>https://api-getaround-4ece015745ea.herokuapp.com/</a:t>
+            </a:r>
+            <a:endParaRPr lang="fr-FR" dirty="0"/>
+          </a:p>
+          <a:p>
+            <a:pPr lvl="1"/>
+            <a:r>
+              <a:rPr lang="fr-FR" dirty="0"/>
+              <a:t>3 </a:t>
+            </a:r>
+            <a:r>
+              <a:rPr lang="fr-FR" dirty="0" err="1"/>
+              <a:t>endpoints</a:t>
+            </a:r>
+            <a:r>
+              <a:rPr lang="fr-FR" dirty="0"/>
+              <a:t> : </a:t>
+            </a:r>
+          </a:p>
+          <a:p>
+            <a:pPr lvl="2"/>
+            <a:r>
+              <a:rPr lang="fr-FR" dirty="0"/>
+              <a:t>/</a:t>
+            </a:r>
+          </a:p>
+          <a:p>
+            <a:pPr lvl="2"/>
+            <a:r>
+              <a:rPr lang="fr-FR" dirty="0"/>
+              <a:t>/docs</a:t>
+            </a:r>
+          </a:p>
+          <a:p>
+            <a:pPr lvl="2"/>
+            <a:r>
+              <a:rPr lang="fr-FR" dirty="0"/>
+              <a:t>/</a:t>
+            </a:r>
+            <a:r>
+              <a:rPr lang="fr-FR" dirty="0" err="1"/>
+              <a:t>predict</a:t>
+            </a:r>
+            <a:endParaRPr lang="fr-FR" dirty="0"/>
+          </a:p>
+        </p:txBody>
+      </p:sp>
+      <p:pic>
+        <p:nvPicPr>
+          <p:cNvPr id="5" name="Image 4">
+            <a:extLst>
+              <a:ext uri="{FF2B5EF4-FFF2-40B4-BE49-F238E27FC236}">
+                <a16:creationId xmlns:a16="http://schemas.microsoft.com/office/drawing/2014/main" id="{2D6ABB88-F757-7A0F-B644-0B6F3238940E}"/>
+              </a:ext>
+            </a:extLst>
+          </p:cNvPr>
+          <p:cNvPicPr>
+            <a:picLocks noChangeAspect="1"/>
+          </p:cNvPicPr>
+          <p:nvPr/>
+        </p:nvPicPr>
+        <p:blipFill>
+          <a:blip r:embed="rId3"/>
+          <a:stretch>
+            <a:fillRect/>
+          </a:stretch>
+        </p:blipFill>
+        <p:spPr>
+          <a:xfrm>
+            <a:off x="3828834" y="3429000"/>
+            <a:ext cx="8094941" cy="2480987"/>
+          </a:xfrm>
+          <a:prstGeom prst="rect">
+            <a:avLst/>
+          </a:prstGeom>
+          <a:effectLst>
+            <a:outerShdw blurRad="50800" dist="38100" dir="2700000" algn="tl" rotWithShape="0">
+              <a:prstClr val="black">
+                <a:alpha val="40000"/>
+              </a:prstClr>
+            </a:outerShdw>
+          </a:effectLst>
+        </p:spPr>
+      </p:pic>
+    </p:spTree>
+    <p:extLst>
+      <p:ext uri="{BB962C8B-B14F-4D97-AF65-F5344CB8AC3E}">
+        <p14:creationId xmlns:p14="http://schemas.microsoft.com/office/powerpoint/2010/main" val="2699701360"/>
+      </p:ext>
+    </p:extLst>
+  </p:cSld>
+  <p:clrMapOvr>
+    <a:masterClrMapping/>
+  </p:clrMapOvr>
+</p:sld>
+</file>
+
+<file path=ppt/slides/slide8.xml><?xml version="1.0" encoding="utf-8"?>
+<p:sld xmlns:a="http://schemas.openxmlformats.org/drawingml/2006/main" xmlns:r="http://schemas.openxmlformats.org/officeDocument/2006/relationships" xmlns:p="http://schemas.openxmlformats.org/presentationml/2006/main">
+  <p:cSld>
+    <p:spTree>
+      <p:nvGrpSpPr>
+        <p:cNvPr id="1" name=""/>
+        <p:cNvGrpSpPr/>
+        <p:nvPr/>
+      </p:nvGrpSpPr>
+      <p:grpSpPr>
+        <a:xfrm>
+          <a:off x="0" y="0"/>
+          <a:ext cx="0" cy="0"/>
+          <a:chOff x="0" y="0"/>
+          <a:chExt cx="0" cy="0"/>
+        </a:xfrm>
+      </p:grpSpPr>
+      <p:sp>
+        <p:nvSpPr>
+          <p:cNvPr id="2" name="Titre 1">
+            <a:extLst>
+              <a:ext uri="{FF2B5EF4-FFF2-40B4-BE49-F238E27FC236}">
+                <a16:creationId xmlns:a16="http://schemas.microsoft.com/office/drawing/2014/main" id="{EE71F234-EA1F-7C6D-6C0D-DF35052DEE0B}"/>
+              </a:ext>
+            </a:extLst>
+          </p:cNvPr>
+          <p:cNvSpPr>
+            <a:spLocks noGrp="1"/>
+          </p:cNvSpPr>
+          <p:nvPr>
+            <p:ph type="title"/>
+          </p:nvPr>
+        </p:nvSpPr>
+        <p:spPr/>
+        <p:txBody>
+          <a:bodyPr/>
+          <a:lstStyle/>
+          <a:p>
+            <a:r>
+              <a:rPr lang="fr-FR" dirty="0"/>
+              <a:t>Pricing API</a:t>
+            </a:r>
+          </a:p>
+        </p:txBody>
+      </p:sp>
+      <p:pic>
+        <p:nvPicPr>
+          <p:cNvPr id="7" name="Image 6" descr="Une image contenant texte, logiciel, capture d’écran&#10;&#10;Description générée automatiquement">
+            <a:extLst>
+              <a:ext uri="{FF2B5EF4-FFF2-40B4-BE49-F238E27FC236}">
+                <a16:creationId xmlns:a16="http://schemas.microsoft.com/office/drawing/2014/main" id="{25090FA8-5DFE-F79C-2E60-CD349F5FDAB1}"/>
+              </a:ext>
+            </a:extLst>
+          </p:cNvPr>
+          <p:cNvPicPr>
+            <a:picLocks noChangeAspect="1"/>
+          </p:cNvPicPr>
+          <p:nvPr/>
+        </p:nvPicPr>
+        <p:blipFill>
+          <a:blip r:embed="rId2">
+            <a:extLst>
+              <a:ext uri="{28A0092B-C50C-407E-A947-70E740481C1C}">
+                <a14:useLocalDpi xmlns:a14="http://schemas.microsoft.com/office/drawing/2010/main" val="0"/>
+              </a:ext>
+            </a:extLst>
+          </a:blip>
+          <a:srcRect r="52225"/>
+          <a:stretch/>
+        </p:blipFill>
+        <p:spPr>
+          <a:xfrm>
+            <a:off x="5151863" y="4265284"/>
+            <a:ext cx="6462503" cy="2380679"/>
+          </a:xfrm>
+          <a:prstGeom prst="rect">
+            <a:avLst/>
+          </a:prstGeom>
+          <a:effectLst>
+            <a:outerShdw blurRad="50800" dist="38100" dir="2700000" algn="tl" rotWithShape="0">
+              <a:prstClr val="black">
+                <a:alpha val="40000"/>
+              </a:prstClr>
+            </a:outerShdw>
+          </a:effectLst>
+        </p:spPr>
+      </p:pic>
+      <p:pic>
+        <p:nvPicPr>
+          <p:cNvPr id="9" name="Image 8" descr="Une image contenant texte, Appareils électroniques, capture d’écran, logiciel&#10;&#10;Description générée automatiquement">
+            <a:extLst>
+              <a:ext uri="{FF2B5EF4-FFF2-40B4-BE49-F238E27FC236}">
+                <a16:creationId xmlns:a16="http://schemas.microsoft.com/office/drawing/2014/main" id="{3D845B31-CE49-51BC-3AB9-B3DAA408B64A}"/>
+              </a:ext>
+            </a:extLst>
+          </p:cNvPr>
+          <p:cNvPicPr>
+            <a:picLocks noChangeAspect="1"/>
+          </p:cNvPicPr>
+          <p:nvPr/>
+        </p:nvPicPr>
+        <p:blipFill>
+          <a:blip r:embed="rId3">
+            <a:extLst>
+              <a:ext uri="{28A0092B-C50C-407E-A947-70E740481C1C}">
+                <a14:useLocalDpi xmlns:a14="http://schemas.microsoft.com/office/drawing/2010/main" val="0"/>
+              </a:ext>
+            </a:extLst>
+          </a:blip>
+          <a:stretch>
+            <a:fillRect/>
+          </a:stretch>
+        </p:blipFill>
+        <p:spPr>
+          <a:xfrm>
+            <a:off x="213360" y="1135379"/>
+            <a:ext cx="4133789" cy="3971117"/>
+          </a:xfrm>
+          <a:prstGeom prst="rect">
+            <a:avLst/>
+          </a:prstGeom>
+          <a:effectLst>
+            <a:outerShdw blurRad="50800" dist="38100" dir="2700000" algn="tl" rotWithShape="0">
+              <a:prstClr val="black">
+                <a:alpha val="40000"/>
+              </a:prstClr>
+            </a:outerShdw>
+          </a:effectLst>
+        </p:spPr>
+      </p:pic>
+      <p:pic>
+        <p:nvPicPr>
+          <p:cNvPr id="11" name="Image 10" descr="Une image contenant texte, capture d’écran, logiciel, Site web&#10;&#10;Description générée automatiquement">
+            <a:extLst>
+              <a:ext uri="{FF2B5EF4-FFF2-40B4-BE49-F238E27FC236}">
+                <a16:creationId xmlns:a16="http://schemas.microsoft.com/office/drawing/2014/main" id="{DC406100-7C11-6592-7844-15E2C8E9B90F}"/>
+              </a:ext>
+            </a:extLst>
+          </p:cNvPr>
+          <p:cNvPicPr>
+            <a:picLocks noChangeAspect="1"/>
+          </p:cNvPicPr>
+          <p:nvPr/>
+        </p:nvPicPr>
+        <p:blipFill>
+          <a:blip r:embed="rId4">
+            <a:extLst>
+              <a:ext uri="{28A0092B-C50C-407E-A947-70E740481C1C}">
+                <a14:useLocalDpi xmlns:a14="http://schemas.microsoft.com/office/drawing/2010/main" val="0"/>
+              </a:ext>
+            </a:extLst>
+          </a:blip>
+          <a:stretch>
+            <a:fillRect/>
+          </a:stretch>
+        </p:blipFill>
+        <p:spPr>
+          <a:xfrm>
+            <a:off x="6614072" y="136525"/>
+            <a:ext cx="5000294" cy="3971117"/>
+          </a:xfrm>
+          <a:prstGeom prst="rect">
+            <a:avLst/>
+          </a:prstGeom>
+          <a:effectLst>
+            <a:outerShdw blurRad="50800" dist="38100" dir="2700000" algn="tl" rotWithShape="0">
+              <a:prstClr val="black">
+                <a:alpha val="40000"/>
+              </a:prstClr>
+            </a:outerShdw>
+          </a:effectLst>
+        </p:spPr>
+      </p:pic>
+      <p:sp>
+        <p:nvSpPr>
+          <p:cNvPr id="12" name="ZoneTexte 11">
+            <a:extLst>
+              <a:ext uri="{FF2B5EF4-FFF2-40B4-BE49-F238E27FC236}">
+                <a16:creationId xmlns:a16="http://schemas.microsoft.com/office/drawing/2014/main" id="{3EDAEE3E-9534-2FE4-E433-C4D06345CDAD}"/>
+              </a:ext>
+            </a:extLst>
+          </p:cNvPr>
+          <p:cNvSpPr txBox="1"/>
+          <p:nvPr/>
+        </p:nvSpPr>
+        <p:spPr>
+          <a:xfrm>
+            <a:off x="3094881" y="5194013"/>
+            <a:ext cx="1322798" cy="261610"/>
+          </a:xfrm>
+          <a:prstGeom prst="rect">
+            <a:avLst/>
+          </a:prstGeom>
+          <a:noFill/>
+        </p:spPr>
+        <p:txBody>
+          <a:bodyPr wrap="none" rtlCol="0">
+            <a:spAutoFit/>
+          </a:bodyPr>
+          <a:lstStyle/>
+          <a:p>
+            <a:pPr algn="r"/>
+            <a:r>
+              <a:rPr lang="fr-FR" sz="1100" i="1" dirty="0">
+                <a:latin typeface="Times New Roman" panose="02020603050405020304" pitchFamily="18" charset="0"/>
+                <a:cs typeface="Times New Roman" panose="02020603050405020304" pitchFamily="18" charset="0"/>
+              </a:rPr>
+              <a:t>Auto documentation</a:t>
+            </a:r>
+          </a:p>
+        </p:txBody>
+      </p:sp>
+      <p:sp>
+        <p:nvSpPr>
+          <p:cNvPr id="13" name="ZoneTexte 12">
+            <a:extLst>
+              <a:ext uri="{FF2B5EF4-FFF2-40B4-BE49-F238E27FC236}">
+                <a16:creationId xmlns:a16="http://schemas.microsoft.com/office/drawing/2014/main" id="{0A092700-8F20-7FBD-C187-6FF0B6C92193}"/>
+              </a:ext>
+            </a:extLst>
+          </p:cNvPr>
+          <p:cNvSpPr txBox="1"/>
+          <p:nvPr/>
+        </p:nvSpPr>
+        <p:spPr>
+          <a:xfrm>
+            <a:off x="4270712" y="6384353"/>
+            <a:ext cx="782587" cy="261610"/>
+          </a:xfrm>
+          <a:prstGeom prst="rect">
+            <a:avLst/>
+          </a:prstGeom>
+          <a:noFill/>
+        </p:spPr>
+        <p:txBody>
+          <a:bodyPr wrap="none" rtlCol="0">
+            <a:spAutoFit/>
+          </a:bodyPr>
+          <a:lstStyle/>
+          <a:p>
+            <a:pPr algn="r"/>
+            <a:r>
+              <a:rPr lang="fr-FR" sz="1100" i="1" dirty="0" err="1">
+                <a:latin typeface="Times New Roman" panose="02020603050405020304" pitchFamily="18" charset="0"/>
+                <a:cs typeface="Times New Roman" panose="02020603050405020304" pitchFamily="18" charset="0"/>
+              </a:rPr>
+              <a:t>Using</a:t>
+            </a:r>
+            <a:r>
+              <a:rPr lang="fr-FR" sz="1100" i="1" dirty="0">
+                <a:latin typeface="Times New Roman" panose="02020603050405020304" pitchFamily="18" charset="0"/>
+                <a:cs typeface="Times New Roman" panose="02020603050405020304" pitchFamily="18" charset="0"/>
+              </a:rPr>
+              <a:t> </a:t>
+            </a:r>
+            <a:r>
+              <a:rPr lang="fr-FR" sz="1100" i="1" dirty="0" err="1">
+                <a:latin typeface="Times New Roman" panose="02020603050405020304" pitchFamily="18" charset="0"/>
+                <a:cs typeface="Times New Roman" panose="02020603050405020304" pitchFamily="18" charset="0"/>
+              </a:rPr>
+              <a:t>curl</a:t>
+            </a:r>
+            <a:endParaRPr lang="fr-FR" sz="1100" i="1" dirty="0">
+              <a:latin typeface="Times New Roman" panose="02020603050405020304" pitchFamily="18" charset="0"/>
+              <a:cs typeface="Times New Roman" panose="02020603050405020304" pitchFamily="18" charset="0"/>
+            </a:endParaRPr>
+          </a:p>
+        </p:txBody>
+      </p:sp>
+      <p:sp>
+        <p:nvSpPr>
+          <p:cNvPr id="14" name="ZoneTexte 13">
+            <a:extLst>
+              <a:ext uri="{FF2B5EF4-FFF2-40B4-BE49-F238E27FC236}">
+                <a16:creationId xmlns:a16="http://schemas.microsoft.com/office/drawing/2014/main" id="{87E7EC36-44BF-F058-40E3-3318A742466F}"/>
+              </a:ext>
+            </a:extLst>
+          </p:cNvPr>
+          <p:cNvSpPr txBox="1"/>
+          <p:nvPr/>
+        </p:nvSpPr>
+        <p:spPr>
+          <a:xfrm>
+            <a:off x="5137280" y="136525"/>
+            <a:ext cx="1503938" cy="261610"/>
+          </a:xfrm>
+          <a:prstGeom prst="rect">
+            <a:avLst/>
+          </a:prstGeom>
+          <a:noFill/>
+        </p:spPr>
+        <p:txBody>
+          <a:bodyPr wrap="none" rtlCol="0">
+            <a:spAutoFit/>
+          </a:bodyPr>
+          <a:lstStyle/>
+          <a:p>
+            <a:pPr algn="r"/>
+            <a:r>
+              <a:rPr lang="fr-FR" sz="1100" i="1" dirty="0">
+                <a:latin typeface="Times New Roman" panose="02020603050405020304" pitchFamily="18" charset="0"/>
+                <a:cs typeface="Times New Roman" panose="02020603050405020304" pitchFamily="18" charset="0"/>
+              </a:rPr>
+              <a:t>Exception management</a:t>
+            </a:r>
+          </a:p>
+        </p:txBody>
+      </p:sp>
+      <p:sp>
+        <p:nvSpPr>
+          <p:cNvPr id="15" name="Flèche : haut 14">
+            <a:extLst>
+              <a:ext uri="{FF2B5EF4-FFF2-40B4-BE49-F238E27FC236}">
+                <a16:creationId xmlns:a16="http://schemas.microsoft.com/office/drawing/2014/main" id="{458D2F9F-204D-5EF0-C7C3-BFF934CE7128}"/>
+              </a:ext>
+            </a:extLst>
+          </p:cNvPr>
+          <p:cNvSpPr/>
+          <p:nvPr/>
+        </p:nvSpPr>
+        <p:spPr>
+          <a:xfrm rot="16200000">
+            <a:off x="7367705" y="628823"/>
+            <a:ext cx="464127" cy="644236"/>
+          </a:xfrm>
+          <a:prstGeom prst="upArrow">
+            <a:avLst/>
+          </a:prstGeom>
+          <a:solidFill>
+            <a:srgbClr val="FF0000"/>
+          </a:solidFill>
+        </p:spPr>
+        <p:style>
+          <a:lnRef idx="2">
+            <a:schemeClr val="accent1">
+              <a:shade val="15000"/>
+            </a:schemeClr>
+          </a:lnRef>
+          <a:fillRef idx="1">
+            <a:schemeClr val="accent1"/>
+          </a:fillRef>
+          <a:effectRef idx="0">
+            <a:schemeClr val="accent1"/>
+          </a:effectRef>
+          <a:fontRef idx="minor">
+            <a:schemeClr val="lt1"/>
+          </a:fontRef>
+        </p:style>
+        <p:txBody>
+          <a:bodyPr rtlCol="0" anchor="ctr"/>
+          <a:lstStyle/>
+          <a:p>
+            <a:pPr algn="ctr"/>
+            <a:endParaRPr lang="fr-FR"/>
+          </a:p>
+        </p:txBody>
+      </p:sp>
+      <p:sp>
+        <p:nvSpPr>
+          <p:cNvPr id="16" name="Flèche : haut 15">
+            <a:extLst>
+              <a:ext uri="{FF2B5EF4-FFF2-40B4-BE49-F238E27FC236}">
+                <a16:creationId xmlns:a16="http://schemas.microsoft.com/office/drawing/2014/main" id="{99637A9F-4875-6B35-2C80-E60F31097D41}"/>
+              </a:ext>
+            </a:extLst>
+          </p:cNvPr>
+          <p:cNvSpPr/>
+          <p:nvPr/>
+        </p:nvSpPr>
+        <p:spPr>
+          <a:xfrm rot="5400000">
+            <a:off x="6731272" y="2250585"/>
+            <a:ext cx="464127" cy="644236"/>
+          </a:xfrm>
+          <a:prstGeom prst="upArrow">
+            <a:avLst/>
+          </a:prstGeom>
+          <a:solidFill>
+            <a:srgbClr val="FF0000"/>
+          </a:solidFill>
+          <a:ln>
+            <a:noFill/>
+          </a:ln>
+        </p:spPr>
+        <p:style>
+          <a:lnRef idx="2">
+            <a:schemeClr val="accent1">
+              <a:shade val="15000"/>
+            </a:schemeClr>
+          </a:lnRef>
+          <a:fillRef idx="1">
+            <a:schemeClr val="accent1"/>
+          </a:fillRef>
+          <a:effectRef idx="0">
+            <a:schemeClr val="accent1"/>
+          </a:effectRef>
+          <a:fontRef idx="minor">
+            <a:schemeClr val="lt1"/>
+          </a:fontRef>
+        </p:style>
+        <p:txBody>
+          <a:bodyPr rtlCol="0" anchor="ctr"/>
+          <a:lstStyle/>
+          <a:p>
+            <a:pPr algn="ctr"/>
+            <a:endParaRPr lang="fr-FR"/>
+          </a:p>
+        </p:txBody>
+      </p:sp>
+      <p:pic>
+        <p:nvPicPr>
+          <p:cNvPr id="17" name="Graphique 16" descr="Badge 3 avec un remplissage uni">
+            <a:extLst>
+              <a:ext uri="{FF2B5EF4-FFF2-40B4-BE49-F238E27FC236}">
+                <a16:creationId xmlns:a16="http://schemas.microsoft.com/office/drawing/2014/main" id="{5DAEB0F8-1249-B806-9727-91B0CEFD251C}"/>
+              </a:ext>
+            </a:extLst>
+          </p:cNvPr>
+          <p:cNvPicPr>
+            <a:picLocks noChangeAspect="1"/>
+          </p:cNvPicPr>
+          <p:nvPr/>
+        </p:nvPicPr>
+        <p:blipFill>
+          <a:blip r:embed="rId5">
+            <a:extLst>
+              <a:ext uri="{96DAC541-7B7A-43D3-8B79-37D633B846F1}">
+                <asvg:svgBlip xmlns:asvg="http://schemas.microsoft.com/office/drawing/2016/SVG/main" r:embed="rId6"/>
+              </a:ext>
+            </a:extLst>
+          </a:blip>
+          <a:stretch>
+            <a:fillRect/>
+          </a:stretch>
+        </p:blipFill>
+        <p:spPr>
+          <a:xfrm>
+            <a:off x="4237463" y="5497146"/>
+            <a:ext cx="914400" cy="914400"/>
+          </a:xfrm>
+          <a:prstGeom prst="rect">
+            <a:avLst/>
+          </a:prstGeom>
+        </p:spPr>
+      </p:pic>
+      <p:pic>
+        <p:nvPicPr>
+          <p:cNvPr id="18" name="Espace réservé du contenu 13" descr="Badge avec un remplissage uni">
+            <a:extLst>
+              <a:ext uri="{FF2B5EF4-FFF2-40B4-BE49-F238E27FC236}">
+                <a16:creationId xmlns:a16="http://schemas.microsoft.com/office/drawing/2014/main" id="{9F9A45FB-E1CD-C0A9-C031-4112CF122F01}"/>
+              </a:ext>
+            </a:extLst>
+          </p:cNvPr>
+          <p:cNvPicPr>
+            <a:picLocks noChangeAspect="1"/>
+          </p:cNvPicPr>
+          <p:nvPr/>
+        </p:nvPicPr>
+        <p:blipFill>
+          <a:blip r:embed="rId7">
+            <a:extLst>
+              <a:ext uri="{96DAC541-7B7A-43D3-8B79-37D633B846F1}">
+                <asvg:svgBlip xmlns:asvg="http://schemas.microsoft.com/office/drawing/2016/SVG/main" r:embed="rId8"/>
+              </a:ext>
+            </a:extLst>
+          </a:blip>
+          <a:stretch>
+            <a:fillRect/>
+          </a:stretch>
+        </p:blipFill>
+        <p:spPr>
+          <a:xfrm>
+            <a:off x="5638800" y="418752"/>
+            <a:ext cx="914400" cy="914400"/>
+          </a:xfrm>
+          <a:prstGeom prst="rect">
+            <a:avLst/>
+          </a:prstGeom>
+        </p:spPr>
+      </p:pic>
+      <p:pic>
+        <p:nvPicPr>
+          <p:cNvPr id="19" name="Graphique 18" descr="Badge 1 avec un remplissage uni">
+            <a:extLst>
+              <a:ext uri="{FF2B5EF4-FFF2-40B4-BE49-F238E27FC236}">
+                <a16:creationId xmlns:a16="http://schemas.microsoft.com/office/drawing/2014/main" id="{DCD5BCB3-FECD-0F0C-68ED-78B838DFBE0A}"/>
+              </a:ext>
+            </a:extLst>
+          </p:cNvPr>
+          <p:cNvPicPr>
+            <a:picLocks noChangeAspect="1"/>
+          </p:cNvPicPr>
+          <p:nvPr/>
+        </p:nvPicPr>
+        <p:blipFill>
+          <a:blip r:embed="rId9">
+            <a:extLst>
+              <a:ext uri="{96DAC541-7B7A-43D3-8B79-37D633B846F1}">
+                <asvg:svgBlip xmlns:asvg="http://schemas.microsoft.com/office/drawing/2016/SVG/main" r:embed="rId10"/>
+              </a:ext>
+            </a:extLst>
+          </a:blip>
+          <a:stretch>
+            <a:fillRect/>
+          </a:stretch>
+        </p:blipFill>
+        <p:spPr>
+          <a:xfrm>
+            <a:off x="213360" y="2347567"/>
+            <a:ext cx="914400" cy="914400"/>
+          </a:xfrm>
+          <a:prstGeom prst="rect">
+            <a:avLst/>
+          </a:prstGeom>
+        </p:spPr>
+      </p:pic>
+    </p:spTree>
+    <p:extLst>
+      <p:ext uri="{BB962C8B-B14F-4D97-AF65-F5344CB8AC3E}">
+        <p14:creationId xmlns:p14="http://schemas.microsoft.com/office/powerpoint/2010/main" val="870064705"/>
+      </p:ext>
+    </p:extLst>
+  </p:cSld>
+  <p:clrMapOvr>
+    <a:masterClrMapping/>
+  </p:clrMapOvr>
+</p:sld>
+</file>
+
+<file path=ppt/slides/slide9.xml><?xml version="1.0" encoding="utf-8"?>
+<p:sld xmlns:a="http://schemas.openxmlformats.org/drawingml/2006/main" xmlns:r="http://schemas.openxmlformats.org/officeDocument/2006/relationships" xmlns:p="http://schemas.openxmlformats.org/presentationml/2006/main">
+  <p:cSld>
+    <p:spTree>
+      <p:nvGrpSpPr>
+        <p:cNvPr id="1" name=""/>
+        <p:cNvGrpSpPr/>
+        <p:nvPr/>
+      </p:nvGrpSpPr>
+      <p:grpSpPr>
+        <a:xfrm>
+          <a:off x="0" y="0"/>
+          <a:ext cx="0" cy="0"/>
+          <a:chOff x="0" y="0"/>
+          <a:chExt cx="0" cy="0"/>
+        </a:xfrm>
+      </p:grpSpPr>
+      <p:sp>
+        <p:nvSpPr>
+          <p:cNvPr id="2" name="Titre 1">
+            <a:extLst>
+              <a:ext uri="{FF2B5EF4-FFF2-40B4-BE49-F238E27FC236}">
+                <a16:creationId xmlns:a16="http://schemas.microsoft.com/office/drawing/2014/main" id="{F13D07B4-C7D9-46E1-38A0-A6EEF16B48EB}"/>
+              </a:ext>
+            </a:extLst>
+          </p:cNvPr>
+          <p:cNvSpPr>
+            <a:spLocks noGrp="1"/>
+          </p:cNvSpPr>
+          <p:nvPr>
+            <p:ph type="title"/>
+          </p:nvPr>
+        </p:nvSpPr>
+        <p:spPr/>
+        <p:txBody>
+          <a:bodyPr/>
+          <a:lstStyle/>
+          <a:p>
+            <a:r>
+              <a:rPr lang="fr-FR" dirty="0" err="1"/>
+              <a:t>Take</a:t>
+            </a:r>
+            <a:r>
+              <a:rPr lang="fr-FR" dirty="0"/>
+              <a:t> </a:t>
+            </a:r>
+            <a:r>
+              <a:rPr lang="fr-FR" dirty="0" err="1"/>
+              <a:t>away</a:t>
+            </a:r>
+            <a:endParaRPr lang="fr-FR" dirty="0"/>
+          </a:p>
+        </p:txBody>
+      </p:sp>
+      <p:sp>
+        <p:nvSpPr>
+          <p:cNvPr id="3" name="Espace réservé du contenu 2">
+            <a:extLst>
+              <a:ext uri="{FF2B5EF4-FFF2-40B4-BE49-F238E27FC236}">
+                <a16:creationId xmlns:a16="http://schemas.microsoft.com/office/drawing/2014/main" id="{1A803C62-BD0B-D0AC-2B41-C4F420891B06}"/>
+              </a:ext>
+            </a:extLst>
+          </p:cNvPr>
+          <p:cNvSpPr>
+            <a:spLocks noGrp="1"/>
+          </p:cNvSpPr>
+          <p:nvPr>
+            <p:ph idx="1"/>
+          </p:nvPr>
+        </p:nvSpPr>
+        <p:spPr/>
+        <p:txBody>
+          <a:bodyPr/>
+          <a:lstStyle/>
+          <a:p>
+            <a:endParaRPr lang="fr-FR" dirty="0"/>
+          </a:p>
+        </p:txBody>
+      </p:sp>
+    </p:spTree>
+    <p:extLst>
+      <p:ext uri="{BB962C8B-B14F-4D97-AF65-F5344CB8AC3E}">
+        <p14:creationId xmlns:p14="http://schemas.microsoft.com/office/powerpoint/2010/main" val="3201622378"/>
       </p:ext>
     </p:extLst>
   </p:cSld>

</xml_diff>

<commit_message>
Fix issues with double quotes + slides review
</commit_message>
<xml_diff>
--- a/08_deployment/99_Project_getaround/01_getaround_project.pptx
+++ b/08_deployment/99_Project_getaround/01_getaround_project.pptx
@@ -5,7 +5,7 @@
     <p:sldMasterId id="2147483660" r:id="rId1"/>
   </p:sldMasterIdLst>
   <p:notesMasterIdLst>
-    <p:notesMasterId r:id="rId14"/>
+    <p:notesMasterId r:id="rId15"/>
   </p:notesMasterIdLst>
   <p:sldIdLst>
     <p:sldId id="256" r:id="rId2"/>
@@ -20,6 +20,7 @@
     <p:sldId id="263" r:id="rId11"/>
     <p:sldId id="264" r:id="rId12"/>
     <p:sldId id="265" r:id="rId13"/>
+    <p:sldId id="258" r:id="rId14"/>
   </p:sldIdLst>
   <p:sldSz cx="12192000" cy="6858000"/>
   <p:notesSz cx="6858000" cy="9144000"/>
@@ -129,7 +130,7 @@
 <file path=ppt/revisionInfo.xml><?xml version="1.0" encoding="utf-8"?>
 <p1510:revInfo xmlns:a="http://schemas.openxmlformats.org/drawingml/2006/main" xmlns:r="http://schemas.openxmlformats.org/officeDocument/2006/relationships" xmlns:p1510="http://schemas.microsoft.com/office/powerpoint/2015/10/main">
   <p1510:revLst>
-    <p1510:client id="{40F711FF-06EA-48FB-94E5-8AF9239032B0}" v="43" dt="2024-09-15T12:40:48.836"/>
+    <p1510:client id="{40F711FF-06EA-48FB-94E5-8AF9239032B0}" v="48" dt="2024-09-16T09:37:52.704"/>
   </p1510:revLst>
 </p1510:revInfo>
 </file>
@@ -666,7 +667,7 @@
   <pc:docChgLst>
     <pc:chgData name="Philippe Baucour" userId="5102170ae7533958" providerId="LiveId" clId="{40F711FF-06EA-48FB-94E5-8AF9239032B0}"/>
     <pc:docChg chg="undo custSel addSld delSld modSld sldOrd">
-      <pc:chgData name="Philippe Baucour" userId="5102170ae7533958" providerId="LiveId" clId="{40F711FF-06EA-48FB-94E5-8AF9239032B0}" dt="2024-09-15T12:43:12.050" v="1954" actId="47"/>
+      <pc:chgData name="Philippe Baucour" userId="5102170ae7533958" providerId="LiveId" clId="{40F711FF-06EA-48FB-94E5-8AF9239032B0}" dt="2024-09-16T09:38:50.760" v="2208" actId="1035"/>
       <pc:docMkLst>
         <pc:docMk/>
       </pc:docMkLst>
@@ -700,12 +701,28 @@
           <pc:sldMk cId="3201622378" sldId="257"/>
         </pc:sldMkLst>
       </pc:sldChg>
-      <pc:sldChg chg="del mod modShow">
-        <pc:chgData name="Philippe Baucour" userId="5102170ae7533958" providerId="LiveId" clId="{40F711FF-06EA-48FB-94E5-8AF9239032B0}" dt="2024-09-15T12:43:00.187" v="1953" actId="47"/>
+      <pc:sldChg chg="delSp add del mod modShow">
+        <pc:chgData name="Philippe Baucour" userId="5102170ae7533958" providerId="LiveId" clId="{40F711FF-06EA-48FB-94E5-8AF9239032B0}" dt="2024-09-16T07:07:11.396" v="1987" actId="478"/>
         <pc:sldMkLst>
           <pc:docMk/>
           <pc:sldMk cId="246086491" sldId="258"/>
         </pc:sldMkLst>
+        <pc:spChg chg="del">
+          <ac:chgData name="Philippe Baucour" userId="5102170ae7533958" providerId="LiveId" clId="{40F711FF-06EA-48FB-94E5-8AF9239032B0}" dt="2024-09-16T07:07:11.396" v="1987" actId="478"/>
+          <ac:spMkLst>
+            <pc:docMk/>
+            <pc:sldMk cId="246086491" sldId="258"/>
+            <ac:spMk id="6" creationId="{3359D40A-9184-CE81-CDA2-DB6A4C6B3280}"/>
+          </ac:spMkLst>
+        </pc:spChg>
+        <pc:picChg chg="del">
+          <ac:chgData name="Philippe Baucour" userId="5102170ae7533958" providerId="LiveId" clId="{40F711FF-06EA-48FB-94E5-8AF9239032B0}" dt="2024-09-16T07:07:08.238" v="1986" actId="478"/>
+          <ac:picMkLst>
+            <pc:docMk/>
+            <pc:sldMk cId="246086491" sldId="258"/>
+            <ac:picMk id="5" creationId="{8925DC70-09A2-138C-900B-57BB44F5CC44}"/>
+          </ac:picMkLst>
+        </pc:picChg>
       </pc:sldChg>
       <pc:sldChg chg="mod ord modShow">
         <pc:chgData name="Philippe Baucour" userId="5102170ae7533958" providerId="LiveId" clId="{40F711FF-06EA-48FB-94E5-8AF9239032B0}" dt="2024-09-06T09:20:11.078" v="62" actId="729"/>
@@ -714,8 +731,8 @@
           <pc:sldMk cId="312535264" sldId="263"/>
         </pc:sldMkLst>
       </pc:sldChg>
-      <pc:sldChg chg="addSp delSp modSp new mod modClrScheme chgLayout">
-        <pc:chgData name="Philippe Baucour" userId="5102170ae7533958" providerId="LiveId" clId="{40F711FF-06EA-48FB-94E5-8AF9239032B0}" dt="2024-09-11T06:19:14.780" v="700" actId="167"/>
+      <pc:sldChg chg="addSp delSp modSp new mod modClrScheme modShow chgLayout">
+        <pc:chgData name="Philippe Baucour" userId="5102170ae7533958" providerId="LiveId" clId="{40F711FF-06EA-48FB-94E5-8AF9239032B0}" dt="2024-09-16T07:05:47.477" v="1983" actId="729"/>
         <pc:sldMkLst>
           <pc:docMk/>
           <pc:sldMk cId="1373706002" sldId="264"/>
@@ -985,15 +1002,15 @@
           </ac:cxnSpMkLst>
         </pc:cxnChg>
       </pc:sldChg>
-      <pc:sldChg chg="add">
-        <pc:chgData name="Philippe Baucour" userId="5102170ae7533958" providerId="LiveId" clId="{40F711FF-06EA-48FB-94E5-8AF9239032B0}" dt="2024-09-11T04:57:36.132" v="468"/>
+      <pc:sldChg chg="add mod modShow">
+        <pc:chgData name="Philippe Baucour" userId="5102170ae7533958" providerId="LiveId" clId="{40F711FF-06EA-48FB-94E5-8AF9239032B0}" dt="2024-09-16T07:05:51.689" v="1984" actId="729"/>
         <pc:sldMkLst>
           <pc:docMk/>
           <pc:sldMk cId="710411366" sldId="265"/>
         </pc:sldMkLst>
       </pc:sldChg>
       <pc:sldChg chg="addSp delSp modSp new mod modClrScheme chgLayout modNotesTx">
-        <pc:chgData name="Philippe Baucour" userId="5102170ae7533958" providerId="LiveId" clId="{40F711FF-06EA-48FB-94E5-8AF9239032B0}" dt="2024-09-15T12:38:00.888" v="1902" actId="6549"/>
+        <pc:chgData name="Philippe Baucour" userId="5102170ae7533958" providerId="LiveId" clId="{40F711FF-06EA-48FB-94E5-8AF9239032B0}" dt="2024-09-16T09:36:58.830" v="2164" actId="20577"/>
         <pc:sldMkLst>
           <pc:docMk/>
           <pc:sldMk cId="3580628546" sldId="266"/>
@@ -1006,6 +1023,14 @@
             <ac:spMk id="2" creationId="{FC7D7D61-5212-F8DF-8A01-7BF2EB86AE7E}"/>
           </ac:spMkLst>
         </pc:spChg>
+        <pc:spChg chg="add mod">
+          <ac:chgData name="Philippe Baucour" userId="5102170ae7533958" providerId="LiveId" clId="{40F711FF-06EA-48FB-94E5-8AF9239032B0}" dt="2024-09-16T08:15:49.760" v="2159" actId="14861"/>
+          <ac:spMkLst>
+            <pc:docMk/>
+            <pc:sldMk cId="3580628546" sldId="266"/>
+            <ac:spMk id="3" creationId="{08175751-E7FB-7830-4B6B-D517390EB4CD}"/>
+          </ac:spMkLst>
+        </pc:spChg>
         <pc:spChg chg="del">
           <ac:chgData name="Philippe Baucour" userId="5102170ae7533958" providerId="LiveId" clId="{40F711FF-06EA-48FB-94E5-8AF9239032B0}" dt="2024-09-15T12:15:22.457" v="1576"/>
           <ac:spMkLst>
@@ -1023,7 +1048,7 @@
           </ac:spMkLst>
         </pc:spChg>
         <pc:spChg chg="add mod ord">
-          <ac:chgData name="Philippe Baucour" userId="5102170ae7533958" providerId="LiveId" clId="{40F711FF-06EA-48FB-94E5-8AF9239032B0}" dt="2024-09-15T12:36:36.249" v="1873" actId="20577"/>
+          <ac:chgData name="Philippe Baucour" userId="5102170ae7533958" providerId="LiveId" clId="{40F711FF-06EA-48FB-94E5-8AF9239032B0}" dt="2024-09-16T09:36:58.830" v="2164" actId="20577"/>
           <ac:spMkLst>
             <pc:docMk/>
             <pc:sldMk cId="3580628546" sldId="266"/>
@@ -1064,13 +1089,13 @@
         </pc:picChg>
       </pc:sldChg>
       <pc:sldChg chg="modSp new mod">
-        <pc:chgData name="Philippe Baucour" userId="5102170ae7533958" providerId="LiveId" clId="{40F711FF-06EA-48FB-94E5-8AF9239032B0}" dt="2024-09-15T10:42:23.438" v="761" actId="6549"/>
+        <pc:chgData name="Philippe Baucour" userId="5102170ae7533958" providerId="LiveId" clId="{40F711FF-06EA-48FB-94E5-8AF9239032B0}" dt="2024-09-16T07:05:06.599" v="1976" actId="20577"/>
         <pc:sldMkLst>
           <pc:docMk/>
           <pc:sldMk cId="3903331035" sldId="267"/>
         </pc:sldMkLst>
         <pc:spChg chg="mod">
-          <ac:chgData name="Philippe Baucour" userId="5102170ae7533958" providerId="LiveId" clId="{40F711FF-06EA-48FB-94E5-8AF9239032B0}" dt="2024-09-15T10:42:23.438" v="761" actId="6549"/>
+          <ac:chgData name="Philippe Baucour" userId="5102170ae7533958" providerId="LiveId" clId="{40F711FF-06EA-48FB-94E5-8AF9239032B0}" dt="2024-09-16T07:05:06.599" v="1976" actId="20577"/>
           <ac:spMkLst>
             <pc:docMk/>
             <pc:sldMk cId="3903331035" sldId="267"/>
@@ -1079,13 +1104,13 @@
         </pc:spChg>
       </pc:sldChg>
       <pc:sldChg chg="addSp modSp new mod">
-        <pc:chgData name="Philippe Baucour" userId="5102170ae7533958" providerId="LiveId" clId="{40F711FF-06EA-48FB-94E5-8AF9239032B0}" dt="2024-09-15T12:01:04.173" v="1398" actId="20577"/>
+        <pc:chgData name="Philippe Baucour" userId="5102170ae7533958" providerId="LiveId" clId="{40F711FF-06EA-48FB-94E5-8AF9239032B0}" dt="2024-09-16T07:05:25.514" v="1980" actId="20577"/>
         <pc:sldMkLst>
           <pc:docMk/>
           <pc:sldMk cId="2699701360" sldId="268"/>
         </pc:sldMkLst>
         <pc:spChg chg="mod">
-          <ac:chgData name="Philippe Baucour" userId="5102170ae7533958" providerId="LiveId" clId="{40F711FF-06EA-48FB-94E5-8AF9239032B0}" dt="2024-09-15T10:47:41.949" v="902" actId="20577"/>
+          <ac:chgData name="Philippe Baucour" userId="5102170ae7533958" providerId="LiveId" clId="{40F711FF-06EA-48FB-94E5-8AF9239032B0}" dt="2024-09-16T07:05:25.514" v="1980" actId="20577"/>
           <ac:spMkLst>
             <pc:docMk/>
             <pc:sldMk cId="2699701360" sldId="268"/>
@@ -1101,22 +1126,30 @@
           </ac:spMkLst>
         </pc:spChg>
         <pc:picChg chg="add mod">
-          <ac:chgData name="Philippe Baucour" userId="5102170ae7533958" providerId="LiveId" clId="{40F711FF-06EA-48FB-94E5-8AF9239032B0}" dt="2024-09-15T10:47:23.535" v="900" actId="1076"/>
+          <ac:chgData name="Philippe Baucour" userId="5102170ae7533958" providerId="LiveId" clId="{40F711FF-06EA-48FB-94E5-8AF9239032B0}" dt="2024-09-16T07:02:45.339" v="1969" actId="1076"/>
           <ac:picMkLst>
             <pc:docMk/>
             <pc:sldMk cId="2699701360" sldId="268"/>
             <ac:picMk id="5" creationId="{2D6ABB88-F757-7A0F-B644-0B6F3238940E}"/>
           </ac:picMkLst>
         </pc:picChg>
+        <pc:picChg chg="add mod ord">
+          <ac:chgData name="Philippe Baucour" userId="5102170ae7533958" providerId="LiveId" clId="{40F711FF-06EA-48FB-94E5-8AF9239032B0}" dt="2024-09-16T07:04:13.497" v="1970" actId="1076"/>
+          <ac:picMkLst>
+            <pc:docMk/>
+            <pc:sldMk cId="2699701360" sldId="268"/>
+            <ac:picMk id="6" creationId="{D95B7D0F-BD20-5ADB-2CA7-CA24ECECDE7D}"/>
+          </ac:picMkLst>
+        </pc:picChg>
       </pc:sldChg>
       <pc:sldChg chg="addSp delSp modSp new mod modClrScheme chgLayout">
-        <pc:chgData name="Philippe Baucour" userId="5102170ae7533958" providerId="LiveId" clId="{40F711FF-06EA-48FB-94E5-8AF9239032B0}" dt="2024-09-15T12:12:35.856" v="1575" actId="1076"/>
+        <pc:chgData name="Philippe Baucour" userId="5102170ae7533958" providerId="LiveId" clId="{40F711FF-06EA-48FB-94E5-8AF9239032B0}" dt="2024-09-16T07:05:32.616" v="1982" actId="20577"/>
         <pc:sldMkLst>
           <pc:docMk/>
           <pc:sldMk cId="870064705" sldId="269"/>
         </pc:sldMkLst>
         <pc:spChg chg="mod ord">
-          <ac:chgData name="Philippe Baucour" userId="5102170ae7533958" providerId="LiveId" clId="{40F711FF-06EA-48FB-94E5-8AF9239032B0}" dt="2024-09-15T10:48:10.157" v="915" actId="700"/>
+          <ac:chgData name="Philippe Baucour" userId="5102170ae7533958" providerId="LiveId" clId="{40F711FF-06EA-48FB-94E5-8AF9239032B0}" dt="2024-09-16T07:05:32.616" v="1982" actId="20577"/>
           <ac:spMkLst>
             <pc:docMk/>
             <pc:sldMk cId="870064705" sldId="269"/>
@@ -1229,13 +1262,13 @@
         </pc:picChg>
       </pc:sldChg>
       <pc:sldChg chg="addSp modSp new mod modNotesTx">
-        <pc:chgData name="Philippe Baucour" userId="5102170ae7533958" providerId="LiveId" clId="{40F711FF-06EA-48FB-94E5-8AF9239032B0}" dt="2024-09-15T12:00:10.226" v="1386" actId="1037"/>
+        <pc:chgData name="Philippe Baucour" userId="5102170ae7533958" providerId="LiveId" clId="{40F711FF-06EA-48FB-94E5-8AF9239032B0}" dt="2024-09-16T07:05:17.388" v="1978" actId="20577"/>
         <pc:sldMkLst>
           <pc:docMk/>
           <pc:sldMk cId="4157245695" sldId="270"/>
         </pc:sldMkLst>
         <pc:spChg chg="mod">
-          <ac:chgData name="Philippe Baucour" userId="5102170ae7533958" providerId="LiveId" clId="{40F711FF-06EA-48FB-94E5-8AF9239032B0}" dt="2024-09-15T10:55:01.658" v="973" actId="20577"/>
+          <ac:chgData name="Philippe Baucour" userId="5102170ae7533958" providerId="LiveId" clId="{40F711FF-06EA-48FB-94E5-8AF9239032B0}" dt="2024-09-16T07:05:17.388" v="1978" actId="20577"/>
           <ac:spMkLst>
             <pc:docMk/>
             <pc:sldMk cId="4157245695" sldId="270"/>
@@ -1299,13 +1332,13 @@
         </pc:picChg>
       </pc:sldChg>
       <pc:sldChg chg="addSp modSp new mod ord modNotesTx">
-        <pc:chgData name="Philippe Baucour" userId="5102170ae7533958" providerId="LiveId" clId="{40F711FF-06EA-48FB-94E5-8AF9239032B0}" dt="2024-09-15T12:31:25.249" v="1761" actId="1035"/>
+        <pc:chgData name="Philippe Baucour" userId="5102170ae7533958" providerId="LiveId" clId="{40F711FF-06EA-48FB-94E5-8AF9239032B0}" dt="2024-09-16T07:18:03.610" v="2149" actId="20577"/>
         <pc:sldMkLst>
           <pc:docMk/>
           <pc:sldMk cId="706215125" sldId="272"/>
         </pc:sldMkLst>
         <pc:spChg chg="mod">
-          <ac:chgData name="Philippe Baucour" userId="5102170ae7533958" providerId="LiveId" clId="{40F711FF-06EA-48FB-94E5-8AF9239032B0}" dt="2024-09-15T12:21:34.400" v="1602"/>
+          <ac:chgData name="Philippe Baucour" userId="5102170ae7533958" providerId="LiveId" clId="{40F711FF-06EA-48FB-94E5-8AF9239032B0}" dt="2024-09-16T07:04:53.881" v="1974" actId="20577"/>
           <ac:spMkLst>
             <pc:docMk/>
             <pc:sldMk cId="706215125" sldId="272"/>
@@ -1321,7 +1354,7 @@
           </ac:spMkLst>
         </pc:spChg>
         <pc:spChg chg="add mod">
-          <ac:chgData name="Philippe Baucour" userId="5102170ae7533958" providerId="LiveId" clId="{40F711FF-06EA-48FB-94E5-8AF9239032B0}" dt="2024-09-15T12:30:11.483" v="1740" actId="20577"/>
+          <ac:chgData name="Philippe Baucour" userId="5102170ae7533958" providerId="LiveId" clId="{40F711FF-06EA-48FB-94E5-8AF9239032B0}" dt="2024-09-16T07:18:03.610" v="2149" actId="20577"/>
           <ac:spMkLst>
             <pc:docMk/>
             <pc:sldMk cId="706215125" sldId="272"/>
@@ -1362,7 +1395,7 @@
         </pc:picChg>
       </pc:sldChg>
       <pc:sldChg chg="addSp delSp modSp new mod">
-        <pc:chgData name="Philippe Baucour" userId="5102170ae7533958" providerId="LiveId" clId="{40F711FF-06EA-48FB-94E5-8AF9239032B0}" dt="2024-09-15T12:41:39.110" v="1952" actId="1076"/>
+        <pc:chgData name="Philippe Baucour" userId="5102170ae7533958" providerId="LiveId" clId="{40F711FF-06EA-48FB-94E5-8AF9239032B0}" dt="2024-09-16T09:38:50.760" v="2208" actId="1035"/>
         <pc:sldMkLst>
           <pc:docMk/>
           <pc:sldMk cId="585511404" sldId="273"/>
@@ -1381,6 +1414,14 @@
             <pc:docMk/>
             <pc:sldMk cId="585511404" sldId="273"/>
             <ac:spMk id="3" creationId="{8F29940B-4FD0-ABE4-DB5C-9C9331F1A44D}"/>
+          </ac:spMkLst>
+        </pc:spChg>
+        <pc:spChg chg="add mod">
+          <ac:chgData name="Philippe Baucour" userId="5102170ae7533958" providerId="LiveId" clId="{40F711FF-06EA-48FB-94E5-8AF9239032B0}" dt="2024-09-16T09:38:50.760" v="2208" actId="1035"/>
+          <ac:spMkLst>
+            <pc:docMk/>
+            <pc:sldMk cId="585511404" sldId="273"/>
+            <ac:spMk id="4" creationId="{2A63C582-7E8D-781E-4767-996248A6C10E}"/>
           </ac:spMkLst>
         </pc:spChg>
         <pc:picChg chg="add mod">
@@ -2397,7 +2438,7 @@
           <a:p>
             <a:fld id="{FD1752CD-A7D2-4825-BC26-9DAEFBD0A5FF}" type="datetimeFigureOut">
               <a:rPr lang="fr-FR" smtClean="0"/>
-              <a:t>15/09/2024</a:t>
+              <a:t>16/09/2024</a:t>
             </a:fld>
             <a:endParaRPr lang="fr-FR"/>
           </a:p>
@@ -3429,6 +3470,48 @@
             </a:r>
           </a:p>
           <a:p>
+            <a:pPr marL="228600" indent="-228600">
+              <a:buAutoNum type="arabicPeriod"/>
+            </a:pPr>
+            <a:r>
+              <a:rPr lang="en-US" b="0" dirty="0">
+                <a:solidFill>
+                  <a:srgbClr val="CCCCCC"/>
+                </a:solidFill>
+                <a:effectLst/>
+                <a:latin typeface="JetBrains Mono" panose="02000009000000000000" pitchFamily="49" charset="0"/>
+              </a:rPr>
+              <a:t>The number of bookings which are canceled because the previous driver is late</a:t>
+            </a:r>
+          </a:p>
+          <a:p>
+            <a:pPr marL="0" marR="0" lvl="0" indent="0" algn="l" defTabSz="914400" rtl="0" eaLnBrk="1" fontAlgn="auto" latinLnBrk="0" hangingPunct="1">
+              <a:lnSpc>
+                <a:spcPct val="100000"/>
+              </a:lnSpc>
+              <a:spcBef>
+                <a:spcPts val="0"/>
+              </a:spcBef>
+              <a:spcAft>
+                <a:spcPts val="0"/>
+              </a:spcAft>
+              <a:buClrTx/>
+              <a:buSzTx/>
+              <a:buFontTx/>
+              <a:buNone/>
+              <a:tabLst/>
+              <a:defRPr/>
+            </a:pPr>
+            <a:r>
+              <a:rPr lang="en-US" b="0" dirty="0">
+                <a:solidFill>
+                  <a:srgbClr val="CCCCCC"/>
+                </a:solidFill>
+                <a:effectLst/>
+                <a:latin typeface="JetBrains Mono" panose="02000009000000000000" pitchFamily="49" charset="0"/>
+              </a:rPr>
+              <a:t>    </a:t>
+            </a:r>
             <a:r>
               <a:rPr lang="en-US" b="0" dirty="0">
                 <a:solidFill>
@@ -3437,7 +3520,7 @@
                 <a:effectLst/>
                 <a:latin typeface="JetBrains Mono" panose="02000009000000000000" pitchFamily="49" charset="0"/>
               </a:rPr>
-              <a:t>1.</a:t>
+              <a:t>*</a:t>
             </a:r>
             <a:r>
               <a:rPr lang="en-US" b="0" dirty="0">
@@ -3447,8 +3530,37 @@
                 <a:effectLst/>
                 <a:latin typeface="JetBrains Mono" panose="02000009000000000000" pitchFamily="49" charset="0"/>
               </a:rPr>
-              <a:t> The number of bookings which are canceled because the previous driver is late</a:t>
-            </a:r>
+              <a:t> There is a </a:t>
+            </a:r>
+            <a:r>
+              <a:rPr lang="fr-FR" b="0" i="0" dirty="0" err="1">
+                <a:solidFill>
+                  <a:srgbClr val="CCCCCC"/>
+                </a:solidFill>
+                <a:effectLst/>
+                <a:latin typeface="Segoe WPC"/>
+              </a:rPr>
+              <a:t>previous_ended_rental_id</a:t>
+            </a:r>
+            <a:endParaRPr lang="en-US" b="0" dirty="0">
+              <a:solidFill>
+                <a:srgbClr val="CCCCCC"/>
+              </a:solidFill>
+              <a:effectLst/>
+              <a:latin typeface="JetBrains Mono" panose="02000009000000000000" pitchFamily="49" charset="0"/>
+            </a:endParaRPr>
+          </a:p>
+          <a:p>
+            <a:pPr marL="0" indent="0">
+              <a:buNone/>
+            </a:pPr>
+            <a:endParaRPr lang="en-US" b="0" dirty="0">
+              <a:solidFill>
+                <a:srgbClr val="CCCCCC"/>
+              </a:solidFill>
+              <a:effectLst/>
+              <a:latin typeface="JetBrains Mono" panose="02000009000000000000" pitchFamily="49" charset="0"/>
+            </a:endParaRPr>
           </a:p>
           <a:p>
             <a:endParaRPr lang="fr-FR" dirty="0"/>
@@ -4105,7 +4217,7 @@
           <a:p>
             <a:fld id="{7ECB9D5A-E5E4-41FE-AF39-634902D6D5D2}" type="datetimeFigureOut">
               <a:rPr lang="fr-FR" smtClean="0"/>
-              <a:t>15/09/2024</a:t>
+              <a:t>16/09/2024</a:t>
             </a:fld>
             <a:endParaRPr lang="fr-FR"/>
           </a:p>
@@ -4303,7 +4415,7 @@
           <a:p>
             <a:fld id="{7ECB9D5A-E5E4-41FE-AF39-634902D6D5D2}" type="datetimeFigureOut">
               <a:rPr lang="fr-FR" smtClean="0"/>
-              <a:t>15/09/2024</a:t>
+              <a:t>16/09/2024</a:t>
             </a:fld>
             <a:endParaRPr lang="fr-FR"/>
           </a:p>
@@ -4511,7 +4623,7 @@
           <a:p>
             <a:fld id="{7ECB9D5A-E5E4-41FE-AF39-634902D6D5D2}" type="datetimeFigureOut">
               <a:rPr lang="fr-FR" smtClean="0"/>
-              <a:t>15/09/2024</a:t>
+              <a:t>16/09/2024</a:t>
             </a:fld>
             <a:endParaRPr lang="fr-FR"/>
           </a:p>
@@ -4709,7 +4821,7 @@
           <a:p>
             <a:fld id="{7ECB9D5A-E5E4-41FE-AF39-634902D6D5D2}" type="datetimeFigureOut">
               <a:rPr lang="fr-FR" smtClean="0"/>
-              <a:t>15/09/2024</a:t>
+              <a:t>16/09/2024</a:t>
             </a:fld>
             <a:endParaRPr lang="fr-FR"/>
           </a:p>
@@ -4984,7 +5096,7 @@
           <a:p>
             <a:fld id="{7ECB9D5A-E5E4-41FE-AF39-634902D6D5D2}" type="datetimeFigureOut">
               <a:rPr lang="fr-FR" smtClean="0"/>
-              <a:t>15/09/2024</a:t>
+              <a:t>16/09/2024</a:t>
             </a:fld>
             <a:endParaRPr lang="fr-FR"/>
           </a:p>
@@ -5249,7 +5361,7 @@
           <a:p>
             <a:fld id="{7ECB9D5A-E5E4-41FE-AF39-634902D6D5D2}" type="datetimeFigureOut">
               <a:rPr lang="fr-FR" smtClean="0"/>
-              <a:t>15/09/2024</a:t>
+              <a:t>16/09/2024</a:t>
             </a:fld>
             <a:endParaRPr lang="fr-FR"/>
           </a:p>
@@ -5661,7 +5773,7 @@
           <a:p>
             <a:fld id="{7ECB9D5A-E5E4-41FE-AF39-634902D6D5D2}" type="datetimeFigureOut">
               <a:rPr lang="fr-FR" smtClean="0"/>
-              <a:t>15/09/2024</a:t>
+              <a:t>16/09/2024</a:t>
             </a:fld>
             <a:endParaRPr lang="fr-FR"/>
           </a:p>
@@ -5802,7 +5914,7 @@
           <a:p>
             <a:fld id="{7ECB9D5A-E5E4-41FE-AF39-634902D6D5D2}" type="datetimeFigureOut">
               <a:rPr lang="fr-FR" smtClean="0"/>
-              <a:t>15/09/2024</a:t>
+              <a:t>16/09/2024</a:t>
             </a:fld>
             <a:endParaRPr lang="fr-FR"/>
           </a:p>
@@ -5915,7 +6027,7 @@
           <a:p>
             <a:fld id="{7ECB9D5A-E5E4-41FE-AF39-634902D6D5D2}" type="datetimeFigureOut">
               <a:rPr lang="fr-FR" smtClean="0"/>
-              <a:t>15/09/2024</a:t>
+              <a:t>16/09/2024</a:t>
             </a:fld>
             <a:endParaRPr lang="fr-FR"/>
           </a:p>
@@ -6226,7 +6338,7 @@
           <a:p>
             <a:fld id="{7ECB9D5A-E5E4-41FE-AF39-634902D6D5D2}" type="datetimeFigureOut">
               <a:rPr lang="fr-FR" smtClean="0"/>
-              <a:t>15/09/2024</a:t>
+              <a:t>16/09/2024</a:t>
             </a:fld>
             <a:endParaRPr lang="fr-FR"/>
           </a:p>
@@ -6517,7 +6629,7 @@
           <a:p>
             <a:fld id="{7ECB9D5A-E5E4-41FE-AF39-634902D6D5D2}" type="datetimeFigureOut">
               <a:rPr lang="fr-FR" smtClean="0"/>
-              <a:t>15/09/2024</a:t>
+              <a:t>16/09/2024</a:t>
             </a:fld>
             <a:endParaRPr lang="fr-FR"/>
           </a:p>
@@ -6758,7 +6870,7 @@
           <a:p>
             <a:fld id="{7ECB9D5A-E5E4-41FE-AF39-634902D6D5D2}" type="datetimeFigureOut">
               <a:rPr lang="fr-FR" smtClean="0"/>
-              <a:t>15/09/2024</a:t>
+              <a:t>16/09/2024</a:t>
             </a:fld>
             <a:endParaRPr lang="fr-FR"/>
           </a:p>
@@ -7448,7 +7560,7 @@
 </file>
 
 <file path=ppt/slides/slide11.xml><?xml version="1.0" encoding="utf-8"?>
-<p:sld xmlns:a="http://schemas.openxmlformats.org/drawingml/2006/main" xmlns:r="http://schemas.openxmlformats.org/officeDocument/2006/relationships" xmlns:p="http://schemas.openxmlformats.org/presentationml/2006/main">
+<p:sld xmlns:a="http://schemas.openxmlformats.org/drawingml/2006/main" xmlns:r="http://schemas.openxmlformats.org/officeDocument/2006/relationships" xmlns:p="http://schemas.openxmlformats.org/presentationml/2006/main" show="0">
   <p:cSld>
     <p:spTree>
       <p:nvGrpSpPr>
@@ -8172,7 +8284,7 @@
 </file>
 
 <file path=ppt/slides/slide12.xml><?xml version="1.0" encoding="utf-8"?>
-<p:sld xmlns:a="http://schemas.openxmlformats.org/drawingml/2006/main" xmlns:r="http://schemas.openxmlformats.org/officeDocument/2006/relationships" xmlns:p="http://schemas.openxmlformats.org/presentationml/2006/main">
+<p:sld xmlns:a="http://schemas.openxmlformats.org/drawingml/2006/main" xmlns:r="http://schemas.openxmlformats.org/officeDocument/2006/relationships" xmlns:p="http://schemas.openxmlformats.org/presentationml/2006/main" show="0">
   <p:cSld>
     <p:spTree>
       <p:nvGrpSpPr>
@@ -9264,6 +9376,95 @@
 </p:sld>
 </file>
 
+<file path=ppt/slides/slide13.xml><?xml version="1.0" encoding="utf-8"?>
+<p:sld xmlns:a="http://schemas.openxmlformats.org/drawingml/2006/main" xmlns:r="http://schemas.openxmlformats.org/officeDocument/2006/relationships" xmlns:p="http://schemas.openxmlformats.org/presentationml/2006/main" show="0">
+  <p:cSld>
+    <p:spTree>
+      <p:nvGrpSpPr>
+        <p:cNvPr id="1" name=""/>
+        <p:cNvGrpSpPr/>
+        <p:nvPr/>
+      </p:nvGrpSpPr>
+      <p:grpSpPr>
+        <a:xfrm>
+          <a:off x="0" y="0"/>
+          <a:ext cx="0" cy="0"/>
+          <a:chOff x="0" y="0"/>
+          <a:chExt cx="0" cy="0"/>
+        </a:xfrm>
+      </p:grpSpPr>
+      <p:sp>
+        <p:nvSpPr>
+          <p:cNvPr id="2" name="Titre 1">
+            <a:extLst>
+              <a:ext uri="{FF2B5EF4-FFF2-40B4-BE49-F238E27FC236}">
+                <a16:creationId xmlns:a16="http://schemas.microsoft.com/office/drawing/2014/main" id="{0973683F-97F4-B09A-A1A0-F35F30E7220F}"/>
+              </a:ext>
+            </a:extLst>
+          </p:cNvPr>
+          <p:cNvSpPr>
+            <a:spLocks noGrp="1"/>
+          </p:cNvSpPr>
+          <p:nvPr>
+            <p:ph type="title"/>
+          </p:nvPr>
+        </p:nvSpPr>
+        <p:spPr/>
+        <p:txBody>
+          <a:bodyPr/>
+          <a:lstStyle/>
+          <a:p>
+            <a:r>
+              <a:rPr lang="fr-FR" dirty="0" err="1"/>
+              <a:t>Specifications</a:t>
+            </a:r>
+            <a:endParaRPr lang="fr-FR" dirty="0"/>
+          </a:p>
+        </p:txBody>
+      </p:sp>
+      <p:sp>
+        <p:nvSpPr>
+          <p:cNvPr id="3" name="Espace réservé du contenu 2">
+            <a:extLst>
+              <a:ext uri="{FF2B5EF4-FFF2-40B4-BE49-F238E27FC236}">
+                <a16:creationId xmlns:a16="http://schemas.microsoft.com/office/drawing/2014/main" id="{A88399CA-BBD6-ECCC-534E-0335C54116C3}"/>
+              </a:ext>
+            </a:extLst>
+          </p:cNvPr>
+          <p:cNvSpPr>
+            <a:spLocks noGrp="1"/>
+          </p:cNvSpPr>
+          <p:nvPr>
+            <p:ph idx="1"/>
+          </p:nvPr>
+        </p:nvSpPr>
+        <p:spPr/>
+        <p:txBody>
+          <a:bodyPr>
+            <a:normAutofit/>
+          </a:bodyPr>
+          <a:lstStyle/>
+          <a:p>
+            <a:pPr marL="0" indent="0">
+              <a:buNone/>
+            </a:pPr>
+            <a:endParaRPr lang="en-US" dirty="0"/>
+          </a:p>
+        </p:txBody>
+      </p:sp>
+    </p:spTree>
+    <p:extLst>
+      <p:ext uri="{BB962C8B-B14F-4D97-AF65-F5344CB8AC3E}">
+        <p14:creationId xmlns:p14="http://schemas.microsoft.com/office/powerpoint/2010/main" val="246086491"/>
+      </p:ext>
+    </p:extLst>
+  </p:cSld>
+  <p:clrMapOvr>
+    <a:masterClrMapping/>
+  </p:clrMapOvr>
+</p:sld>
+</file>
+
 <file path=ppt/slides/slide2.xml><?xml version="1.0" encoding="utf-8"?>
 <p:sld xmlns:a="http://schemas.openxmlformats.org/drawingml/2006/main" xmlns:r="http://schemas.openxmlformats.org/officeDocument/2006/relationships" xmlns:p="http://schemas.openxmlformats.org/presentationml/2006/main">
   <p:cSld>
@@ -9308,7 +9509,7 @@
             </a:r>
             <a:r>
               <a:rPr lang="fr-FR" dirty="0"/>
-              <a:t> EDA</a:t>
+              <a:t> - EDA</a:t>
             </a:r>
           </a:p>
         </p:txBody>
@@ -9519,7 +9720,7 @@
                 <a:latin typeface="Times New Roman" panose="02020603050405020304" pitchFamily="18" charset="0"/>
                 <a:cs typeface="Times New Roman" panose="02020603050405020304" pitchFamily="18" charset="0"/>
               </a:rPr>
-              <a:t> a time ∆ </a:t>
+              <a:t> a Time ∆ </a:t>
             </a:r>
             <a:r>
               <a:rPr lang="fr-FR" sz="1100" i="1" dirty="0" err="1">
@@ -9691,7 +9892,9 @@
         </p:nvSpPr>
         <p:spPr/>
         <p:txBody>
-          <a:bodyPr/>
+          <a:bodyPr>
+            <a:normAutofit/>
+          </a:bodyPr>
           <a:lstStyle/>
           <a:p>
             <a:r>
@@ -9722,6 +9925,9 @@
             <a:endParaRPr lang="en-US" dirty="0"/>
           </a:p>
           <a:p>
+            <a:endParaRPr lang="en-US" dirty="0"/>
+          </a:p>
+          <a:p>
             <a:r>
               <a:rPr lang="en-US" dirty="0"/>
               <a:t>How does it impact the next driver?</a:t>
@@ -9731,7 +9937,7 @@
             <a:pPr lvl="1"/>
             <a:r>
               <a:rPr lang="en-US" dirty="0"/>
-              <a:t>50% of</a:t>
+              <a:t>55%</a:t>
             </a:r>
           </a:p>
           <a:p>
@@ -9819,6 +10025,144 @@
           </a:effectLst>
         </p:spPr>
       </p:pic>
+      <p:sp>
+        <p:nvSpPr>
+          <p:cNvPr id="3" name="ZoneTexte 2">
+            <a:extLst>
+              <a:ext uri="{FF2B5EF4-FFF2-40B4-BE49-F238E27FC236}">
+                <a16:creationId xmlns:a16="http://schemas.microsoft.com/office/drawing/2014/main" id="{08175751-E7FB-7830-4B6B-D517390EB4CD}"/>
+              </a:ext>
+            </a:extLst>
+          </p:cNvPr>
+          <p:cNvSpPr txBox="1"/>
+          <p:nvPr/>
+        </p:nvSpPr>
+        <p:spPr>
+          <a:xfrm>
+            <a:off x="4686858" y="5025654"/>
+            <a:ext cx="6199133" cy="1384995"/>
+          </a:xfrm>
+          <a:prstGeom prst="rect">
+            <a:avLst/>
+          </a:prstGeom>
+          <a:solidFill>
+            <a:schemeClr val="accent4">
+              <a:lumMod val="20000"/>
+              <a:lumOff val="80000"/>
+            </a:schemeClr>
+          </a:solidFill>
+          <a:effectLst>
+            <a:outerShdw blurRad="50800" dist="38100" dir="2700000" algn="tl" rotWithShape="0">
+              <a:prstClr val="black">
+                <a:alpha val="40000"/>
+              </a:prstClr>
+            </a:outerShdw>
+          </a:effectLst>
+        </p:spPr>
+        <p:txBody>
+          <a:bodyPr wrap="none" rtlCol="0">
+            <a:spAutoFit/>
+          </a:bodyPr>
+          <a:lstStyle/>
+          <a:p>
+            <a:r>
+              <a:rPr lang="en-US" sz="1400" dirty="0">
+                <a:latin typeface="Courier New" panose="02070309020205020404" pitchFamily="49" charset="0"/>
+                <a:cs typeface="Courier New" panose="02070309020205020404" pitchFamily="49" charset="0"/>
+              </a:rPr>
+              <a:t>1. Cars returned </a:t>
+            </a:r>
+            <a:r>
+              <a:rPr lang="en-US" sz="1400" b="1" dirty="0">
+                <a:latin typeface="Courier New" panose="02070309020205020404" pitchFamily="49" charset="0"/>
+                <a:cs typeface="Courier New" panose="02070309020205020404" pitchFamily="49" charset="0"/>
+              </a:rPr>
+              <a:t>after Checkout</a:t>
+            </a:r>
+          </a:p>
+          <a:p>
+            <a:r>
+              <a:rPr lang="en-US" sz="1400" dirty="0">
+                <a:latin typeface="Courier New" panose="02070309020205020404" pitchFamily="49" charset="0"/>
+                <a:cs typeface="Courier New" panose="02070309020205020404" pitchFamily="49" charset="0"/>
+              </a:rPr>
+              <a:t>    * Owner can't use the car  </a:t>
+            </a:r>
+          </a:p>
+          <a:p>
+            <a:r>
+              <a:rPr lang="en-US" sz="1400" dirty="0">
+                <a:latin typeface="Courier New" panose="02070309020205020404" pitchFamily="49" charset="0"/>
+                <a:cs typeface="Courier New" panose="02070309020205020404" pitchFamily="49" charset="0"/>
+              </a:rPr>
+              <a:t>2. Cars returned </a:t>
+            </a:r>
+            <a:r>
+              <a:rPr lang="en-US" sz="1400" b="1" dirty="0">
+                <a:latin typeface="Courier New" panose="02070309020205020404" pitchFamily="49" charset="0"/>
+                <a:cs typeface="Courier New" panose="02070309020205020404" pitchFamily="49" charset="0"/>
+              </a:rPr>
+              <a:t>after Time </a:t>
+            </a:r>
+            <a:r>
+              <a:rPr lang="fr-FR" sz="1400" b="1" dirty="0">
+                <a:latin typeface="Courier New" panose="02070309020205020404" pitchFamily="49" charset="0"/>
+                <a:cs typeface="Courier New" panose="02070309020205020404" pitchFamily="49" charset="0"/>
+              </a:rPr>
+              <a:t>∆</a:t>
+            </a:r>
+            <a:endParaRPr lang="en-US" sz="1400" b="1" dirty="0">
+              <a:latin typeface="Courier New" panose="02070309020205020404" pitchFamily="49" charset="0"/>
+              <a:cs typeface="Courier New" panose="02070309020205020404" pitchFamily="49" charset="0"/>
+            </a:endParaRPr>
+          </a:p>
+          <a:p>
+            <a:r>
+              <a:rPr lang="en-US" sz="1400" dirty="0">
+                <a:latin typeface="Courier New" panose="02070309020205020404" pitchFamily="49" charset="0"/>
+                <a:cs typeface="Courier New" panose="02070309020205020404" pitchFamily="49" charset="0"/>
+              </a:rPr>
+              <a:t>    * Next driver can't use the car</a:t>
+            </a:r>
+          </a:p>
+          <a:p>
+            <a:r>
+              <a:rPr lang="en-US" sz="1400" dirty="0">
+                <a:latin typeface="Courier New" panose="02070309020205020404" pitchFamily="49" charset="0"/>
+                <a:cs typeface="Courier New" panose="02070309020205020404" pitchFamily="49" charset="0"/>
+              </a:rPr>
+              <a:t>3. Bookings canceled because the </a:t>
+            </a:r>
+            <a:r>
+              <a:rPr lang="en-US" sz="1400" b="1" dirty="0">
+                <a:latin typeface="Courier New" panose="02070309020205020404" pitchFamily="49" charset="0"/>
+                <a:cs typeface="Courier New" panose="02070309020205020404" pitchFamily="49" charset="0"/>
+              </a:rPr>
+              <a:t>previous driver is late</a:t>
+            </a:r>
+          </a:p>
+          <a:p>
+            <a:r>
+              <a:rPr lang="en-US" sz="1400" dirty="0">
+                <a:latin typeface="Courier New" panose="02070309020205020404" pitchFamily="49" charset="0"/>
+                <a:cs typeface="Courier New" panose="02070309020205020404" pitchFamily="49" charset="0"/>
+              </a:rPr>
+              <a:t>    * There is a </a:t>
+            </a:r>
+            <a:r>
+              <a:rPr lang="en-US" sz="1400" dirty="0" err="1">
+                <a:latin typeface="Courier New" panose="02070309020205020404" pitchFamily="49" charset="0"/>
+                <a:cs typeface="Courier New" panose="02070309020205020404" pitchFamily="49" charset="0"/>
+              </a:rPr>
+              <a:t>previous_ended_rental_id</a:t>
+            </a:r>
+            <a:endParaRPr lang="en-US" sz="1400" dirty="0">
+              <a:latin typeface="Courier New" panose="02070309020205020404" pitchFamily="49" charset="0"/>
+              <a:cs typeface="Courier New" panose="02070309020205020404" pitchFamily="49" charset="0"/>
+            </a:endParaRPr>
+          </a:p>
+        </p:txBody>
+      </p:sp>
     </p:spTree>
     <p:extLst>
       <p:ext uri="{BB962C8B-B14F-4D97-AF65-F5344CB8AC3E}">
@@ -9998,6 +10342,45 @@
           </a:effectLst>
         </p:spPr>
       </p:pic>
+      <p:sp>
+        <p:nvSpPr>
+          <p:cNvPr id="4" name="ZoneTexte 3">
+            <a:extLst>
+              <a:ext uri="{FF2B5EF4-FFF2-40B4-BE49-F238E27FC236}">
+                <a16:creationId xmlns:a16="http://schemas.microsoft.com/office/drawing/2014/main" id="{2A63C582-7E8D-781E-4767-996248A6C10E}"/>
+              </a:ext>
+            </a:extLst>
+          </p:cNvPr>
+          <p:cNvSpPr txBox="1"/>
+          <p:nvPr/>
+        </p:nvSpPr>
+        <p:spPr>
+          <a:xfrm>
+            <a:off x="4120265" y="4062881"/>
+            <a:ext cx="1651414" cy="261610"/>
+          </a:xfrm>
+          <a:prstGeom prst="rect">
+            <a:avLst/>
+          </a:prstGeom>
+          <a:noFill/>
+        </p:spPr>
+        <p:txBody>
+          <a:bodyPr wrap="none" rtlCol="0">
+            <a:spAutoFit/>
+          </a:bodyPr>
+          <a:lstStyle/>
+          <a:p>
+            <a:pPr algn="r"/>
+            <a:r>
+              <a:rPr lang="fr-FR" sz="1100" i="1" dirty="0">
+                <a:latin typeface="Times New Roman" panose="02020603050405020304" pitchFamily="18" charset="0"/>
+                <a:cs typeface="Times New Roman" panose="02020603050405020304" pitchFamily="18" charset="0"/>
+              </a:rPr>
+              <a:t>Threshold replace Time ∆</a:t>
+            </a:r>
+          </a:p>
+        </p:txBody>
+      </p:sp>
     </p:spTree>
     <p:extLst>
       <p:ext uri="{BB962C8B-B14F-4D97-AF65-F5344CB8AC3E}">
@@ -10055,7 +10438,7 @@
             </a:r>
             <a:r>
               <a:rPr lang="fr-FR" dirty="0"/>
-              <a:t> Dashboard</a:t>
+              <a:t> - Dashboard</a:t>
             </a:r>
           </a:p>
         </p:txBody>
@@ -10138,7 +10521,7 @@
           <a:p>
             <a:r>
               <a:rPr lang="fr-FR" dirty="0"/>
-              <a:t>Pricing EDA &amp; model</a:t>
+              <a:t>Pricing - EDA &amp; model</a:t>
             </a:r>
           </a:p>
         </p:txBody>
@@ -10448,6 +10831,59 @@
           <a:chExt cx="0" cy="0"/>
         </a:xfrm>
       </p:grpSpPr>
+      <p:pic>
+        <p:nvPicPr>
+          <p:cNvPr id="6" name="Image 5" descr="Une image contenant texte, capture d’écran, Police&#10;&#10;Description générée automatiquement">
+            <a:extLst>
+              <a:ext uri="{FF2B5EF4-FFF2-40B4-BE49-F238E27FC236}">
+                <a16:creationId xmlns:a16="http://schemas.microsoft.com/office/drawing/2014/main" id="{D95B7D0F-BD20-5ADB-2CA7-CA24ECECDE7D}"/>
+              </a:ext>
+            </a:extLst>
+          </p:cNvPr>
+          <p:cNvPicPr>
+            <a:picLocks noChangeAspect="1"/>
+          </p:cNvPicPr>
+          <p:nvPr/>
+        </p:nvPicPr>
+        <p:blipFill>
+          <a:blip r:embed="rId2">
+            <a:extLst>
+              <a:ext uri="{28A0092B-C50C-407E-A947-70E740481C1C}">
+                <a14:useLocalDpi xmlns:a14="http://schemas.microsoft.com/office/drawing/2010/main" val="0"/>
+              </a:ext>
+            </a:extLst>
+          </a:blip>
+          <a:stretch>
+            <a:fillRect/>
+          </a:stretch>
+        </p:blipFill>
+        <p:spPr>
+          <a:xfrm>
+            <a:off x="9860833" y="136525"/>
+            <a:ext cx="2117807" cy="4541520"/>
+          </a:xfrm>
+          <a:prstGeom prst="roundRect">
+            <a:avLst>
+              <a:gd name="adj" fmla="val 8594"/>
+            </a:avLst>
+          </a:prstGeom>
+          <a:solidFill>
+            <a:srgbClr val="FFFFFF">
+              <a:shade val="85000"/>
+            </a:srgbClr>
+          </a:solidFill>
+          <a:ln>
+            <a:noFill/>
+          </a:ln>
+          <a:effectLst>
+            <a:outerShdw blurRad="50800" dist="38100" dir="2700000" algn="tl" rotWithShape="0">
+              <a:prstClr val="black">
+                <a:alpha val="40000"/>
+              </a:prstClr>
+            </a:outerShdw>
+          </a:effectLst>
+        </p:spPr>
+      </p:pic>
       <p:sp>
         <p:nvSpPr>
           <p:cNvPr id="2" name="Titre 1">
@@ -10471,7 +10907,7 @@
           <a:p>
             <a:r>
               <a:rPr lang="fr-FR" dirty="0"/>
-              <a:t>Pricing API</a:t>
+              <a:t>Pricing - API	</a:t>
             </a:r>
           </a:p>
         </p:txBody>
@@ -10540,7 +10976,7 @@
             </a:r>
             <a:r>
               <a:rPr lang="fr-FR" dirty="0">
-                <a:hlinkClick r:id="rId2"/>
+                <a:hlinkClick r:id="rId3"/>
               </a:rPr>
               <a:t>https://api-getaround-4ece015745ea.herokuapp.com/</a:t>
             </a:r>
@@ -10604,15 +11040,15 @@
           <p:nvPr/>
         </p:nvPicPr>
         <p:blipFill>
-          <a:blip r:embed="rId3"/>
+          <a:blip r:embed="rId4"/>
           <a:stretch>
             <a:fillRect/>
           </a:stretch>
         </p:blipFill>
         <p:spPr>
           <a:xfrm>
-            <a:off x="3828834" y="3429000"/>
-            <a:ext cx="8094941" cy="2480987"/>
+            <a:off x="2139696" y="4374600"/>
+            <a:ext cx="7418831" cy="2273769"/>
           </a:xfrm>
           <a:prstGeom prst="rect">
             <a:avLst/>
@@ -10679,7 +11115,7 @@
           <a:p>
             <a:r>
               <a:rPr lang="fr-FR" dirty="0"/>
-              <a:t>Pricing API</a:t>
+              <a:t>Pricing - API</a:t>
             </a:r>
           </a:p>
         </p:txBody>

</xml_diff>

<commit_message>
dashboard getaround finished? May be...
</commit_message>
<xml_diff>
--- a/08_deployment/99_Project_getaround/01_getaround_project.pptx
+++ b/08_deployment/99_Project_getaround/01_getaround_project.pptx
@@ -130,7 +130,7 @@
 <file path=ppt/revisionInfo.xml><?xml version="1.0" encoding="utf-8"?>
 <p1510:revInfo xmlns:a="http://schemas.openxmlformats.org/drawingml/2006/main" xmlns:r="http://schemas.openxmlformats.org/officeDocument/2006/relationships" xmlns:p1510="http://schemas.microsoft.com/office/powerpoint/2015/10/main">
   <p1510:revLst>
-    <p1510:client id="{40F711FF-06EA-48FB-94E5-8AF9239032B0}" v="48" dt="2024-09-16T09:37:52.704"/>
+    <p1510:client id="{40F711FF-06EA-48FB-94E5-8AF9239032B0}" v="49" dt="2024-09-16T13:27:53.160"/>
   </p1510:revLst>
 </p1510:revInfo>
 </file>
@@ -667,12 +667,12 @@
   <pc:docChgLst>
     <pc:chgData name="Philippe Baucour" userId="5102170ae7533958" providerId="LiveId" clId="{40F711FF-06EA-48FB-94E5-8AF9239032B0}"/>
     <pc:docChg chg="undo custSel addSld delSld modSld sldOrd">
-      <pc:chgData name="Philippe Baucour" userId="5102170ae7533958" providerId="LiveId" clId="{40F711FF-06EA-48FB-94E5-8AF9239032B0}" dt="2024-09-16T09:38:50.760" v="2208" actId="1035"/>
+      <pc:chgData name="Philippe Baucour" userId="5102170ae7533958" providerId="LiveId" clId="{40F711FF-06EA-48FB-94E5-8AF9239032B0}" dt="2024-09-16T13:29:25.648" v="2246" actId="20577"/>
       <pc:docMkLst>
         <pc:docMk/>
       </pc:docMkLst>
       <pc:sldChg chg="modSp mod modNotesTx">
-        <pc:chgData name="Philippe Baucour" userId="5102170ae7533958" providerId="LiveId" clId="{40F711FF-06EA-48FB-94E5-8AF9239032B0}" dt="2024-09-15T12:08:40.222" v="1532" actId="20577"/>
+        <pc:chgData name="Philippe Baucour" userId="5102170ae7533958" providerId="LiveId" clId="{40F711FF-06EA-48FB-94E5-8AF9239032B0}" dt="2024-09-16T13:29:25.648" v="2246" actId="20577"/>
         <pc:sldMkLst>
           <pc:docMk/>
           <pc:sldMk cId="1392602265" sldId="256"/>
@@ -686,7 +686,7 @@
           </ac:spMkLst>
         </pc:spChg>
         <pc:spChg chg="mod">
-          <ac:chgData name="Philippe Baucour" userId="5102170ae7533958" providerId="LiveId" clId="{40F711FF-06EA-48FB-94E5-8AF9239032B0}" dt="2024-09-15T12:08:40.222" v="1532" actId="20577"/>
+          <ac:chgData name="Philippe Baucour" userId="5102170ae7533958" providerId="LiveId" clId="{40F711FF-06EA-48FB-94E5-8AF9239032B0}" dt="2024-09-16T13:29:25.648" v="2246" actId="20577"/>
           <ac:spMkLst>
             <pc:docMk/>
             <pc:sldMk cId="1392602265" sldId="256"/>
@@ -7337,8 +7337,8 @@
         </p:nvSpPr>
         <p:spPr>
           <a:xfrm>
-            <a:off x="225552" y="3602037"/>
-            <a:ext cx="11740896" cy="2133599"/>
+            <a:off x="61993" y="3602037"/>
+            <a:ext cx="12049932" cy="2628282"/>
           </a:xfrm>
         </p:spPr>
         <p:txBody>
@@ -7399,11 +7399,20 @@
             <a:pPr algn="l">
               <a:tabLst>
                 <a:tab pos="982663" algn="l"/>
+                <a:tab pos="2060575" algn="l"/>
               </a:tabLst>
             </a:pPr>
             <a:r>
               <a:rPr lang="fr-FR" sz="1400" dirty="0"/>
               <a:t>files  :	</a:t>
+            </a:r>
+            <a:r>
+              <a:rPr lang="fr-FR" sz="1400" dirty="0" err="1"/>
+              <a:t>project</a:t>
+            </a:r>
+            <a:r>
+              <a:rPr lang="fr-FR" sz="1400" dirty="0"/>
+              <a:t>	</a:t>
             </a:r>
             <a:r>
               <a:rPr lang="fr-FR" sz="1400" dirty="0">
@@ -7416,7 +7425,7 @@
             </a:br>
             <a:r>
               <a:rPr lang="fr-FR" sz="1400" dirty="0"/>
-              <a:t>	</a:t>
+              <a:t>	API	</a:t>
             </a:r>
             <a:r>
               <a:rPr lang="fr-FR" sz="1400" dirty="0">
@@ -7424,6 +7433,33 @@
               </a:rPr>
               <a:t>https://api-getaround-4ece015745ea.herokuapp.com/</a:t>
             </a:r>
+            <a:br>
+              <a:rPr lang="fr-FR" sz="1400" dirty="0"/>
+            </a:br>
+            <a:r>
+              <a:rPr lang="fr-FR" sz="1400"/>
+              <a:t>	Dashboard	</a:t>
+            </a:r>
+            <a:r>
+              <a:rPr lang="fr-FR" sz="1400">
+                <a:hlinkClick r:id="rId7"/>
+              </a:rPr>
+              <a:t>https</a:t>
+            </a:r>
+            <a:r>
+              <a:rPr lang="fr-FR" sz="1400" dirty="0">
+                <a:hlinkClick r:id="rId7"/>
+              </a:rPr>
+              <a:t>://dashboard-getaround-ab69d6a429e9.herokuapp.com/</a:t>
+            </a:r>
+            <a:endParaRPr lang="fr-FR" sz="1400" dirty="0"/>
+          </a:p>
+          <a:p>
+            <a:pPr algn="l">
+              <a:tabLst>
+                <a:tab pos="982663" algn="l"/>
+              </a:tabLst>
+            </a:pPr>
             <a:endParaRPr lang="fr-FR" sz="1400" dirty="0"/>
           </a:p>
           <a:p>

</xml_diff>